<commit_message>
Added couple of slides on rxjs operators
</commit_message>
<xml_diff>
--- a/ReactiveProgramming_ngrx.pptx
+++ b/ReactiveProgramming_ngrx.pptx
@@ -5,10 +5,10 @@
     <p:sldMasterId id="2147483793" r:id="rId1"/>
   </p:sldMasterIdLst>
   <p:notesMasterIdLst>
-    <p:notesMasterId r:id="rId38"/>
+    <p:notesMasterId r:id="rId40"/>
   </p:notesMasterIdLst>
   <p:handoutMasterIdLst>
-    <p:handoutMasterId r:id="rId39"/>
+    <p:handoutMasterId r:id="rId41"/>
   </p:handoutMasterIdLst>
   <p:sldIdLst>
     <p:sldId id="292" r:id="rId2"/>
@@ -38,15 +38,17 @@
     <p:sldId id="448" r:id="rId26"/>
     <p:sldId id="449" r:id="rId27"/>
     <p:sldId id="450" r:id="rId28"/>
-    <p:sldId id="453" r:id="rId29"/>
-    <p:sldId id="455" r:id="rId30"/>
-    <p:sldId id="456" r:id="rId31"/>
-    <p:sldId id="457" r:id="rId32"/>
-    <p:sldId id="454" r:id="rId33"/>
-    <p:sldId id="425" r:id="rId34"/>
-    <p:sldId id="407" r:id="rId35"/>
-    <p:sldId id="419" r:id="rId36"/>
-    <p:sldId id="427" r:id="rId37"/>
+    <p:sldId id="459" r:id="rId29"/>
+    <p:sldId id="458" r:id="rId30"/>
+    <p:sldId id="453" r:id="rId31"/>
+    <p:sldId id="455" r:id="rId32"/>
+    <p:sldId id="456" r:id="rId33"/>
+    <p:sldId id="457" r:id="rId34"/>
+    <p:sldId id="454" r:id="rId35"/>
+    <p:sldId id="425" r:id="rId36"/>
+    <p:sldId id="407" r:id="rId37"/>
+    <p:sldId id="419" r:id="rId38"/>
+    <p:sldId id="427" r:id="rId39"/>
   </p:sldIdLst>
   <p:sldSz cx="12192000" cy="6858000"/>
   <p:notesSz cx="6858000" cy="9144000"/>
@@ -147,7 +149,7 @@
   </p:defaultTextStyle>
   <p:extLst>
     <p:ext uri="{EFAFB233-063F-42B5-8137-9DF3F51BA10A}">
-      <p15:sldGuideLst xmlns:p15="http://schemas.microsoft.com/office/powerpoint/2012/main" xmlns=""/>
+      <p15:sldGuideLst xmlns="" xmlns:p15="http://schemas.microsoft.com/office/powerpoint/2012/main"/>
     </p:ext>
   </p:extLst>
 </p:presentation>
@@ -235,7 +237,7 @@
           <a:p>
             <a:fld id="{327B5F9E-84DB-4811-8F56-9C65E911095D}" type="datetimeFigureOut">
               <a:rPr lang="it-IT" smtClean="0"/>
-              <a:t>30/11/2018</a:t>
+              <a:t>01/12/2018</a:t>
             </a:fld>
             <a:endParaRPr lang="it-IT"/>
           </a:p>
@@ -400,7 +402,7 @@
           <a:p>
             <a:fld id="{60073984-6E99-4D80-ADB1-BFDA0D866557}" type="datetimeFigureOut">
               <a:rPr lang="en-US"/>
-              <a:t>11/30/2018</a:t>
+              <a:t>12/1/2018</a:t>
             </a:fld>
             <a:endParaRPr lang="en-US"/>
           </a:p>
@@ -756,6 +758,174 @@
 </p:notes>
 </file>
 
+<file path=ppt/notesSlides/notesSlide10.xml><?xml version="1.0" encoding="utf-8"?>
+<p:notes xmlns:a="http://schemas.openxmlformats.org/drawingml/2006/main" xmlns:r="http://schemas.openxmlformats.org/officeDocument/2006/relationships" xmlns:p="http://schemas.openxmlformats.org/presentationml/2006/main">
+  <p:cSld>
+    <p:spTree>
+      <p:nvGrpSpPr>
+        <p:cNvPr id="1" name=""/>
+        <p:cNvGrpSpPr/>
+        <p:nvPr/>
+      </p:nvGrpSpPr>
+      <p:grpSpPr>
+        <a:xfrm>
+          <a:off x="0" y="0"/>
+          <a:ext cx="0" cy="0"/>
+          <a:chOff x="0" y="0"/>
+          <a:chExt cx="0" cy="0"/>
+        </a:xfrm>
+      </p:grpSpPr>
+      <p:sp>
+        <p:nvSpPr>
+          <p:cNvPr id="2" name="Segnaposto immagine diapositiva 1"/>
+          <p:cNvSpPr>
+            <a:spLocks noGrp="1" noRot="1" noChangeAspect="1"/>
+          </p:cNvSpPr>
+          <p:nvPr>
+            <p:ph type="sldImg"/>
+          </p:nvPr>
+        </p:nvSpPr>
+        <p:spPr/>
+      </p:sp>
+      <p:sp>
+        <p:nvSpPr>
+          <p:cNvPr id="3" name="Segnaposto note 2"/>
+          <p:cNvSpPr>
+            <a:spLocks noGrp="1"/>
+          </p:cNvSpPr>
+          <p:nvPr>
+            <p:ph type="body" idx="1"/>
+          </p:nvPr>
+        </p:nvSpPr>
+        <p:spPr/>
+        <p:txBody>
+          <a:bodyPr/>
+          <a:lstStyle/>
+          <a:p>
+            <a:endParaRPr lang="it-IT" dirty="0"/>
+          </a:p>
+        </p:txBody>
+      </p:sp>
+      <p:sp>
+        <p:nvSpPr>
+          <p:cNvPr id="4" name="Segnaposto numero diapositiva 3"/>
+          <p:cNvSpPr>
+            <a:spLocks noGrp="1"/>
+          </p:cNvSpPr>
+          <p:nvPr>
+            <p:ph type="sldNum" sz="quarter" idx="10"/>
+          </p:nvPr>
+        </p:nvSpPr>
+        <p:spPr/>
+        <p:txBody>
+          <a:bodyPr/>
+          <a:lstStyle/>
+          <a:p>
+            <a:fld id="{C519897D-FFB3-4111-B327-449DADBE2990}" type="slidenum">
+              <a:rPr lang="en-US" smtClean="0"/>
+              <a:t>37</a:t>
+            </a:fld>
+            <a:endParaRPr lang="en-US"/>
+          </a:p>
+        </p:txBody>
+      </p:sp>
+    </p:spTree>
+    <p:extLst>
+      <p:ext uri="{BB962C8B-B14F-4D97-AF65-F5344CB8AC3E}">
+        <p14:creationId xmlns:p14="http://schemas.microsoft.com/office/powerpoint/2010/main" val="3813177152"/>
+      </p:ext>
+    </p:extLst>
+  </p:cSld>
+  <p:clrMapOvr>
+    <a:masterClrMapping/>
+  </p:clrMapOvr>
+</p:notes>
+</file>
+
+<file path=ppt/notesSlides/notesSlide11.xml><?xml version="1.0" encoding="utf-8"?>
+<p:notes xmlns:a="http://schemas.openxmlformats.org/drawingml/2006/main" xmlns:r="http://schemas.openxmlformats.org/officeDocument/2006/relationships" xmlns:p="http://schemas.openxmlformats.org/presentationml/2006/main">
+  <p:cSld>
+    <p:spTree>
+      <p:nvGrpSpPr>
+        <p:cNvPr id="1" name=""/>
+        <p:cNvGrpSpPr/>
+        <p:nvPr/>
+      </p:nvGrpSpPr>
+      <p:grpSpPr>
+        <a:xfrm>
+          <a:off x="0" y="0"/>
+          <a:ext cx="0" cy="0"/>
+          <a:chOff x="0" y="0"/>
+          <a:chExt cx="0" cy="0"/>
+        </a:xfrm>
+      </p:grpSpPr>
+      <p:sp>
+        <p:nvSpPr>
+          <p:cNvPr id="2" name="Segnaposto immagine diapositiva 1"/>
+          <p:cNvSpPr>
+            <a:spLocks noGrp="1" noRot="1" noChangeAspect="1"/>
+          </p:cNvSpPr>
+          <p:nvPr>
+            <p:ph type="sldImg"/>
+          </p:nvPr>
+        </p:nvSpPr>
+        <p:spPr/>
+      </p:sp>
+      <p:sp>
+        <p:nvSpPr>
+          <p:cNvPr id="3" name="Segnaposto note 2"/>
+          <p:cNvSpPr>
+            <a:spLocks noGrp="1"/>
+          </p:cNvSpPr>
+          <p:nvPr>
+            <p:ph type="body" idx="1"/>
+          </p:nvPr>
+        </p:nvSpPr>
+        <p:spPr/>
+        <p:txBody>
+          <a:bodyPr/>
+          <a:lstStyle/>
+          <a:p>
+            <a:endParaRPr lang="it-IT"/>
+          </a:p>
+        </p:txBody>
+      </p:sp>
+      <p:sp>
+        <p:nvSpPr>
+          <p:cNvPr id="4" name="Segnaposto numero diapositiva 3"/>
+          <p:cNvSpPr>
+            <a:spLocks noGrp="1"/>
+          </p:cNvSpPr>
+          <p:nvPr>
+            <p:ph type="sldNum" sz="quarter" idx="10"/>
+          </p:nvPr>
+        </p:nvSpPr>
+        <p:spPr/>
+        <p:txBody>
+          <a:bodyPr/>
+          <a:lstStyle/>
+          <a:p>
+            <a:fld id="{C519897D-FFB3-4111-B327-449DADBE2990}" type="slidenum">
+              <a:rPr lang="en-US" smtClean="0"/>
+              <a:t>38</a:t>
+            </a:fld>
+            <a:endParaRPr lang="en-US"/>
+          </a:p>
+        </p:txBody>
+      </p:sp>
+    </p:spTree>
+    <p:extLst>
+      <p:ext uri="{BB962C8B-B14F-4D97-AF65-F5344CB8AC3E}">
+        <p14:creationId xmlns:p14="http://schemas.microsoft.com/office/powerpoint/2010/main" val="2814216342"/>
+      </p:ext>
+    </p:extLst>
+  </p:cSld>
+  <p:clrMapOvr>
+    <a:masterClrMapping/>
+  </p:clrMapOvr>
+</p:notes>
+</file>
+
 <file path=ppt/notesSlides/notesSlide2.xml><?xml version="1.0" encoding="utf-8"?>
 <p:notes xmlns:a="http://schemas.openxmlformats.org/drawingml/2006/main" xmlns:r="http://schemas.openxmlformats.org/officeDocument/2006/relationships" xmlns:p="http://schemas.openxmlformats.org/presentationml/2006/main">
   <p:cSld>
@@ -1650,7 +1820,75 @@
           <a:bodyPr/>
           <a:lstStyle/>
           <a:p>
-            <a:endParaRPr lang="it-IT"/>
+            <a:r>
+              <a:rPr lang="it-IT" dirty="0" err="1" smtClean="0"/>
+              <a:t>There</a:t>
+            </a:r>
+            <a:r>
+              <a:rPr lang="it-IT" dirty="0" smtClean="0"/>
+              <a:t> are some </a:t>
+            </a:r>
+            <a:r>
+              <a:rPr lang="it-IT" dirty="0" err="1" smtClean="0"/>
+              <a:t>key</a:t>
+            </a:r>
+            <a:r>
+              <a:rPr lang="it-IT" baseline="0" dirty="0" smtClean="0"/>
+              <a:t> </a:t>
+            </a:r>
+            <a:r>
+              <a:rPr lang="it-IT" baseline="0" dirty="0" err="1" smtClean="0"/>
+              <a:t>concepts</a:t>
+            </a:r>
+            <a:r>
+              <a:rPr lang="it-IT" baseline="0" dirty="0" smtClean="0"/>
+              <a:t> to </a:t>
+            </a:r>
+            <a:r>
+              <a:rPr lang="it-IT" baseline="0" dirty="0" err="1" smtClean="0"/>
+              <a:t>pay</a:t>
+            </a:r>
+            <a:r>
+              <a:rPr lang="it-IT" baseline="0" dirty="0" smtClean="0"/>
+              <a:t> </a:t>
+            </a:r>
+            <a:r>
+              <a:rPr lang="it-IT" baseline="0" dirty="0" err="1" smtClean="0"/>
+              <a:t>attention</a:t>
+            </a:r>
+            <a:r>
+              <a:rPr lang="it-IT" baseline="0" dirty="0" smtClean="0"/>
+              <a:t> to in </a:t>
+            </a:r>
+            <a:r>
+              <a:rPr lang="it-IT" baseline="0" dirty="0" err="1" smtClean="0"/>
+              <a:t>this</a:t>
+            </a:r>
+            <a:r>
+              <a:rPr lang="it-IT" baseline="0" dirty="0" smtClean="0"/>
+              <a:t> </a:t>
+            </a:r>
+            <a:r>
+              <a:rPr lang="it-IT" baseline="0" dirty="0" err="1" smtClean="0"/>
+              <a:t>simple</a:t>
+            </a:r>
+            <a:r>
+              <a:rPr lang="it-IT" baseline="0" dirty="0" smtClean="0"/>
+              <a:t> </a:t>
+            </a:r>
+            <a:r>
+              <a:rPr lang="it-IT" baseline="0" dirty="0" err="1" smtClean="0"/>
+              <a:t>piece</a:t>
+            </a:r>
+            <a:r>
+              <a:rPr lang="it-IT" baseline="0" dirty="0" smtClean="0"/>
+              <a:t> of </a:t>
+            </a:r>
+            <a:r>
+              <a:rPr lang="it-IT" baseline="0" dirty="0" err="1" smtClean="0"/>
+              <a:t>cde</a:t>
+            </a:r>
+            <a:endParaRPr lang="it-IT" dirty="0"/>
           </a:p>
         </p:txBody>
       </p:sp>
@@ -1671,7 +1909,7 @@
           <a:p>
             <a:fld id="{C519897D-FFB3-4111-B327-449DADBE2990}" type="slidenum">
               <a:rPr lang="en-US" smtClean="0"/>
-              <a:t>34</a:t>
+              <a:t>28</a:t>
             </a:fld>
             <a:endParaRPr lang="en-US"/>
           </a:p>
@@ -1680,7 +1918,7 @@
     </p:spTree>
     <p:extLst>
       <p:ext uri="{BB962C8B-B14F-4D97-AF65-F5344CB8AC3E}">
-        <p14:creationId xmlns:p14="http://schemas.microsoft.com/office/powerpoint/2010/main" val="958452951"/>
+        <p14:creationId xmlns:p14="http://schemas.microsoft.com/office/powerpoint/2010/main" val="3829235509"/>
       </p:ext>
     </p:extLst>
   </p:cSld>
@@ -1734,6 +1972,272 @@
           <a:bodyPr/>
           <a:lstStyle/>
           <a:p>
+            <a:r>
+              <a:rPr lang="it-IT" dirty="0" err="1" smtClean="0"/>
+              <a:t>Chose</a:t>
+            </a:r>
+            <a:r>
+              <a:rPr lang="it-IT" dirty="0" smtClean="0"/>
+              <a:t> the operator </a:t>
+            </a:r>
+            <a:r>
+              <a:rPr lang="it-IT" dirty="0" err="1" smtClean="0"/>
+              <a:t>based</a:t>
+            </a:r>
+            <a:r>
+              <a:rPr lang="it-IT" dirty="0" smtClean="0"/>
+              <a:t> on </a:t>
+            </a:r>
+            <a:r>
+              <a:rPr lang="it-IT" dirty="0" err="1" smtClean="0"/>
+              <a:t>how</a:t>
+            </a:r>
+            <a:r>
+              <a:rPr lang="it-IT" baseline="0" dirty="0" smtClean="0"/>
+              <a:t> </a:t>
+            </a:r>
+            <a:r>
+              <a:rPr lang="it-IT" baseline="0" dirty="0" err="1" smtClean="0"/>
+              <a:t>you</a:t>
+            </a:r>
+            <a:r>
+              <a:rPr lang="it-IT" baseline="0" dirty="0" smtClean="0"/>
+              <a:t> </a:t>
+            </a:r>
+            <a:r>
+              <a:rPr lang="it-IT" baseline="0" dirty="0" err="1" smtClean="0"/>
+              <a:t>want</a:t>
+            </a:r>
+            <a:r>
+              <a:rPr lang="it-IT" baseline="0" dirty="0" smtClean="0"/>
+              <a:t> to </a:t>
+            </a:r>
+            <a:r>
+              <a:rPr lang="it-IT" baseline="0" dirty="0" err="1" smtClean="0"/>
+              <a:t>react</a:t>
+            </a:r>
+            <a:r>
+              <a:rPr lang="it-IT" baseline="0" dirty="0" smtClean="0"/>
+              <a:t> </a:t>
+            </a:r>
+            <a:r>
+              <a:rPr lang="it-IT" baseline="0" dirty="0" err="1" smtClean="0"/>
+              <a:t>when</a:t>
+            </a:r>
+            <a:r>
+              <a:rPr lang="it-IT" baseline="0" dirty="0" smtClean="0"/>
+              <a:t> multiple http </a:t>
+            </a:r>
+            <a:r>
+              <a:rPr lang="it-IT" baseline="0" dirty="0" err="1" smtClean="0"/>
+              <a:t>requests</a:t>
+            </a:r>
+            <a:r>
+              <a:rPr lang="it-IT" baseline="0" dirty="0" smtClean="0"/>
+              <a:t> </a:t>
+            </a:r>
+            <a:r>
+              <a:rPr lang="it-IT" baseline="0" dirty="0" err="1" smtClean="0"/>
+              <a:t>might</a:t>
+            </a:r>
+            <a:r>
+              <a:rPr lang="it-IT" baseline="0" dirty="0" smtClean="0"/>
+              <a:t> be </a:t>
+            </a:r>
+            <a:r>
+              <a:rPr lang="it-IT" baseline="0" dirty="0" err="1" smtClean="0"/>
+              <a:t>active</a:t>
+            </a:r>
+            <a:r>
+              <a:rPr lang="it-IT" baseline="0" dirty="0" smtClean="0"/>
+              <a:t> </a:t>
+            </a:r>
+            <a:r>
+              <a:rPr lang="it-IT" baseline="0" dirty="0" err="1" smtClean="0"/>
+              <a:t>at</a:t>
+            </a:r>
+            <a:r>
+              <a:rPr lang="it-IT" baseline="0" dirty="0" smtClean="0"/>
+              <a:t> the </a:t>
+            </a:r>
+            <a:r>
+              <a:rPr lang="it-IT" baseline="0" dirty="0" err="1" smtClean="0"/>
+              <a:t>same</a:t>
+            </a:r>
+            <a:r>
+              <a:rPr lang="it-IT" baseline="0" dirty="0" smtClean="0"/>
+              <a:t> time </a:t>
+            </a:r>
+            <a:r>
+              <a:rPr lang="it-IT" baseline="0" dirty="0" err="1" smtClean="0"/>
+              <a:t>when</a:t>
+            </a:r>
+            <a:r>
+              <a:rPr lang="it-IT" baseline="0" dirty="0" smtClean="0"/>
+              <a:t> multiple </a:t>
+            </a:r>
+            <a:r>
+              <a:rPr lang="it-IT" baseline="0" dirty="0" err="1" smtClean="0"/>
+              <a:t>messages</a:t>
+            </a:r>
+            <a:r>
+              <a:rPr lang="it-IT" baseline="0" dirty="0" smtClean="0"/>
+              <a:t> </a:t>
+            </a:r>
+            <a:r>
+              <a:rPr lang="it-IT" baseline="0" dirty="0" err="1" smtClean="0"/>
+              <a:t>being</a:t>
+            </a:r>
+            <a:r>
+              <a:rPr lang="it-IT" baseline="0" dirty="0" smtClean="0"/>
+              <a:t> </a:t>
+            </a:r>
+            <a:r>
+              <a:rPr lang="it-IT" baseline="0" dirty="0" err="1" smtClean="0"/>
+              <a:t>dispatched</a:t>
+            </a:r>
+            <a:r>
+              <a:rPr lang="it-IT" baseline="0" dirty="0" smtClean="0"/>
+              <a:t>: </a:t>
+            </a:r>
+            <a:r>
+              <a:rPr lang="it-IT" baseline="0" dirty="0" err="1" smtClean="0"/>
+              <a:t>cancel</a:t>
+            </a:r>
+            <a:r>
+              <a:rPr lang="it-IT" baseline="0" dirty="0" smtClean="0"/>
+              <a:t> </a:t>
+            </a:r>
+            <a:r>
+              <a:rPr lang="it-IT" baseline="0" dirty="0" err="1" smtClean="0"/>
+              <a:t>previous</a:t>
+            </a:r>
+            <a:r>
+              <a:rPr lang="it-IT" baseline="0" dirty="0" smtClean="0"/>
+              <a:t> </a:t>
+            </a:r>
+            <a:r>
+              <a:rPr lang="it-IT" baseline="0" dirty="0" err="1" smtClean="0"/>
+              <a:t>operations</a:t>
+            </a:r>
+            <a:r>
+              <a:rPr lang="it-IT" baseline="0" dirty="0" smtClean="0"/>
+              <a:t>, </a:t>
+            </a:r>
+            <a:r>
+              <a:rPr lang="it-IT" baseline="0" dirty="0" err="1" smtClean="0"/>
+              <a:t>execute</a:t>
+            </a:r>
+            <a:r>
+              <a:rPr lang="it-IT" baseline="0" dirty="0" smtClean="0"/>
+              <a:t> </a:t>
+            </a:r>
+            <a:r>
+              <a:rPr lang="it-IT" baseline="0" dirty="0" err="1" smtClean="0"/>
+              <a:t>them</a:t>
+            </a:r>
+            <a:r>
+              <a:rPr lang="it-IT" baseline="0" dirty="0" smtClean="0"/>
+              <a:t> in </a:t>
+            </a:r>
+            <a:r>
+              <a:rPr lang="it-IT" baseline="0" dirty="0" err="1" smtClean="0"/>
+              <a:t>parallel</a:t>
+            </a:r>
+            <a:r>
+              <a:rPr lang="it-IT" baseline="0" dirty="0" smtClean="0"/>
+              <a:t> and merge the </a:t>
+            </a:r>
+            <a:r>
+              <a:rPr lang="it-IT" baseline="0" dirty="0" err="1" smtClean="0"/>
+              <a:t>results</a:t>
+            </a:r>
+            <a:r>
+              <a:rPr lang="it-IT" baseline="0" dirty="0" smtClean="0"/>
+              <a:t>, </a:t>
+            </a:r>
+            <a:r>
+              <a:rPr lang="it-IT" baseline="0" dirty="0" err="1" smtClean="0"/>
+              <a:t>keep</a:t>
+            </a:r>
+            <a:r>
+              <a:rPr lang="it-IT" baseline="0" dirty="0" smtClean="0"/>
+              <a:t> </a:t>
+            </a:r>
+            <a:r>
+              <a:rPr lang="it-IT" baseline="0" dirty="0" err="1" smtClean="0"/>
+              <a:t>ordering</a:t>
+            </a:r>
+            <a:r>
+              <a:rPr lang="it-IT" baseline="0" dirty="0" smtClean="0"/>
+              <a:t>, </a:t>
+            </a:r>
+            <a:r>
+              <a:rPr lang="it-IT" baseline="0" dirty="0" err="1" smtClean="0"/>
+              <a:t>wait</a:t>
+            </a:r>
+            <a:r>
+              <a:rPr lang="it-IT" baseline="0" dirty="0" smtClean="0"/>
+              <a:t> for </a:t>
+            </a:r>
+            <a:r>
+              <a:rPr lang="it-IT" baseline="0" dirty="0" err="1" smtClean="0"/>
+              <a:t>previous</a:t>
+            </a:r>
+            <a:r>
+              <a:rPr lang="it-IT" baseline="0" dirty="0" smtClean="0"/>
+              <a:t> </a:t>
+            </a:r>
+            <a:r>
+              <a:rPr lang="it-IT" baseline="0" dirty="0" err="1" smtClean="0"/>
+              <a:t>operation</a:t>
+            </a:r>
+            <a:r>
+              <a:rPr lang="it-IT" baseline="0" dirty="0" smtClean="0"/>
+              <a:t> to complete…</a:t>
+            </a:r>
+          </a:p>
+          <a:p>
+            <a:r>
+              <a:rPr lang="it-IT" baseline="0" dirty="0" smtClean="0"/>
+              <a:t>How ‘in-</a:t>
+            </a:r>
+            <a:r>
+              <a:rPr lang="it-IT" baseline="0" dirty="0" err="1" smtClean="0"/>
+              <a:t>flight</a:t>
+            </a:r>
+            <a:r>
+              <a:rPr lang="it-IT" baseline="0" dirty="0" smtClean="0"/>
+              <a:t>’ </a:t>
+            </a:r>
+            <a:r>
+              <a:rPr lang="it-IT" baseline="0" dirty="0" err="1" smtClean="0"/>
+              <a:t>requests</a:t>
+            </a:r>
+            <a:r>
+              <a:rPr lang="it-IT" baseline="0" dirty="0" smtClean="0"/>
+              <a:t> are </a:t>
+            </a:r>
+            <a:r>
+              <a:rPr lang="it-IT" baseline="0" dirty="0" err="1" smtClean="0"/>
+              <a:t>handled</a:t>
+            </a:r>
+            <a:r>
+              <a:rPr lang="it-IT" baseline="0" dirty="0" smtClean="0"/>
+              <a:t> </a:t>
+            </a:r>
+            <a:r>
+              <a:rPr lang="it-IT" baseline="0" dirty="0" err="1" smtClean="0"/>
+              <a:t>is</a:t>
+            </a:r>
+            <a:r>
+              <a:rPr lang="it-IT" baseline="0" dirty="0" smtClean="0"/>
+              <a:t> up to </a:t>
+            </a:r>
+            <a:r>
+              <a:rPr lang="it-IT" baseline="0" dirty="0" err="1" smtClean="0"/>
+              <a:t>you</a:t>
+            </a:r>
             <a:endParaRPr lang="it-IT" dirty="0"/>
           </a:p>
         </p:txBody>
@@ -1755,7 +2259,7 @@
           <a:p>
             <a:fld id="{C519897D-FFB3-4111-B327-449DADBE2990}" type="slidenum">
               <a:rPr lang="en-US" smtClean="0"/>
-              <a:t>35</a:t>
+              <a:t>29</a:t>
             </a:fld>
             <a:endParaRPr lang="en-US"/>
           </a:p>
@@ -1764,7 +2268,7 @@
     </p:spTree>
     <p:extLst>
       <p:ext uri="{BB962C8B-B14F-4D97-AF65-F5344CB8AC3E}">
-        <p14:creationId xmlns:p14="http://schemas.microsoft.com/office/powerpoint/2010/main" val="3813177152"/>
+        <p14:creationId xmlns:p14="http://schemas.microsoft.com/office/powerpoint/2010/main" val="2022248602"/>
       </p:ext>
     </p:extLst>
   </p:cSld>
@@ -1848,7 +2352,7 @@
     </p:spTree>
     <p:extLst>
       <p:ext uri="{BB962C8B-B14F-4D97-AF65-F5344CB8AC3E}">
-        <p14:creationId xmlns:p14="http://schemas.microsoft.com/office/powerpoint/2010/main" val="2814216342"/>
+        <p14:creationId xmlns:p14="http://schemas.microsoft.com/office/powerpoint/2010/main" val="958452951"/>
       </p:ext>
     </p:extLst>
   </p:cSld>
@@ -2082,7 +2586,7 @@
           <a:p>
             <a:fld id="{F1FA7AC5-6045-4418-8E60-F48788734473}" type="datetimeFigureOut">
               <a:rPr lang="en-US" smtClean="0"/>
-              <a:t>11/30/2018</a:t>
+              <a:t>12/1/2018</a:t>
             </a:fld>
             <a:endParaRPr lang="en-US"/>
           </a:p>
@@ -2295,7 +2799,7 @@
           <a:p>
             <a:fld id="{F1FA7AC5-6045-4418-8E60-F48788734473}" type="datetimeFigureOut">
               <a:rPr lang="en-US" smtClean="0"/>
-              <a:t>11/30/2018</a:t>
+              <a:t>12/1/2018</a:t>
             </a:fld>
             <a:endParaRPr lang="en-US"/>
           </a:p>
@@ -2549,7 +3053,7 @@
           <a:p>
             <a:fld id="{F1FA7AC5-6045-4418-8E60-F48788734473}" type="datetimeFigureOut">
               <a:rPr lang="en-US" smtClean="0"/>
-              <a:t>11/30/2018</a:t>
+              <a:t>12/1/2018</a:t>
             </a:fld>
             <a:endParaRPr lang="en-US"/>
           </a:p>
@@ -2717,7 +3221,7 @@
           <a:p>
             <a:fld id="{F1FA7AC5-6045-4418-8E60-F48788734473}" type="datetimeFigureOut">
               <a:rPr lang="en-US" smtClean="0"/>
-              <a:t>11/30/2018</a:t>
+              <a:t>12/1/2018</a:t>
             </a:fld>
             <a:endParaRPr lang="en-US"/>
           </a:p>
@@ -3059,7 +3563,7 @@
           <a:p>
             <a:fld id="{F1FA7AC5-6045-4418-8E60-F48788734473}" type="datetimeFigureOut">
               <a:rPr lang="en-US" smtClean="0"/>
-              <a:t>11/30/2018</a:t>
+              <a:t>12/1/2018</a:t>
             </a:fld>
             <a:endParaRPr lang="en-US"/>
           </a:p>
@@ -3331,7 +3835,7 @@
           <a:p>
             <a:fld id="{F1FA7AC5-6045-4418-8E60-F48788734473}" type="datetimeFigureOut">
               <a:rPr lang="en-US" smtClean="0"/>
-              <a:t>11/30/2018</a:t>
+              <a:t>12/1/2018</a:t>
             </a:fld>
             <a:endParaRPr lang="en-US"/>
           </a:p>
@@ -3707,7 +4211,7 @@
           <a:p>
             <a:fld id="{F1FA7AC5-6045-4418-8E60-F48788734473}" type="datetimeFigureOut">
               <a:rPr lang="en-US" smtClean="0"/>
-              <a:t>11/30/2018</a:t>
+              <a:t>12/1/2018</a:t>
             </a:fld>
             <a:endParaRPr lang="en-US"/>
           </a:p>
@@ -3824,7 +4328,7 @@
           <a:p>
             <a:fld id="{F1FA7AC5-6045-4418-8E60-F48788734473}" type="datetimeFigureOut">
               <a:rPr lang="en-US" smtClean="0"/>
-              <a:t>11/30/2018</a:t>
+              <a:t>12/1/2018</a:t>
             </a:fld>
             <a:endParaRPr lang="en-US"/>
           </a:p>
@@ -3995,7 +4499,7 @@
           <a:p>
             <a:fld id="{F1FA7AC5-6045-4418-8E60-F48788734473}" type="datetimeFigureOut">
               <a:rPr lang="en-US" smtClean="0"/>
-              <a:t>11/30/2018</a:t>
+              <a:t>12/1/2018</a:t>
             </a:fld>
             <a:endParaRPr lang="en-US"/>
           </a:p>
@@ -4347,7 +4851,7 @@
           <a:p>
             <a:fld id="{F1FA7AC5-6045-4418-8E60-F48788734473}" type="datetimeFigureOut">
               <a:rPr lang="en-US" smtClean="0"/>
-              <a:t>11/30/2018</a:t>
+              <a:t>12/1/2018</a:t>
             </a:fld>
             <a:endParaRPr lang="en-US"/>
           </a:p>
@@ -4722,7 +5226,7 @@
           <a:p>
             <a:fld id="{F1FA7AC5-6045-4418-8E60-F48788734473}" type="datetimeFigureOut">
               <a:rPr lang="en-US" smtClean="0"/>
-              <a:t>11/30/2018</a:t>
+              <a:t>12/1/2018</a:t>
             </a:fld>
             <a:endParaRPr lang="en-US"/>
           </a:p>
@@ -5007,7 +5511,7 @@
           <a:p>
             <a:fld id="{F1FA7AC5-6045-4418-8E60-F48788734473}" type="datetimeFigureOut">
               <a:rPr lang="en-US" smtClean="0"/>
-              <a:t>11/30/2018</a:t>
+              <a:t>12/1/2018</a:t>
             </a:fld>
             <a:endParaRPr lang="en-US"/>
           </a:p>
@@ -17030,7 +17534,7 @@
       </p:grpSpPr>
       <p:sp>
         <p:nvSpPr>
-          <p:cNvPr id="4" name="Titolo 3"/>
+          <p:cNvPr id="2" name="Titolo 1"/>
           <p:cNvSpPr>
             <a:spLocks noGrp="1"/>
           </p:cNvSpPr>
@@ -17044,12 +17548,8 @@
           <a:lstStyle/>
           <a:p>
             <a:r>
-              <a:rPr lang="it-IT" dirty="0" err="1"/>
-              <a:t>n</a:t>
-            </a:r>
-            <a:r>
               <a:rPr lang="it-IT" dirty="0" err="1" smtClean="0"/>
-              <a:t>grx</a:t>
+              <a:t>ngrx</a:t>
             </a:r>
             <a:r>
               <a:rPr lang="it-IT" dirty="0" smtClean="0"/>
@@ -17057,7 +17557,31 @@
             </a:r>
             <a:r>
               <a:rPr lang="it-IT" dirty="0" err="1" smtClean="0"/>
-              <a:t>store-devtools</a:t>
+              <a:t>effect</a:t>
+            </a:r>
+            <a:r>
+              <a:rPr lang="it-IT" dirty="0" smtClean="0"/>
+              <a:t>: </a:t>
+            </a:r>
+            <a:r>
+              <a:rPr lang="it-IT" dirty="0" err="1" smtClean="0"/>
+              <a:t>access</a:t>
+            </a:r>
+            <a:r>
+              <a:rPr lang="it-IT" dirty="0" smtClean="0"/>
+              <a:t> </a:t>
+            </a:r>
+            <a:r>
+              <a:rPr lang="it-IT" dirty="0" err="1" smtClean="0"/>
+              <a:t>external</a:t>
+            </a:r>
+            <a:r>
+              <a:rPr lang="it-IT" dirty="0" smtClean="0"/>
+              <a:t> </a:t>
+            </a:r>
+            <a:r>
+              <a:rPr lang="it-IT" dirty="0" err="1" smtClean="0"/>
+              <a:t>resources</a:t>
             </a:r>
             <a:endParaRPr lang="it-IT" dirty="0"/>
           </a:p>
@@ -17065,19 +17589,984 @@
       </p:sp>
       <p:sp>
         <p:nvSpPr>
-          <p:cNvPr id="5" name="Segnaposto testo 4"/>
+          <p:cNvPr id="3" name="Segnaposto contenuto 2"/>
           <p:cNvSpPr>
             <a:spLocks noGrp="1"/>
           </p:cNvSpPr>
           <p:nvPr>
-            <p:ph type="body" idx="1"/>
+            <p:ph idx="1"/>
           </p:nvPr>
         </p:nvSpPr>
         <p:spPr/>
         <p:txBody>
-          <a:bodyPr/>
+          <a:bodyPr>
+            <a:normAutofit fontScale="77500" lnSpcReduction="20000"/>
+          </a:bodyPr>
           <a:lstStyle/>
           <a:p>
+            <a:r>
+              <a:rPr lang="it-IT" dirty="0">
+                <a:solidFill>
+                  <a:srgbClr val="000000"/>
+                </a:solidFill>
+                <a:latin typeface="Consolas"/>
+              </a:rPr>
+              <a:t>@</a:t>
+            </a:r>
+            <a:r>
+              <a:rPr lang="it-IT" dirty="0" err="1">
+                <a:solidFill>
+                  <a:srgbClr val="795E26"/>
+                </a:solidFill>
+                <a:latin typeface="Consolas"/>
+              </a:rPr>
+              <a:t>Effect</a:t>
+            </a:r>
+            <a:r>
+              <a:rPr lang="it-IT" dirty="0">
+                <a:solidFill>
+                  <a:srgbClr val="000000"/>
+                </a:solidFill>
+                <a:latin typeface="Consolas"/>
+              </a:rPr>
+              <a:t>()</a:t>
+            </a:r>
+          </a:p>
+          <a:p>
+            <a:r>
+              <a:rPr lang="it-IT" dirty="0" err="1">
+                <a:solidFill>
+                  <a:srgbClr val="001080"/>
+                </a:solidFill>
+                <a:latin typeface="Consolas"/>
+              </a:rPr>
+              <a:t>loadHierarchy</a:t>
+            </a:r>
+            <a:r>
+              <a:rPr lang="it-IT" dirty="0">
+                <a:solidFill>
+                  <a:srgbClr val="001080"/>
+                </a:solidFill>
+                <a:latin typeface="Consolas"/>
+              </a:rPr>
+              <a:t>$</a:t>
+            </a:r>
+            <a:r>
+              <a:rPr lang="it-IT" dirty="0">
+                <a:solidFill>
+                  <a:srgbClr val="000000"/>
+                </a:solidFill>
+                <a:latin typeface="Consolas"/>
+              </a:rPr>
+              <a:t> = </a:t>
+            </a:r>
+            <a:r>
+              <a:rPr lang="it-IT" dirty="0" err="1">
+                <a:solidFill>
+                  <a:srgbClr val="0000FF"/>
+                </a:solidFill>
+                <a:latin typeface="Consolas"/>
+              </a:rPr>
+              <a:t>this</a:t>
+            </a:r>
+            <a:r>
+              <a:rPr lang="it-IT" dirty="0" err="1">
+                <a:solidFill>
+                  <a:srgbClr val="000000"/>
+                </a:solidFill>
+                <a:latin typeface="Consolas"/>
+              </a:rPr>
+              <a:t>.</a:t>
+            </a:r>
+            <a:r>
+              <a:rPr lang="it-IT" dirty="0" err="1">
+                <a:solidFill>
+                  <a:srgbClr val="001080"/>
+                </a:solidFill>
+                <a:latin typeface="Consolas"/>
+              </a:rPr>
+              <a:t>actions</a:t>
+            </a:r>
+            <a:r>
+              <a:rPr lang="it-IT" dirty="0" smtClean="0">
+                <a:solidFill>
+                  <a:srgbClr val="001080"/>
+                </a:solidFill>
+                <a:latin typeface="Consolas"/>
+              </a:rPr>
+              <a:t>$</a:t>
+            </a:r>
+            <a:endParaRPr lang="it-IT" dirty="0" smtClean="0">
+              <a:solidFill>
+                <a:srgbClr val="000000"/>
+              </a:solidFill>
+              <a:latin typeface="Consolas"/>
+            </a:endParaRPr>
+          </a:p>
+          <a:p>
+            <a:r>
+              <a:rPr lang="it-IT" dirty="0" smtClean="0">
+                <a:solidFill>
+                  <a:srgbClr val="000000"/>
+                </a:solidFill>
+                <a:latin typeface="Consolas"/>
+              </a:rPr>
+              <a:t>  .</a:t>
+            </a:r>
+            <a:r>
+              <a:rPr lang="it-IT" dirty="0" smtClean="0">
+                <a:solidFill>
+                  <a:srgbClr val="795E26"/>
+                </a:solidFill>
+                <a:latin typeface="Consolas"/>
+              </a:rPr>
+              <a:t>pipe</a:t>
+            </a:r>
+            <a:r>
+              <a:rPr lang="it-IT" dirty="0" smtClean="0">
+                <a:solidFill>
+                  <a:srgbClr val="000000"/>
+                </a:solidFill>
+                <a:latin typeface="Consolas"/>
+              </a:rPr>
+              <a:t>(</a:t>
+            </a:r>
+          </a:p>
+          <a:p>
+            <a:r>
+              <a:rPr lang="it-IT" dirty="0" smtClean="0">
+                <a:solidFill>
+                  <a:srgbClr val="795E26"/>
+                </a:solidFill>
+                <a:latin typeface="Consolas"/>
+              </a:rPr>
+              <a:t>    </a:t>
+            </a:r>
+            <a:r>
+              <a:rPr lang="it-IT" b="1" dirty="0" err="1" smtClean="0">
+                <a:solidFill>
+                  <a:srgbClr val="795E26"/>
+                </a:solidFill>
+                <a:latin typeface="Consolas"/>
+              </a:rPr>
+              <a:t>ofType</a:t>
+            </a:r>
+            <a:r>
+              <a:rPr lang="it-IT" b="1" dirty="0" smtClean="0">
+                <a:solidFill>
+                  <a:srgbClr val="000000"/>
+                </a:solidFill>
+                <a:latin typeface="Consolas"/>
+              </a:rPr>
+              <a:t>(</a:t>
+            </a:r>
+            <a:r>
+              <a:rPr lang="it-IT" b="1" dirty="0" err="1" smtClean="0">
+                <a:solidFill>
+                  <a:srgbClr val="001080"/>
+                </a:solidFill>
+                <a:latin typeface="Consolas"/>
+              </a:rPr>
+              <a:t>ActorsActionsTypes</a:t>
+            </a:r>
+            <a:r>
+              <a:rPr lang="it-IT" b="1" dirty="0" err="1" smtClean="0">
+                <a:solidFill>
+                  <a:srgbClr val="000000"/>
+                </a:solidFill>
+                <a:latin typeface="Consolas"/>
+              </a:rPr>
+              <a:t>.</a:t>
+            </a:r>
+            <a:r>
+              <a:rPr lang="it-IT" b="1" dirty="0" err="1" smtClean="0">
+                <a:solidFill>
+                  <a:srgbClr val="001080"/>
+                </a:solidFill>
+                <a:latin typeface="Consolas"/>
+              </a:rPr>
+              <a:t>ACTORS_LOAD_HIERARCHY</a:t>
+            </a:r>
+            <a:r>
+              <a:rPr lang="it-IT" b="1" dirty="0">
+                <a:solidFill>
+                  <a:srgbClr val="000000"/>
+                </a:solidFill>
+                <a:latin typeface="Consolas"/>
+              </a:rPr>
+              <a:t>)</a:t>
+            </a:r>
+            <a:r>
+              <a:rPr lang="it-IT" dirty="0">
+                <a:solidFill>
+                  <a:srgbClr val="000000"/>
+                </a:solidFill>
+                <a:latin typeface="Consolas"/>
+              </a:rPr>
+              <a:t>,</a:t>
+            </a:r>
+          </a:p>
+          <a:p>
+            <a:r>
+              <a:rPr lang="it-IT" dirty="0" smtClean="0">
+                <a:solidFill>
+                  <a:srgbClr val="795E26"/>
+                </a:solidFill>
+                <a:latin typeface="Consolas"/>
+              </a:rPr>
+              <a:t>    </a:t>
+            </a:r>
+            <a:r>
+              <a:rPr lang="it-IT" b="1" dirty="0" err="1" smtClean="0">
+                <a:solidFill>
+                  <a:srgbClr val="795E26"/>
+                </a:solidFill>
+                <a:latin typeface="Consolas"/>
+              </a:rPr>
+              <a:t>switchMap</a:t>
+            </a:r>
+            <a:r>
+              <a:rPr lang="it-IT" dirty="0" smtClean="0">
+                <a:solidFill>
+                  <a:srgbClr val="000000"/>
+                </a:solidFill>
+                <a:latin typeface="Consolas"/>
+              </a:rPr>
+              <a:t>(</a:t>
+            </a:r>
+            <a:r>
+              <a:rPr lang="it-IT" dirty="0" err="1" smtClean="0">
+                <a:solidFill>
+                  <a:srgbClr val="001080"/>
+                </a:solidFill>
+                <a:latin typeface="Consolas"/>
+              </a:rPr>
+              <a:t>action</a:t>
+            </a:r>
+            <a:r>
+              <a:rPr lang="it-IT" dirty="0" smtClean="0">
+                <a:solidFill>
+                  <a:srgbClr val="000000"/>
+                </a:solidFill>
+                <a:latin typeface="Consolas"/>
+              </a:rPr>
+              <a:t> </a:t>
+            </a:r>
+            <a:r>
+              <a:rPr lang="it-IT" dirty="0">
+                <a:solidFill>
+                  <a:srgbClr val="0000FF"/>
+                </a:solidFill>
+                <a:latin typeface="Consolas"/>
+              </a:rPr>
+              <a:t>=&gt;</a:t>
+            </a:r>
+            <a:r>
+              <a:rPr lang="it-IT" dirty="0">
+                <a:solidFill>
+                  <a:srgbClr val="000000"/>
+                </a:solidFill>
+                <a:latin typeface="Consolas"/>
+              </a:rPr>
+              <a:t> {</a:t>
+            </a:r>
+          </a:p>
+          <a:p>
+            <a:r>
+              <a:rPr lang="it-IT" dirty="0" smtClean="0">
+                <a:solidFill>
+                  <a:srgbClr val="AF00DB"/>
+                </a:solidFill>
+                <a:latin typeface="Consolas"/>
+              </a:rPr>
+              <a:t>      </a:t>
+            </a:r>
+            <a:r>
+              <a:rPr lang="it-IT" dirty="0" err="1" smtClean="0">
+                <a:solidFill>
+                  <a:srgbClr val="AF00DB"/>
+                </a:solidFill>
+                <a:latin typeface="Consolas"/>
+              </a:rPr>
+              <a:t>return</a:t>
+            </a:r>
+            <a:r>
+              <a:rPr lang="it-IT" dirty="0" smtClean="0">
+                <a:solidFill>
+                  <a:srgbClr val="000000"/>
+                </a:solidFill>
+                <a:latin typeface="Consolas"/>
+              </a:rPr>
+              <a:t> </a:t>
+            </a:r>
+            <a:r>
+              <a:rPr lang="it-IT" b="1" dirty="0" err="1">
+                <a:solidFill>
+                  <a:srgbClr val="0000FF"/>
+                </a:solidFill>
+                <a:latin typeface="Consolas"/>
+              </a:rPr>
+              <a:t>this</a:t>
+            </a:r>
+            <a:r>
+              <a:rPr lang="it-IT" b="1" dirty="0" err="1">
+                <a:solidFill>
+                  <a:srgbClr val="000000"/>
+                </a:solidFill>
+                <a:latin typeface="Consolas"/>
+              </a:rPr>
+              <a:t>.</a:t>
+            </a:r>
+            <a:r>
+              <a:rPr lang="it-IT" b="1" dirty="0" err="1">
+                <a:solidFill>
+                  <a:srgbClr val="001080"/>
+                </a:solidFill>
+                <a:latin typeface="Consolas"/>
+              </a:rPr>
+              <a:t>endpointService</a:t>
+            </a:r>
+            <a:r>
+              <a:rPr lang="it-IT" b="1" dirty="0" err="1">
+                <a:solidFill>
+                  <a:srgbClr val="000000"/>
+                </a:solidFill>
+                <a:latin typeface="Consolas"/>
+              </a:rPr>
+              <a:t>.</a:t>
+            </a:r>
+            <a:r>
+              <a:rPr lang="it-IT" b="1" dirty="0" err="1">
+                <a:solidFill>
+                  <a:srgbClr val="795E26"/>
+                </a:solidFill>
+                <a:latin typeface="Consolas"/>
+              </a:rPr>
+              <a:t>GetActorsHierarchy</a:t>
+            </a:r>
+            <a:r>
+              <a:rPr lang="it-IT" b="1" dirty="0">
+                <a:solidFill>
+                  <a:srgbClr val="000000"/>
+                </a:solidFill>
+                <a:latin typeface="Consolas"/>
+              </a:rPr>
+              <a:t>(</a:t>
+            </a:r>
+            <a:r>
+              <a:rPr lang="it-IT" b="1" dirty="0" err="1">
+                <a:solidFill>
+                  <a:srgbClr val="001080"/>
+                </a:solidFill>
+                <a:latin typeface="Consolas"/>
+              </a:rPr>
+              <a:t>action</a:t>
+            </a:r>
+            <a:r>
+              <a:rPr lang="it-IT" b="1" dirty="0" err="1">
+                <a:solidFill>
+                  <a:srgbClr val="000000"/>
+                </a:solidFill>
+                <a:latin typeface="Consolas"/>
+              </a:rPr>
+              <a:t>.</a:t>
+            </a:r>
+            <a:r>
+              <a:rPr lang="it-IT" b="1" dirty="0" err="1">
+                <a:solidFill>
+                  <a:srgbClr val="001080"/>
+                </a:solidFill>
+                <a:latin typeface="Consolas"/>
+              </a:rPr>
+              <a:t>endpointName</a:t>
+            </a:r>
+            <a:r>
+              <a:rPr lang="it-IT" b="1" dirty="0">
+                <a:solidFill>
+                  <a:srgbClr val="000000"/>
+                </a:solidFill>
+                <a:latin typeface="Consolas"/>
+              </a:rPr>
+              <a:t>)</a:t>
+            </a:r>
+            <a:r>
+              <a:rPr lang="it-IT" dirty="0">
+                <a:solidFill>
+                  <a:srgbClr val="000000"/>
+                </a:solidFill>
+                <a:latin typeface="Consolas"/>
+              </a:rPr>
+              <a:t>.</a:t>
+            </a:r>
+            <a:r>
+              <a:rPr lang="it-IT" dirty="0">
+                <a:solidFill>
+                  <a:srgbClr val="795E26"/>
+                </a:solidFill>
+                <a:latin typeface="Consolas"/>
+              </a:rPr>
+              <a:t>pipe</a:t>
+            </a:r>
+            <a:r>
+              <a:rPr lang="it-IT" dirty="0">
+                <a:solidFill>
+                  <a:srgbClr val="000000"/>
+                </a:solidFill>
+                <a:latin typeface="Consolas"/>
+              </a:rPr>
+              <a:t>(</a:t>
+            </a:r>
+          </a:p>
+          <a:p>
+            <a:r>
+              <a:rPr lang="it-IT" dirty="0" smtClean="0">
+                <a:solidFill>
+                  <a:srgbClr val="795E26"/>
+                </a:solidFill>
+                <a:latin typeface="Consolas"/>
+              </a:rPr>
+              <a:t>        </a:t>
+            </a:r>
+            <a:r>
+              <a:rPr lang="it-IT" dirty="0" err="1" smtClean="0">
+                <a:solidFill>
+                  <a:srgbClr val="795E26"/>
+                </a:solidFill>
+                <a:latin typeface="Consolas"/>
+              </a:rPr>
+              <a:t>map</a:t>
+            </a:r>
+            <a:r>
+              <a:rPr lang="it-IT" dirty="0" smtClean="0">
+                <a:solidFill>
+                  <a:srgbClr val="000000"/>
+                </a:solidFill>
+                <a:latin typeface="Consolas"/>
+              </a:rPr>
+              <a:t>(</a:t>
+            </a:r>
+            <a:r>
+              <a:rPr lang="it-IT" dirty="0" err="1" smtClean="0">
+                <a:solidFill>
+                  <a:srgbClr val="001080"/>
+                </a:solidFill>
+                <a:latin typeface="Consolas"/>
+              </a:rPr>
+              <a:t>hierarchy</a:t>
+            </a:r>
+            <a:r>
+              <a:rPr lang="it-IT" dirty="0" smtClean="0">
+                <a:solidFill>
+                  <a:srgbClr val="000000"/>
+                </a:solidFill>
+                <a:latin typeface="Consolas"/>
+              </a:rPr>
+              <a:t> </a:t>
+            </a:r>
+            <a:r>
+              <a:rPr lang="it-IT" dirty="0">
+                <a:solidFill>
+                  <a:srgbClr val="0000FF"/>
+                </a:solidFill>
+                <a:latin typeface="Consolas"/>
+              </a:rPr>
+              <a:t>=&gt;</a:t>
+            </a:r>
+            <a:r>
+              <a:rPr lang="it-IT" dirty="0">
+                <a:solidFill>
+                  <a:srgbClr val="000000"/>
+                </a:solidFill>
+                <a:latin typeface="Consolas"/>
+              </a:rPr>
+              <a:t> </a:t>
+            </a:r>
+            <a:r>
+              <a:rPr lang="it-IT" dirty="0">
+                <a:solidFill>
+                  <a:srgbClr val="0000FF"/>
+                </a:solidFill>
+                <a:latin typeface="Consolas"/>
+              </a:rPr>
+              <a:t>new</a:t>
+            </a:r>
+            <a:r>
+              <a:rPr lang="it-IT" dirty="0">
+                <a:solidFill>
+                  <a:srgbClr val="000000"/>
+                </a:solidFill>
+                <a:latin typeface="Consolas"/>
+              </a:rPr>
+              <a:t> </a:t>
+            </a:r>
+            <a:r>
+              <a:rPr lang="it-IT" dirty="0" err="1">
+                <a:solidFill>
+                  <a:srgbClr val="267F99"/>
+                </a:solidFill>
+                <a:latin typeface="Consolas"/>
+              </a:rPr>
+              <a:t>ActorsHierarchyLoaded</a:t>
+            </a:r>
+            <a:r>
+              <a:rPr lang="it-IT" dirty="0">
+                <a:solidFill>
+                  <a:srgbClr val="000000"/>
+                </a:solidFill>
+                <a:latin typeface="Consolas"/>
+              </a:rPr>
+              <a:t>(</a:t>
+            </a:r>
+            <a:r>
+              <a:rPr lang="it-IT" dirty="0" err="1">
+                <a:solidFill>
+                  <a:srgbClr val="001080"/>
+                </a:solidFill>
+                <a:latin typeface="Consolas"/>
+              </a:rPr>
+              <a:t>action</a:t>
+            </a:r>
+            <a:r>
+              <a:rPr lang="it-IT" dirty="0" err="1">
+                <a:solidFill>
+                  <a:srgbClr val="000000"/>
+                </a:solidFill>
+                <a:latin typeface="Consolas"/>
+              </a:rPr>
+              <a:t>.</a:t>
+            </a:r>
+            <a:r>
+              <a:rPr lang="it-IT" dirty="0" err="1">
+                <a:solidFill>
+                  <a:srgbClr val="001080"/>
+                </a:solidFill>
+                <a:latin typeface="Consolas"/>
+              </a:rPr>
+              <a:t>endpointName</a:t>
+            </a:r>
+            <a:r>
+              <a:rPr lang="it-IT" dirty="0">
+                <a:solidFill>
+                  <a:srgbClr val="000000"/>
+                </a:solidFill>
+                <a:latin typeface="Consolas"/>
+              </a:rPr>
+              <a:t>, </a:t>
+            </a:r>
+            <a:r>
+              <a:rPr lang="it-IT" dirty="0" err="1">
+                <a:solidFill>
+                  <a:srgbClr val="001080"/>
+                </a:solidFill>
+                <a:latin typeface="Consolas"/>
+              </a:rPr>
+              <a:t>hierarchy</a:t>
+            </a:r>
+            <a:r>
+              <a:rPr lang="it-IT" dirty="0">
+                <a:solidFill>
+                  <a:srgbClr val="000000"/>
+                </a:solidFill>
+                <a:latin typeface="Consolas"/>
+              </a:rPr>
+              <a:t>)),</a:t>
+            </a:r>
+          </a:p>
+          <a:p>
+            <a:r>
+              <a:rPr lang="it-IT" dirty="0" smtClean="0">
+                <a:solidFill>
+                  <a:srgbClr val="795E26"/>
+                </a:solidFill>
+                <a:latin typeface="Consolas"/>
+              </a:rPr>
+              <a:t>        </a:t>
+            </a:r>
+            <a:r>
+              <a:rPr lang="it-IT" b="1" dirty="0" err="1" smtClean="0">
+                <a:solidFill>
+                  <a:srgbClr val="795E26"/>
+                </a:solidFill>
+                <a:latin typeface="Consolas"/>
+              </a:rPr>
+              <a:t>catchError</a:t>
+            </a:r>
+            <a:r>
+              <a:rPr lang="it-IT" dirty="0" smtClean="0">
+                <a:solidFill>
+                  <a:srgbClr val="000000"/>
+                </a:solidFill>
+                <a:latin typeface="Consolas"/>
+              </a:rPr>
+              <a:t>(</a:t>
+            </a:r>
+            <a:r>
+              <a:rPr lang="it-IT" dirty="0" err="1" smtClean="0">
+                <a:solidFill>
+                  <a:srgbClr val="001080"/>
+                </a:solidFill>
+                <a:latin typeface="Consolas"/>
+              </a:rPr>
+              <a:t>error</a:t>
+            </a:r>
+            <a:r>
+              <a:rPr lang="it-IT" dirty="0" smtClean="0">
+                <a:solidFill>
+                  <a:srgbClr val="000000"/>
+                </a:solidFill>
+                <a:latin typeface="Consolas"/>
+              </a:rPr>
+              <a:t> </a:t>
+            </a:r>
+            <a:r>
+              <a:rPr lang="it-IT" dirty="0">
+                <a:solidFill>
+                  <a:srgbClr val="0000FF"/>
+                </a:solidFill>
+                <a:latin typeface="Consolas"/>
+              </a:rPr>
+              <a:t>=&gt;</a:t>
+            </a:r>
+            <a:r>
+              <a:rPr lang="it-IT" dirty="0">
+                <a:solidFill>
+                  <a:srgbClr val="000000"/>
+                </a:solidFill>
+                <a:latin typeface="Consolas"/>
+              </a:rPr>
+              <a:t> </a:t>
+            </a:r>
+            <a:r>
+              <a:rPr lang="it-IT" dirty="0">
+                <a:solidFill>
+                  <a:srgbClr val="795E26"/>
+                </a:solidFill>
+                <a:latin typeface="Consolas"/>
+              </a:rPr>
+              <a:t>of</a:t>
+            </a:r>
+            <a:r>
+              <a:rPr lang="it-IT" dirty="0">
+                <a:solidFill>
+                  <a:srgbClr val="000000"/>
+                </a:solidFill>
+                <a:latin typeface="Consolas"/>
+              </a:rPr>
+              <a:t>(</a:t>
+            </a:r>
+            <a:r>
+              <a:rPr lang="it-IT" dirty="0">
+                <a:solidFill>
+                  <a:srgbClr val="0000FF"/>
+                </a:solidFill>
+                <a:latin typeface="Consolas"/>
+              </a:rPr>
+              <a:t>new</a:t>
+            </a:r>
+            <a:r>
+              <a:rPr lang="it-IT" dirty="0">
+                <a:solidFill>
+                  <a:srgbClr val="000000"/>
+                </a:solidFill>
+                <a:latin typeface="Consolas"/>
+              </a:rPr>
+              <a:t> </a:t>
+            </a:r>
+            <a:r>
+              <a:rPr lang="it-IT" dirty="0" err="1">
+                <a:solidFill>
+                  <a:srgbClr val="267F99"/>
+                </a:solidFill>
+                <a:latin typeface="Consolas"/>
+              </a:rPr>
+              <a:t>ActorsLoadHierarcyFailed</a:t>
+            </a:r>
+            <a:r>
+              <a:rPr lang="it-IT" dirty="0">
+                <a:solidFill>
+                  <a:srgbClr val="000000"/>
+                </a:solidFill>
+                <a:latin typeface="Consolas"/>
+              </a:rPr>
+              <a:t>(</a:t>
+            </a:r>
+            <a:r>
+              <a:rPr lang="it-IT" dirty="0" err="1">
+                <a:solidFill>
+                  <a:srgbClr val="001080"/>
+                </a:solidFill>
+                <a:latin typeface="Consolas"/>
+              </a:rPr>
+              <a:t>action</a:t>
+            </a:r>
+            <a:r>
+              <a:rPr lang="it-IT" dirty="0" err="1">
+                <a:solidFill>
+                  <a:srgbClr val="000000"/>
+                </a:solidFill>
+                <a:latin typeface="Consolas"/>
+              </a:rPr>
+              <a:t>.</a:t>
+            </a:r>
+            <a:r>
+              <a:rPr lang="it-IT" dirty="0" err="1">
+                <a:solidFill>
+                  <a:srgbClr val="001080"/>
+                </a:solidFill>
+                <a:latin typeface="Consolas"/>
+              </a:rPr>
+              <a:t>endpointName</a:t>
+            </a:r>
+            <a:r>
+              <a:rPr lang="it-IT" dirty="0">
+                <a:solidFill>
+                  <a:srgbClr val="000000"/>
+                </a:solidFill>
+                <a:latin typeface="Consolas"/>
+              </a:rPr>
+              <a:t>, </a:t>
+            </a:r>
+            <a:r>
+              <a:rPr lang="it-IT" dirty="0" err="1">
+                <a:solidFill>
+                  <a:srgbClr val="001080"/>
+                </a:solidFill>
+                <a:latin typeface="Consolas"/>
+              </a:rPr>
+              <a:t>error</a:t>
+            </a:r>
+            <a:r>
+              <a:rPr lang="it-IT" dirty="0">
+                <a:solidFill>
+                  <a:srgbClr val="000000"/>
+                </a:solidFill>
+                <a:latin typeface="Consolas"/>
+              </a:rPr>
+              <a:t>)))</a:t>
+            </a:r>
+          </a:p>
+          <a:p>
+            <a:r>
+              <a:rPr lang="it-IT" dirty="0" smtClean="0">
+                <a:solidFill>
+                  <a:srgbClr val="000000"/>
+                </a:solidFill>
+                <a:latin typeface="Consolas"/>
+              </a:rPr>
+              <a:t>    );</a:t>
+            </a:r>
+            <a:endParaRPr lang="it-IT" dirty="0">
+              <a:solidFill>
+                <a:srgbClr val="000000"/>
+              </a:solidFill>
+              <a:latin typeface="Consolas"/>
+            </a:endParaRPr>
+          </a:p>
+          <a:p>
+            <a:r>
+              <a:rPr lang="it-IT" dirty="0" smtClean="0">
+                <a:solidFill>
+                  <a:srgbClr val="000000"/>
+                </a:solidFill>
+                <a:latin typeface="Consolas"/>
+              </a:rPr>
+              <a:t>  })</a:t>
+            </a:r>
+            <a:endParaRPr lang="it-IT" dirty="0">
+              <a:solidFill>
+                <a:srgbClr val="000000"/>
+              </a:solidFill>
+              <a:latin typeface="Consolas"/>
+            </a:endParaRPr>
+          </a:p>
+          <a:p>
+            <a:r>
+              <a:rPr lang="it-IT" dirty="0">
+                <a:solidFill>
+                  <a:srgbClr val="000000"/>
+                </a:solidFill>
+                <a:latin typeface="Consolas"/>
+              </a:rPr>
+              <a:t>);</a:t>
+            </a:r>
+          </a:p>
+          <a:p>
+            <a:endParaRPr lang="it-IT" dirty="0"/>
+          </a:p>
+        </p:txBody>
+      </p:sp>
+      <p:sp>
+        <p:nvSpPr>
+          <p:cNvPr id="4" name="Rettangolo 3"/>
+          <p:cNvSpPr/>
+          <p:nvPr/>
+        </p:nvSpPr>
+        <p:spPr>
+          <a:xfrm>
+            <a:off x="1606550" y="2762250"/>
+            <a:ext cx="5524500" cy="400050"/>
+          </a:xfrm>
+          <a:prstGeom prst="rect">
+            <a:avLst/>
+          </a:prstGeom>
+          <a:noFill/>
+          <a:ln>
+            <a:solidFill>
+              <a:srgbClr val="FF0000"/>
+            </a:solidFill>
+          </a:ln>
+        </p:spPr>
+        <p:style>
+          <a:lnRef idx="2">
+            <a:schemeClr val="dk1"/>
+          </a:lnRef>
+          <a:fillRef idx="1">
+            <a:schemeClr val="lt1"/>
+          </a:fillRef>
+          <a:effectRef idx="0">
+            <a:schemeClr val="dk1"/>
+          </a:effectRef>
+          <a:fontRef idx="minor">
+            <a:schemeClr val="dk1"/>
+          </a:fontRef>
+        </p:style>
+        <p:txBody>
+          <a:bodyPr rtlCol="0" anchor="ctr"/>
+          <a:lstStyle/>
+          <a:p>
+            <a:pPr algn="ctr"/>
+            <a:endParaRPr lang="it-IT"/>
+          </a:p>
+        </p:txBody>
+      </p:sp>
+      <p:sp>
+        <p:nvSpPr>
+          <p:cNvPr id="5" name="Rettangolo 4"/>
+          <p:cNvSpPr/>
+          <p:nvPr/>
+        </p:nvSpPr>
+        <p:spPr>
+          <a:xfrm>
+            <a:off x="2692400" y="3473450"/>
+            <a:ext cx="6667500" cy="400050"/>
+          </a:xfrm>
+          <a:prstGeom prst="rect">
+            <a:avLst/>
+          </a:prstGeom>
+          <a:noFill/>
+          <a:ln>
+            <a:solidFill>
+              <a:srgbClr val="FF0000"/>
+            </a:solidFill>
+          </a:ln>
+        </p:spPr>
+        <p:style>
+          <a:lnRef idx="2">
+            <a:schemeClr val="dk1"/>
+          </a:lnRef>
+          <a:fillRef idx="1">
+            <a:schemeClr val="lt1"/>
+          </a:fillRef>
+          <a:effectRef idx="0">
+            <a:schemeClr val="dk1"/>
+          </a:effectRef>
+          <a:fontRef idx="minor">
+            <a:schemeClr val="dk1"/>
+          </a:fontRef>
+        </p:style>
+        <p:txBody>
+          <a:bodyPr rtlCol="0" anchor="ctr"/>
+          <a:lstStyle/>
+          <a:p>
+            <a:pPr algn="ctr"/>
+            <a:endParaRPr lang="it-IT"/>
+          </a:p>
+        </p:txBody>
+      </p:sp>
+      <p:sp>
+        <p:nvSpPr>
+          <p:cNvPr id="6" name="Rettangolo 5"/>
+          <p:cNvSpPr/>
+          <p:nvPr/>
+        </p:nvSpPr>
+        <p:spPr>
+          <a:xfrm>
+            <a:off x="1974850" y="4197350"/>
+            <a:ext cx="9207500" cy="400050"/>
+          </a:xfrm>
+          <a:prstGeom prst="rect">
+            <a:avLst/>
+          </a:prstGeom>
+          <a:noFill/>
+          <a:ln>
+            <a:solidFill>
+              <a:srgbClr val="FF0000"/>
+            </a:solidFill>
+          </a:ln>
+        </p:spPr>
+        <p:style>
+          <a:lnRef idx="2">
+            <a:schemeClr val="dk1"/>
+          </a:lnRef>
+          <a:fillRef idx="1">
+            <a:schemeClr val="lt1"/>
+          </a:fillRef>
+          <a:effectRef idx="0">
+            <a:schemeClr val="dk1"/>
+          </a:effectRef>
+          <a:fontRef idx="minor">
+            <a:schemeClr val="dk1"/>
+          </a:fontRef>
+        </p:style>
+        <p:txBody>
+          <a:bodyPr rtlCol="0" anchor="ctr"/>
+          <a:lstStyle/>
+          <a:p>
+            <a:pPr algn="ctr"/>
+            <a:endParaRPr lang="it-IT"/>
+          </a:p>
+        </p:txBody>
+      </p:sp>
+      <p:sp>
+        <p:nvSpPr>
+          <p:cNvPr id="7" name="Rettangolo 6"/>
+          <p:cNvSpPr/>
+          <p:nvPr/>
+        </p:nvSpPr>
+        <p:spPr>
+          <a:xfrm>
+            <a:off x="1606550" y="3162300"/>
+            <a:ext cx="1085850" cy="400050"/>
+          </a:xfrm>
+          <a:prstGeom prst="rect">
+            <a:avLst/>
+          </a:prstGeom>
+          <a:noFill/>
+          <a:ln>
+            <a:solidFill>
+              <a:srgbClr val="FF0000"/>
+            </a:solidFill>
+          </a:ln>
+        </p:spPr>
+        <p:style>
+          <a:lnRef idx="2">
+            <a:schemeClr val="dk1"/>
+          </a:lnRef>
+          <a:fillRef idx="1">
+            <a:schemeClr val="lt1"/>
+          </a:fillRef>
+          <a:effectRef idx="0">
+            <a:schemeClr val="dk1"/>
+          </a:effectRef>
+          <a:fontRef idx="minor">
+            <a:schemeClr val="dk1"/>
+          </a:fontRef>
+        </p:style>
+        <p:txBody>
+          <a:bodyPr rtlCol="0" anchor="ctr"/>
+          <a:lstStyle/>
+          <a:p>
+            <a:pPr algn="ctr"/>
             <a:endParaRPr lang="it-IT"/>
           </a:p>
         </p:txBody>
@@ -17085,7 +18574,7 @@
     </p:spTree>
     <p:extLst>
       <p:ext uri="{BB962C8B-B14F-4D97-AF65-F5344CB8AC3E}">
-        <p14:creationId xmlns:p14="http://schemas.microsoft.com/office/powerpoint/2010/main" val="268254844"/>
+        <p14:creationId xmlns:p14="http://schemas.microsoft.com/office/powerpoint/2010/main" val="337052268"/>
       </p:ext>
     </p:extLst>
   </p:cSld>
@@ -17095,9 +18584,358 @@
   <p:timing>
     <p:tnLst>
       <p:par>
-        <p:cTn id="1" dur="indefinite" restart="never" nodeType="tmRoot"/>
+        <p:cTn id="1" dur="indefinite" restart="never" nodeType="tmRoot">
+          <p:childTnLst>
+            <p:seq concurrent="1" nextAc="seek">
+              <p:cTn id="2" dur="indefinite" nodeType="mainSeq">
+                <p:childTnLst>
+                  <p:par>
+                    <p:cTn id="3" fill="hold">
+                      <p:stCondLst>
+                        <p:cond delay="indefinite"/>
+                      </p:stCondLst>
+                      <p:childTnLst>
+                        <p:par>
+                          <p:cTn id="4" fill="hold">
+                            <p:stCondLst>
+                              <p:cond delay="0"/>
+                            </p:stCondLst>
+                            <p:childTnLst>
+                              <p:par>
+                                <p:cTn id="5" presetID="10" presetClass="entr" presetSubtype="0" fill="hold" grpId="0" nodeType="clickEffect">
+                                  <p:stCondLst>
+                                    <p:cond delay="0"/>
+                                  </p:stCondLst>
+                                  <p:childTnLst>
+                                    <p:set>
+                                      <p:cBhvr>
+                                        <p:cTn id="6" dur="1" fill="hold">
+                                          <p:stCondLst>
+                                            <p:cond delay="0"/>
+                                          </p:stCondLst>
+                                        </p:cTn>
+                                        <p:tgtEl>
+                                          <p:spTgt spid="4"/>
+                                        </p:tgtEl>
+                                        <p:attrNameLst>
+                                          <p:attrName>style.visibility</p:attrName>
+                                        </p:attrNameLst>
+                                      </p:cBhvr>
+                                      <p:to>
+                                        <p:strVal val="visible"/>
+                                      </p:to>
+                                    </p:set>
+                                    <p:animEffect transition="in" filter="fade">
+                                      <p:cBhvr>
+                                        <p:cTn id="7" dur="500"/>
+                                        <p:tgtEl>
+                                          <p:spTgt spid="4"/>
+                                        </p:tgtEl>
+                                      </p:cBhvr>
+                                    </p:animEffect>
+                                  </p:childTnLst>
+                                </p:cTn>
+                              </p:par>
+                            </p:childTnLst>
+                          </p:cTn>
+                        </p:par>
+                      </p:childTnLst>
+                    </p:cTn>
+                  </p:par>
+                  <p:par>
+                    <p:cTn id="8" fill="hold">
+                      <p:stCondLst>
+                        <p:cond delay="indefinite"/>
+                      </p:stCondLst>
+                      <p:childTnLst>
+                        <p:par>
+                          <p:cTn id="9" fill="hold">
+                            <p:stCondLst>
+                              <p:cond delay="0"/>
+                            </p:stCondLst>
+                            <p:childTnLst>
+                              <p:par>
+                                <p:cTn id="10" presetID="10" presetClass="exit" presetSubtype="0" fill="hold" grpId="2" nodeType="clickEffect">
+                                  <p:stCondLst>
+                                    <p:cond delay="0"/>
+                                  </p:stCondLst>
+                                  <p:childTnLst>
+                                    <p:animEffect transition="out" filter="fade">
+                                      <p:cBhvr>
+                                        <p:cTn id="11" dur="500"/>
+                                        <p:tgtEl>
+                                          <p:spTgt spid="4"/>
+                                        </p:tgtEl>
+                                      </p:cBhvr>
+                                    </p:animEffect>
+                                    <p:set>
+                                      <p:cBhvr>
+                                        <p:cTn id="12" dur="1" fill="hold">
+                                          <p:stCondLst>
+                                            <p:cond delay="499"/>
+                                          </p:stCondLst>
+                                        </p:cTn>
+                                        <p:tgtEl>
+                                          <p:spTgt spid="4"/>
+                                        </p:tgtEl>
+                                        <p:attrNameLst>
+                                          <p:attrName>style.visibility</p:attrName>
+                                        </p:attrNameLst>
+                                      </p:cBhvr>
+                                      <p:to>
+                                        <p:strVal val="hidden"/>
+                                      </p:to>
+                                    </p:set>
+                                  </p:childTnLst>
+                                </p:cTn>
+                              </p:par>
+                              <p:par>
+                                <p:cTn id="13" presetID="10" presetClass="entr" presetSubtype="0" fill="hold" grpId="0" nodeType="withEffect">
+                                  <p:stCondLst>
+                                    <p:cond delay="0"/>
+                                  </p:stCondLst>
+                                  <p:childTnLst>
+                                    <p:set>
+                                      <p:cBhvr>
+                                        <p:cTn id="14" dur="1" fill="hold">
+                                          <p:stCondLst>
+                                            <p:cond delay="0"/>
+                                          </p:stCondLst>
+                                        </p:cTn>
+                                        <p:tgtEl>
+                                          <p:spTgt spid="5"/>
+                                        </p:tgtEl>
+                                        <p:attrNameLst>
+                                          <p:attrName>style.visibility</p:attrName>
+                                        </p:attrNameLst>
+                                      </p:cBhvr>
+                                      <p:to>
+                                        <p:strVal val="visible"/>
+                                      </p:to>
+                                    </p:set>
+                                    <p:animEffect transition="in" filter="fade">
+                                      <p:cBhvr>
+                                        <p:cTn id="15" dur="500"/>
+                                        <p:tgtEl>
+                                          <p:spTgt spid="5"/>
+                                        </p:tgtEl>
+                                      </p:cBhvr>
+                                    </p:animEffect>
+                                  </p:childTnLst>
+                                </p:cTn>
+                              </p:par>
+                            </p:childTnLst>
+                          </p:cTn>
+                        </p:par>
+                      </p:childTnLst>
+                    </p:cTn>
+                  </p:par>
+                  <p:par>
+                    <p:cTn id="16" fill="hold">
+                      <p:stCondLst>
+                        <p:cond delay="indefinite"/>
+                      </p:stCondLst>
+                      <p:childTnLst>
+                        <p:par>
+                          <p:cTn id="17" fill="hold">
+                            <p:stCondLst>
+                              <p:cond delay="0"/>
+                            </p:stCondLst>
+                            <p:childTnLst>
+                              <p:par>
+                                <p:cTn id="18" presetID="10" presetClass="exit" presetSubtype="0" fill="hold" grpId="1" nodeType="clickEffect">
+                                  <p:stCondLst>
+                                    <p:cond delay="0"/>
+                                  </p:stCondLst>
+                                  <p:childTnLst>
+                                    <p:animEffect transition="out" filter="fade">
+                                      <p:cBhvr>
+                                        <p:cTn id="19" dur="500"/>
+                                        <p:tgtEl>
+                                          <p:spTgt spid="5"/>
+                                        </p:tgtEl>
+                                      </p:cBhvr>
+                                    </p:animEffect>
+                                    <p:set>
+                                      <p:cBhvr>
+                                        <p:cTn id="20" dur="1" fill="hold">
+                                          <p:stCondLst>
+                                            <p:cond delay="499"/>
+                                          </p:stCondLst>
+                                        </p:cTn>
+                                        <p:tgtEl>
+                                          <p:spTgt spid="5"/>
+                                        </p:tgtEl>
+                                        <p:attrNameLst>
+                                          <p:attrName>style.visibility</p:attrName>
+                                        </p:attrNameLst>
+                                      </p:cBhvr>
+                                      <p:to>
+                                        <p:strVal val="hidden"/>
+                                      </p:to>
+                                    </p:set>
+                                  </p:childTnLst>
+                                </p:cTn>
+                              </p:par>
+                              <p:par>
+                                <p:cTn id="21" presetID="10" presetClass="entr" presetSubtype="0" fill="hold" grpId="0" nodeType="withEffect">
+                                  <p:stCondLst>
+                                    <p:cond delay="0"/>
+                                  </p:stCondLst>
+                                  <p:childTnLst>
+                                    <p:set>
+                                      <p:cBhvr>
+                                        <p:cTn id="22" dur="1" fill="hold">
+                                          <p:stCondLst>
+                                            <p:cond delay="0"/>
+                                          </p:stCondLst>
+                                        </p:cTn>
+                                        <p:tgtEl>
+                                          <p:spTgt spid="6"/>
+                                        </p:tgtEl>
+                                        <p:attrNameLst>
+                                          <p:attrName>style.visibility</p:attrName>
+                                        </p:attrNameLst>
+                                      </p:cBhvr>
+                                      <p:to>
+                                        <p:strVal val="visible"/>
+                                      </p:to>
+                                    </p:set>
+                                    <p:animEffect transition="in" filter="fade">
+                                      <p:cBhvr>
+                                        <p:cTn id="23" dur="500"/>
+                                        <p:tgtEl>
+                                          <p:spTgt spid="6"/>
+                                        </p:tgtEl>
+                                      </p:cBhvr>
+                                    </p:animEffect>
+                                  </p:childTnLst>
+                                </p:cTn>
+                              </p:par>
+                            </p:childTnLst>
+                          </p:cTn>
+                        </p:par>
+                      </p:childTnLst>
+                    </p:cTn>
+                  </p:par>
+                  <p:par>
+                    <p:cTn id="24" fill="hold">
+                      <p:stCondLst>
+                        <p:cond delay="indefinite"/>
+                      </p:stCondLst>
+                      <p:childTnLst>
+                        <p:par>
+                          <p:cTn id="25" fill="hold">
+                            <p:stCondLst>
+                              <p:cond delay="0"/>
+                            </p:stCondLst>
+                            <p:childTnLst>
+                              <p:par>
+                                <p:cTn id="26" presetID="10" presetClass="exit" presetSubtype="0" fill="hold" grpId="1" nodeType="clickEffect">
+                                  <p:stCondLst>
+                                    <p:cond delay="0"/>
+                                  </p:stCondLst>
+                                  <p:childTnLst>
+                                    <p:animEffect transition="out" filter="fade">
+                                      <p:cBhvr>
+                                        <p:cTn id="27" dur="500"/>
+                                        <p:tgtEl>
+                                          <p:spTgt spid="6"/>
+                                        </p:tgtEl>
+                                      </p:cBhvr>
+                                    </p:animEffect>
+                                    <p:set>
+                                      <p:cBhvr>
+                                        <p:cTn id="28" dur="1" fill="hold">
+                                          <p:stCondLst>
+                                            <p:cond delay="499"/>
+                                          </p:stCondLst>
+                                        </p:cTn>
+                                        <p:tgtEl>
+                                          <p:spTgt spid="6"/>
+                                        </p:tgtEl>
+                                        <p:attrNameLst>
+                                          <p:attrName>style.visibility</p:attrName>
+                                        </p:attrNameLst>
+                                      </p:cBhvr>
+                                      <p:to>
+                                        <p:strVal val="hidden"/>
+                                      </p:to>
+                                    </p:set>
+                                  </p:childTnLst>
+                                </p:cTn>
+                              </p:par>
+                              <p:par>
+                                <p:cTn id="29" presetID="10" presetClass="entr" presetSubtype="0" fill="hold" grpId="0" nodeType="withEffect">
+                                  <p:stCondLst>
+                                    <p:cond delay="0"/>
+                                  </p:stCondLst>
+                                  <p:childTnLst>
+                                    <p:set>
+                                      <p:cBhvr>
+                                        <p:cTn id="30" dur="1" fill="hold">
+                                          <p:stCondLst>
+                                            <p:cond delay="0"/>
+                                          </p:stCondLst>
+                                        </p:cTn>
+                                        <p:tgtEl>
+                                          <p:spTgt spid="7"/>
+                                        </p:tgtEl>
+                                        <p:attrNameLst>
+                                          <p:attrName>style.visibility</p:attrName>
+                                        </p:attrNameLst>
+                                      </p:cBhvr>
+                                      <p:to>
+                                        <p:strVal val="visible"/>
+                                      </p:to>
+                                    </p:set>
+                                    <p:animEffect transition="in" filter="fade">
+                                      <p:cBhvr>
+                                        <p:cTn id="31" dur="500"/>
+                                        <p:tgtEl>
+                                          <p:spTgt spid="7"/>
+                                        </p:tgtEl>
+                                      </p:cBhvr>
+                                    </p:animEffect>
+                                  </p:childTnLst>
+                                </p:cTn>
+                              </p:par>
+                            </p:childTnLst>
+                          </p:cTn>
+                        </p:par>
+                      </p:childTnLst>
+                    </p:cTn>
+                  </p:par>
+                </p:childTnLst>
+              </p:cTn>
+              <p:prevCondLst>
+                <p:cond evt="onPrev" delay="0">
+                  <p:tgtEl>
+                    <p:sldTgt/>
+                  </p:tgtEl>
+                </p:cond>
+              </p:prevCondLst>
+              <p:nextCondLst>
+                <p:cond evt="onNext" delay="0">
+                  <p:tgtEl>
+                    <p:sldTgt/>
+                  </p:tgtEl>
+                </p:cond>
+              </p:nextCondLst>
+            </p:seq>
+          </p:childTnLst>
+        </p:cTn>
       </p:par>
     </p:tnLst>
+    <p:bldLst>
+      <p:bldP spid="4" grpId="0" animBg="1"/>
+      <p:bldP spid="4" grpId="2" animBg="1"/>
+      <p:bldP spid="5" grpId="0" animBg="1"/>
+      <p:bldP spid="5" grpId="1" animBg="1"/>
+      <p:bldP spid="6" grpId="0" animBg="1"/>
+      <p:bldP spid="6" grpId="1" animBg="1"/>
+      <p:bldP spid="7" grpId="0" animBg="1"/>
+    </p:bldLst>
   </p:timing>
 </p:sld>
 </file>
@@ -17121,7 +18959,7 @@
       </p:grpSpPr>
       <p:sp>
         <p:nvSpPr>
-          <p:cNvPr id="4" name="Titolo 3"/>
+          <p:cNvPr id="2" name="Titolo 1"/>
           <p:cNvSpPr>
             <a:spLocks noGrp="1"/>
           </p:cNvSpPr>
@@ -17136,15 +18974,31 @@
           <a:p>
             <a:r>
               <a:rPr lang="it-IT" dirty="0" err="1" smtClean="0"/>
-              <a:t>ngrx</a:t>
+              <a:t>RxJS</a:t>
             </a:r>
             <a:r>
               <a:rPr lang="it-IT" dirty="0" smtClean="0"/>
-              <a:t>/</a:t>
+              <a:t>: </a:t>
             </a:r>
             <a:r>
               <a:rPr lang="it-IT" dirty="0" err="1" smtClean="0"/>
-              <a:t>store-devtools</a:t>
+              <a:t>chose</a:t>
+            </a:r>
+            <a:r>
+              <a:rPr lang="it-IT" dirty="0" smtClean="0"/>
+              <a:t> the </a:t>
+            </a:r>
+            <a:r>
+              <a:rPr lang="it-IT" dirty="0" err="1" smtClean="0"/>
+              <a:t>operators</a:t>
+            </a:r>
+            <a:r>
+              <a:rPr lang="it-IT" dirty="0" smtClean="0"/>
+              <a:t> </a:t>
+            </a:r>
+            <a:r>
+              <a:rPr lang="it-IT" dirty="0" err="1" smtClean="0"/>
+              <a:t>wisely</a:t>
             </a:r>
             <a:endParaRPr lang="it-IT" dirty="0"/>
           </a:p>
@@ -17152,7 +19006,7 @@
       </p:sp>
       <p:sp>
         <p:nvSpPr>
-          <p:cNvPr id="5" name="Segnaposto contenuto 4"/>
+          <p:cNvPr id="3" name="Segnaposto contenuto 2"/>
           <p:cNvSpPr>
             <a:spLocks noGrp="1"/>
           </p:cNvSpPr>
@@ -17160,120 +19014,527 @@
             <p:ph idx="1"/>
           </p:nvPr>
         </p:nvSpPr>
-        <p:spPr>
-          <a:xfrm>
-            <a:off x="7829550" y="1845734"/>
-            <a:ext cx="3326130" cy="4023360"/>
-          </a:xfrm>
-        </p:spPr>
+        <p:spPr/>
         <p:txBody>
-          <a:bodyPr/>
+          <a:bodyPr>
+            <a:normAutofit/>
+          </a:bodyPr>
           <a:lstStyle/>
           <a:p>
-            <a:r>
-              <a:rPr lang="en-US" dirty="0" smtClean="0"/>
-              <a:t>Store-</a:t>
-            </a:r>
-            <a:r>
-              <a:rPr lang="en-US" dirty="0" err="1" smtClean="0"/>
-              <a:t>DevTools</a:t>
-            </a:r>
-            <a:r>
-              <a:rPr lang="en-US" dirty="0" smtClean="0"/>
+            <a:endParaRPr lang="it-IT" dirty="0" smtClean="0"/>
+          </a:p>
+          <a:p>
+            <a:pPr>
+              <a:buFont typeface="Arial" panose="020B0604020202020204" pitchFamily="34" charset="0"/>
+              <a:buChar char="•"/>
+            </a:pPr>
+            <a:r>
+              <a:rPr lang="it-IT" b="1" dirty="0" err="1">
+                <a:solidFill>
+                  <a:srgbClr val="0070C0"/>
+                </a:solidFill>
+              </a:rPr>
+              <a:t>switchMap</a:t>
+            </a:r>
+            <a:r>
+              <a:rPr lang="it-IT" dirty="0"/>
+              <a:t>: </a:t>
+            </a:r>
+            <a:r>
+              <a:rPr lang="it-IT" dirty="0" err="1" smtClean="0"/>
+              <a:t>runs</a:t>
+            </a:r>
+            <a:r>
+              <a:rPr lang="it-IT" dirty="0" smtClean="0"/>
+              <a:t> multiple </a:t>
+            </a:r>
+            <a:r>
+              <a:rPr lang="it-IT" dirty="0" err="1"/>
+              <a:t>requests</a:t>
+            </a:r>
+            <a:r>
+              <a:rPr lang="it-IT" dirty="0"/>
+              <a:t>, the new </a:t>
+            </a:r>
+            <a:r>
+              <a:rPr lang="it-IT" dirty="0" err="1"/>
+              <a:t>request</a:t>
+            </a:r>
+            <a:r>
+              <a:rPr lang="it-IT" dirty="0"/>
               <a:t> </a:t>
             </a:r>
             <a:r>
-              <a:rPr lang="en-US" dirty="0"/>
-              <a:t>is an </a:t>
-            </a:r>
-            <a:r>
-              <a:rPr lang="en-US" dirty="0">
+              <a:rPr lang="it-IT" dirty="0" err="1"/>
+              <a:t>cancels</a:t>
+            </a:r>
+            <a:r>
+              <a:rPr lang="it-IT" dirty="0"/>
+              <a:t> the </a:t>
+            </a:r>
+            <a:r>
+              <a:rPr lang="it-IT" dirty="0" err="1" smtClean="0"/>
+              <a:t>previous</a:t>
+            </a:r>
+            <a:r>
+              <a:rPr lang="it-IT" dirty="0" smtClean="0"/>
+              <a:t>. </a:t>
+            </a:r>
+            <a:br>
+              <a:rPr lang="it-IT" dirty="0" smtClean="0"/>
+            </a:br>
+            <a:r>
+              <a:rPr lang="it-IT" b="1" dirty="0" smtClean="0"/>
+              <a:t>Can </a:t>
+            </a:r>
+            <a:r>
+              <a:rPr lang="it-IT" b="1" dirty="0"/>
+              <a:t>be </a:t>
+            </a:r>
+            <a:r>
+              <a:rPr lang="it-IT" b="1" dirty="0" err="1"/>
+              <a:t>used</a:t>
+            </a:r>
+            <a:r>
+              <a:rPr lang="it-IT" b="1" dirty="0"/>
+              <a:t> in </a:t>
+            </a:r>
+            <a:r>
+              <a:rPr lang="it-IT" b="1" dirty="0" err="1">
                 <a:solidFill>
                   <a:srgbClr val="0070C0"/>
                 </a:solidFill>
               </a:rPr>
-              <a:t>instrumentation library </a:t>
-            </a:r>
-            <a:r>
-              <a:rPr lang="en-US" dirty="0"/>
-              <a:t>that enables a powerful </a:t>
-            </a:r>
-            <a:r>
-              <a:rPr lang="en-US" dirty="0">
+              <a:t>get</a:t>
+            </a:r>
+            <a:r>
+              <a:rPr lang="it-IT" b="1" dirty="0">
                 <a:solidFill>
                   <a:srgbClr val="0070C0"/>
                 </a:solidFill>
               </a:rPr>
-              <a:t>time-travelling debugger</a:t>
-            </a:r>
-            <a:r>
-              <a:rPr lang="en-US" dirty="0"/>
+              <a:t> </a:t>
+            </a:r>
+            <a:r>
+              <a:rPr lang="it-IT" b="1" dirty="0" err="1"/>
+              <a:t>requests</a:t>
+            </a:r>
+            <a:r>
+              <a:rPr lang="it-IT" b="1" dirty="0"/>
+              <a:t> or </a:t>
+            </a:r>
+            <a:r>
+              <a:rPr lang="it-IT" b="1" dirty="0" err="1"/>
+              <a:t>cancelable</a:t>
+            </a:r>
+            <a:r>
+              <a:rPr lang="it-IT" b="1" dirty="0"/>
+              <a:t> </a:t>
+            </a:r>
+            <a:r>
+              <a:rPr lang="it-IT" b="1" dirty="0" err="1"/>
+              <a:t>requests</a:t>
+            </a:r>
+            <a:r>
+              <a:rPr lang="it-IT" b="1" dirty="0"/>
+              <a:t> (li </a:t>
+            </a:r>
+            <a:r>
+              <a:rPr lang="it-IT" b="1" dirty="0" err="1"/>
+              <a:t>searches</a:t>
+            </a:r>
+            <a:r>
+              <a:rPr lang="it-IT" b="1" dirty="0"/>
+              <a:t>).</a:t>
+            </a:r>
+          </a:p>
+          <a:p>
+            <a:pPr>
+              <a:buFont typeface="Arial" panose="020B0604020202020204" pitchFamily="34" charset="0"/>
+              <a:buChar char="•"/>
+            </a:pPr>
+            <a:r>
+              <a:rPr lang="it-IT" b="1" dirty="0" err="1" smtClean="0">
+                <a:solidFill>
+                  <a:srgbClr val="0070C0"/>
+                </a:solidFill>
+              </a:rPr>
+              <a:t>mergeMap</a:t>
+            </a:r>
+            <a:r>
+              <a:rPr lang="it-IT" dirty="0" smtClean="0"/>
+              <a:t>: </a:t>
+            </a:r>
+            <a:r>
+              <a:rPr lang="it-IT" dirty="0" err="1" smtClean="0"/>
+              <a:t>runs</a:t>
+            </a:r>
+            <a:r>
+              <a:rPr lang="it-IT" dirty="0" smtClean="0"/>
+              <a:t> multiple </a:t>
+            </a:r>
+            <a:r>
+              <a:rPr lang="it-IT" dirty="0" err="1" smtClean="0"/>
+              <a:t>requests</a:t>
+            </a:r>
+            <a:r>
+              <a:rPr lang="it-IT" dirty="0" smtClean="0"/>
+              <a:t> in </a:t>
+            </a:r>
+            <a:r>
+              <a:rPr lang="it-IT" dirty="0" err="1" smtClean="0"/>
+              <a:t>parallel</a:t>
+            </a:r>
+            <a:r>
+              <a:rPr lang="it-IT" dirty="0" smtClean="0"/>
+              <a:t> and merge </a:t>
+            </a:r>
+            <a:r>
+              <a:rPr lang="it-IT" dirty="0" err="1" smtClean="0"/>
+              <a:t>their</a:t>
+            </a:r>
+            <a:r>
+              <a:rPr lang="it-IT" dirty="0" smtClean="0"/>
+              <a:t> </a:t>
+            </a:r>
+            <a:r>
+              <a:rPr lang="it-IT" dirty="0" err="1" smtClean="0"/>
+              <a:t>results</a:t>
+            </a:r>
+            <a:r>
+              <a:rPr lang="it-IT" dirty="0" smtClean="0"/>
+              <a:t> in a single </a:t>
+            </a:r>
+            <a:r>
+              <a:rPr lang="it-IT" dirty="0" err="1" smtClean="0"/>
+              <a:t>stream</a:t>
+            </a:r>
+            <a:r>
+              <a:rPr lang="it-IT" dirty="0" smtClean="0"/>
+              <a:t>. </a:t>
+            </a:r>
+            <a:br>
+              <a:rPr lang="it-IT" dirty="0" smtClean="0"/>
+            </a:br>
+            <a:r>
+              <a:rPr lang="it-IT" b="1" dirty="0" err="1" smtClean="0"/>
+              <a:t>It</a:t>
+            </a:r>
+            <a:r>
+              <a:rPr lang="it-IT" b="1" dirty="0" smtClean="0"/>
+              <a:t> </a:t>
+            </a:r>
+            <a:r>
+              <a:rPr lang="it-IT" b="1" dirty="0" err="1" smtClean="0"/>
+              <a:t>does</a:t>
+            </a:r>
+            <a:r>
+              <a:rPr lang="it-IT" b="1" dirty="0" smtClean="0"/>
+              <a:t> </a:t>
+            </a:r>
+            <a:r>
+              <a:rPr lang="it-IT" b="1" dirty="0" err="1" smtClean="0"/>
+              <a:t>not</a:t>
+            </a:r>
+            <a:r>
+              <a:rPr lang="it-IT" b="1" dirty="0" smtClean="0"/>
+              <a:t> </a:t>
+            </a:r>
+            <a:r>
+              <a:rPr lang="it-IT" b="1" dirty="0" err="1" smtClean="0"/>
+              <a:t>guarantees</a:t>
+            </a:r>
+            <a:r>
+              <a:rPr lang="it-IT" b="1" dirty="0" smtClean="0"/>
+              <a:t> </a:t>
+            </a:r>
+            <a:r>
+              <a:rPr lang="it-IT" b="1" dirty="0" err="1" smtClean="0"/>
+              <a:t>ordering</a:t>
+            </a:r>
+            <a:r>
+              <a:rPr lang="it-IT" dirty="0" smtClean="0"/>
+              <a:t>. </a:t>
+            </a:r>
+            <a:r>
+              <a:rPr lang="it-IT" b="1" dirty="0" err="1" smtClean="0"/>
+              <a:t>Better</a:t>
+            </a:r>
+            <a:r>
+              <a:rPr lang="it-IT" b="1" dirty="0" smtClean="0"/>
+              <a:t> </a:t>
+            </a:r>
+            <a:r>
+              <a:rPr lang="it-IT" b="1" dirty="0" err="1" smtClean="0"/>
+              <a:t>suited</a:t>
+            </a:r>
+            <a:r>
+              <a:rPr lang="it-IT" b="1" dirty="0" smtClean="0"/>
+              <a:t> for </a:t>
+            </a:r>
+            <a:r>
+              <a:rPr lang="it-IT" b="1" dirty="0" smtClean="0">
+                <a:solidFill>
+                  <a:srgbClr val="0070C0"/>
+                </a:solidFill>
+              </a:rPr>
+              <a:t>put</a:t>
+            </a:r>
+            <a:r>
+              <a:rPr lang="it-IT" b="1" dirty="0" smtClean="0"/>
+              <a:t>, </a:t>
+            </a:r>
+            <a:r>
+              <a:rPr lang="it-IT" b="1" dirty="0" smtClean="0">
+                <a:solidFill>
+                  <a:srgbClr val="0070C0"/>
+                </a:solidFill>
+              </a:rPr>
+              <a:t>post</a:t>
+            </a:r>
+            <a:r>
+              <a:rPr lang="it-IT" b="1" dirty="0" smtClean="0"/>
+              <a:t>, </a:t>
+            </a:r>
+            <a:r>
+              <a:rPr lang="it-IT" b="1" dirty="0" smtClean="0">
+                <a:solidFill>
+                  <a:srgbClr val="0070C0"/>
+                </a:solidFill>
+              </a:rPr>
+              <a:t>delete</a:t>
+            </a:r>
+            <a:r>
+              <a:rPr lang="it-IT" b="1" dirty="0" smtClean="0"/>
+              <a:t> </a:t>
+            </a:r>
+            <a:r>
+              <a:rPr lang="it-IT" b="1" dirty="0" err="1" smtClean="0"/>
+              <a:t>operations</a:t>
+            </a:r>
+            <a:r>
+              <a:rPr lang="it-IT" b="1" dirty="0" smtClean="0"/>
               <a:t>.</a:t>
             </a:r>
           </a:p>
           <a:p>
-            <a:endParaRPr lang="it-IT" dirty="0"/>
+            <a:pPr>
+              <a:buFont typeface="Arial" panose="020B0604020202020204" pitchFamily="34" charset="0"/>
+              <a:buChar char="•"/>
+            </a:pPr>
+            <a:r>
+              <a:rPr lang="it-IT" b="1" dirty="0" err="1" smtClean="0">
+                <a:solidFill>
+                  <a:srgbClr val="0070C0"/>
+                </a:solidFill>
+              </a:rPr>
+              <a:t>concatMap</a:t>
+            </a:r>
+            <a:r>
+              <a:rPr lang="it-IT" dirty="0" smtClean="0"/>
+              <a:t>: </a:t>
+            </a:r>
+            <a:r>
+              <a:rPr lang="it-IT" dirty="0" err="1" smtClean="0"/>
+              <a:t>runs</a:t>
+            </a:r>
+            <a:r>
+              <a:rPr lang="it-IT" dirty="0" smtClean="0"/>
+              <a:t> the </a:t>
+            </a:r>
+            <a:r>
+              <a:rPr lang="it-IT" dirty="0" err="1" smtClean="0"/>
+              <a:t>requests</a:t>
+            </a:r>
+            <a:r>
+              <a:rPr lang="it-IT" dirty="0" smtClean="0"/>
+              <a:t> </a:t>
+            </a:r>
+            <a:r>
+              <a:rPr lang="it-IT" b="1" dirty="0" smtClean="0"/>
+              <a:t>in </a:t>
+            </a:r>
+            <a:r>
+              <a:rPr lang="it-IT" b="1" dirty="0" err="1" smtClean="0"/>
+              <a:t>order</a:t>
+            </a:r>
+            <a:r>
+              <a:rPr lang="it-IT" b="1" dirty="0" smtClean="0"/>
+              <a:t> </a:t>
+            </a:r>
+            <a:r>
+              <a:rPr lang="it-IT" dirty="0" err="1" smtClean="0"/>
+              <a:t>at</a:t>
+            </a:r>
+            <a:r>
+              <a:rPr lang="it-IT" dirty="0" smtClean="0"/>
+              <a:t> the </a:t>
+            </a:r>
+            <a:r>
+              <a:rPr lang="it-IT" dirty="0" err="1" smtClean="0"/>
+              <a:t>expense</a:t>
+            </a:r>
+            <a:r>
+              <a:rPr lang="it-IT" dirty="0" smtClean="0"/>
+              <a:t> of performance. Use </a:t>
+            </a:r>
+            <a:r>
+              <a:rPr lang="it-IT" dirty="0" err="1" smtClean="0"/>
+              <a:t>only</a:t>
+            </a:r>
+            <a:r>
+              <a:rPr lang="it-IT" dirty="0" smtClean="0"/>
+              <a:t> </a:t>
+            </a:r>
+            <a:r>
+              <a:rPr lang="it-IT" dirty="0" err="1" smtClean="0"/>
+              <a:t>when</a:t>
+            </a:r>
+            <a:r>
+              <a:rPr lang="it-IT" dirty="0" smtClean="0"/>
+              <a:t> the </a:t>
+            </a:r>
+            <a:r>
+              <a:rPr lang="it-IT" dirty="0" err="1" smtClean="0"/>
+              <a:t>order</a:t>
+            </a:r>
+            <a:r>
+              <a:rPr lang="it-IT" dirty="0" smtClean="0"/>
+              <a:t> of </a:t>
+            </a:r>
+            <a:r>
+              <a:rPr lang="it-IT" dirty="0" err="1" smtClean="0"/>
+              <a:t>operations</a:t>
+            </a:r>
+            <a:r>
+              <a:rPr lang="it-IT" dirty="0" smtClean="0"/>
+              <a:t> </a:t>
+            </a:r>
+            <a:r>
+              <a:rPr lang="it-IT" dirty="0" err="1" smtClean="0"/>
+              <a:t>is</a:t>
+            </a:r>
+            <a:r>
+              <a:rPr lang="it-IT" dirty="0" smtClean="0"/>
+              <a:t> </a:t>
+            </a:r>
+            <a:r>
+              <a:rPr lang="it-IT" dirty="0" err="1" smtClean="0"/>
+              <a:t>important</a:t>
+            </a:r>
+            <a:r>
+              <a:rPr lang="it-IT" dirty="0" smtClean="0"/>
+              <a:t>.</a:t>
+            </a:r>
+          </a:p>
+          <a:p>
+            <a:pPr>
+              <a:buFont typeface="Arial" panose="020B0604020202020204" pitchFamily="34" charset="0"/>
+              <a:buChar char="•"/>
+            </a:pPr>
+            <a:r>
+              <a:rPr lang="it-IT" b="1" dirty="0" err="1" smtClean="0">
+                <a:solidFill>
+                  <a:srgbClr val="0070C0"/>
+                </a:solidFill>
+              </a:rPr>
+              <a:t>exhaustMap</a:t>
+            </a:r>
+            <a:r>
+              <a:rPr lang="it-IT" dirty="0" smtClean="0"/>
+              <a:t>: </a:t>
+            </a:r>
+            <a:r>
+              <a:rPr lang="it-IT" b="1" dirty="0" err="1" smtClean="0"/>
+              <a:t>ignore</a:t>
+            </a:r>
+            <a:r>
+              <a:rPr lang="it-IT" b="1" dirty="0" smtClean="0"/>
+              <a:t> </a:t>
+            </a:r>
+            <a:r>
+              <a:rPr lang="it-IT" b="1" dirty="0" err="1" smtClean="0"/>
+              <a:t>all</a:t>
+            </a:r>
+            <a:r>
+              <a:rPr lang="it-IT" dirty="0" smtClean="0"/>
+              <a:t> the </a:t>
+            </a:r>
+            <a:r>
+              <a:rPr lang="it-IT" dirty="0" err="1" smtClean="0"/>
+              <a:t>next</a:t>
+            </a:r>
+            <a:r>
+              <a:rPr lang="it-IT" dirty="0" smtClean="0"/>
+              <a:t> </a:t>
+            </a:r>
+            <a:r>
+              <a:rPr lang="it-IT" dirty="0" err="1" smtClean="0"/>
+              <a:t>requests</a:t>
+            </a:r>
+            <a:r>
+              <a:rPr lang="it-IT" dirty="0" smtClean="0"/>
+              <a:t> </a:t>
+            </a:r>
+            <a:r>
+              <a:rPr lang="it-IT" b="1" dirty="0" err="1" smtClean="0"/>
+              <a:t>until</a:t>
+            </a:r>
+            <a:r>
+              <a:rPr lang="it-IT" b="1" dirty="0" smtClean="0"/>
+              <a:t> the </a:t>
+            </a:r>
+            <a:r>
+              <a:rPr lang="it-IT" b="1" dirty="0" err="1" smtClean="0"/>
+              <a:t>current</a:t>
+            </a:r>
+            <a:r>
+              <a:rPr lang="it-IT" b="1" dirty="0" smtClean="0"/>
+              <a:t> </a:t>
+            </a:r>
+            <a:r>
+              <a:rPr lang="it-IT" b="1" dirty="0" err="1" smtClean="0"/>
+              <a:t>one</a:t>
+            </a:r>
+            <a:r>
+              <a:rPr lang="it-IT" b="1" dirty="0" smtClean="0"/>
+              <a:t> complete</a:t>
+            </a:r>
+            <a:r>
+              <a:rPr lang="it-IT" dirty="0" smtClean="0"/>
+              <a:t>, </a:t>
+            </a:r>
+            <a:r>
+              <a:rPr lang="it-IT" dirty="0" err="1" smtClean="0"/>
+              <a:t>then</a:t>
+            </a:r>
+            <a:r>
+              <a:rPr lang="it-IT" dirty="0" smtClean="0"/>
+              <a:t> a new </a:t>
+            </a:r>
+            <a:r>
+              <a:rPr lang="it-IT" dirty="0" err="1" smtClean="0"/>
+              <a:t>request</a:t>
+            </a:r>
+            <a:r>
+              <a:rPr lang="it-IT" dirty="0" smtClean="0"/>
+              <a:t> can be </a:t>
+            </a:r>
+            <a:r>
+              <a:rPr lang="it-IT" dirty="0" err="1" smtClean="0"/>
+              <a:t>started</a:t>
+            </a:r>
+            <a:r>
+              <a:rPr lang="it-IT" dirty="0" smtClean="0"/>
+              <a:t>.</a:t>
+            </a:r>
           </a:p>
         </p:txBody>
       </p:sp>
-      <p:pic>
-        <p:nvPicPr>
-          <p:cNvPr id="1026" name="Picture 2"/>
-          <p:cNvPicPr>
-            <a:picLocks noChangeAspect="1" noChangeArrowheads="1"/>
-          </p:cNvPicPr>
-          <p:nvPr/>
-        </p:nvPicPr>
-        <p:blipFill>
-          <a:blip r:embed="rId2">
-            <a:extLst>
-              <a:ext uri="{28A0092B-C50C-407E-A947-70E740481C1C}">
-                <a14:useLocalDpi xmlns:a14="http://schemas.microsoft.com/office/drawing/2010/main" val="0"/>
-              </a:ext>
-            </a:extLst>
-          </a:blip>
-          <a:srcRect/>
-          <a:stretch>
-            <a:fillRect/>
-          </a:stretch>
-        </p:blipFill>
-        <p:spPr bwMode="auto">
-          <a:xfrm>
-            <a:off x="1285875" y="1881188"/>
-            <a:ext cx="6457950" cy="4124325"/>
-          </a:xfrm>
-          <a:prstGeom prst="rect">
-            <a:avLst/>
-          </a:prstGeom>
-          <a:noFill/>
-          <a:ln>
-            <a:noFill/>
-          </a:ln>
-          <a:extLst>
-            <a:ext uri="{909E8E84-426E-40DD-AFC4-6F175D3DCCD1}">
-              <a14:hiddenFill xmlns:a14="http://schemas.microsoft.com/office/drawing/2010/main">
-                <a:solidFill>
-                  <a:schemeClr val="accent1"/>
-                </a:solidFill>
-              </a14:hiddenFill>
-            </a:ext>
-            <a:ext uri="{91240B29-F687-4F45-9708-019B960494DF}">
-              <a14:hiddenLine xmlns:a14="http://schemas.microsoft.com/office/drawing/2010/main" w="9525">
-                <a:solidFill>
-                  <a:schemeClr val="tx1"/>
-                </a:solidFill>
-                <a:miter lim="800000"/>
-                <a:headEnd/>
-                <a:tailEnd/>
-              </a14:hiddenLine>
-            </a:ext>
-          </a:extLst>
-        </p:spPr>
-      </p:pic>
     </p:spTree>
     <p:extLst>
       <p:ext uri="{BB962C8B-B14F-4D97-AF65-F5344CB8AC3E}">
-        <p14:creationId xmlns:p14="http://schemas.microsoft.com/office/powerpoint/2010/main" val="2208082617"/>
+        <p14:creationId xmlns:p14="http://schemas.microsoft.com/office/powerpoint/2010/main" val="195356333"/>
       </p:ext>
     </p:extLst>
   </p:cSld>
@@ -17283,7 +19544,274 @@
   <p:timing>
     <p:tnLst>
       <p:par>
-        <p:cTn id="1" dur="indefinite" restart="never" nodeType="tmRoot"/>
+        <p:cTn id="1" dur="indefinite" restart="never" nodeType="tmRoot">
+          <p:childTnLst>
+            <p:seq concurrent="1" nextAc="seek">
+              <p:cTn id="2" dur="indefinite" nodeType="mainSeq">
+                <p:childTnLst>
+                  <p:par>
+                    <p:cTn id="3" fill="hold">
+                      <p:stCondLst>
+                        <p:cond delay="indefinite"/>
+                      </p:stCondLst>
+                      <p:childTnLst>
+                        <p:par>
+                          <p:cTn id="4" fill="hold">
+                            <p:stCondLst>
+                              <p:cond delay="0"/>
+                            </p:stCondLst>
+                            <p:childTnLst>
+                              <p:par>
+                                <p:cTn id="5" presetID="10" presetClass="entr" presetSubtype="0" fill="hold" nodeType="clickEffect">
+                                  <p:stCondLst>
+                                    <p:cond delay="0"/>
+                                  </p:stCondLst>
+                                  <p:childTnLst>
+                                    <p:set>
+                                      <p:cBhvr>
+                                        <p:cTn id="6" dur="1" fill="hold">
+                                          <p:stCondLst>
+                                            <p:cond delay="0"/>
+                                          </p:stCondLst>
+                                        </p:cTn>
+                                        <p:tgtEl>
+                                          <p:spTgt spid="3">
+                                            <p:txEl>
+                                              <p:pRg st="1" end="1"/>
+                                            </p:txEl>
+                                          </p:spTgt>
+                                        </p:tgtEl>
+                                        <p:attrNameLst>
+                                          <p:attrName>style.visibility</p:attrName>
+                                        </p:attrNameLst>
+                                      </p:cBhvr>
+                                      <p:to>
+                                        <p:strVal val="visible"/>
+                                      </p:to>
+                                    </p:set>
+                                    <p:animEffect transition="in" filter="fade">
+                                      <p:cBhvr>
+                                        <p:cTn id="7" dur="500"/>
+                                        <p:tgtEl>
+                                          <p:spTgt spid="3">
+                                            <p:txEl>
+                                              <p:pRg st="1" end="1"/>
+                                            </p:txEl>
+                                          </p:spTgt>
+                                        </p:tgtEl>
+                                      </p:cBhvr>
+                                    </p:animEffect>
+                                  </p:childTnLst>
+                                </p:cTn>
+                              </p:par>
+                            </p:childTnLst>
+                          </p:cTn>
+                        </p:par>
+                      </p:childTnLst>
+                    </p:cTn>
+                  </p:par>
+                  <p:par>
+                    <p:cTn id="8" fill="hold">
+                      <p:stCondLst>
+                        <p:cond delay="indefinite"/>
+                      </p:stCondLst>
+                      <p:childTnLst>
+                        <p:par>
+                          <p:cTn id="9" fill="hold">
+                            <p:stCondLst>
+                              <p:cond delay="0"/>
+                            </p:stCondLst>
+                            <p:childTnLst>
+                              <p:par>
+                                <p:cTn id="10" presetID="10" presetClass="entr" presetSubtype="0" fill="hold" nodeType="clickEffect">
+                                  <p:stCondLst>
+                                    <p:cond delay="0"/>
+                                  </p:stCondLst>
+                                  <p:childTnLst>
+                                    <p:set>
+                                      <p:cBhvr>
+                                        <p:cTn id="11" dur="1" fill="hold">
+                                          <p:stCondLst>
+                                            <p:cond delay="0"/>
+                                          </p:stCondLst>
+                                        </p:cTn>
+                                        <p:tgtEl>
+                                          <p:spTgt spid="3">
+                                            <p:txEl>
+                                              <p:pRg st="2" end="2"/>
+                                            </p:txEl>
+                                          </p:spTgt>
+                                        </p:tgtEl>
+                                        <p:attrNameLst>
+                                          <p:attrName>style.visibility</p:attrName>
+                                        </p:attrNameLst>
+                                      </p:cBhvr>
+                                      <p:to>
+                                        <p:strVal val="visible"/>
+                                      </p:to>
+                                    </p:set>
+                                    <p:animEffect transition="in" filter="fade">
+                                      <p:cBhvr>
+                                        <p:cTn id="12" dur="500"/>
+                                        <p:tgtEl>
+                                          <p:spTgt spid="3">
+                                            <p:txEl>
+                                              <p:pRg st="2" end="2"/>
+                                            </p:txEl>
+                                          </p:spTgt>
+                                        </p:tgtEl>
+                                      </p:cBhvr>
+                                    </p:animEffect>
+                                  </p:childTnLst>
+                                </p:cTn>
+                              </p:par>
+                            </p:childTnLst>
+                          </p:cTn>
+                        </p:par>
+                      </p:childTnLst>
+                    </p:cTn>
+                  </p:par>
+                  <p:par>
+                    <p:cTn id="13" fill="hold">
+                      <p:stCondLst>
+                        <p:cond delay="indefinite"/>
+                      </p:stCondLst>
+                      <p:childTnLst>
+                        <p:par>
+                          <p:cTn id="14" fill="hold">
+                            <p:stCondLst>
+                              <p:cond delay="0"/>
+                            </p:stCondLst>
+                            <p:childTnLst>
+                              <p:par>
+                                <p:cTn id="15" presetID="10" presetClass="entr" presetSubtype="0" fill="hold" nodeType="clickEffect">
+                                  <p:stCondLst>
+                                    <p:cond delay="0"/>
+                                  </p:stCondLst>
+                                  <p:childTnLst>
+                                    <p:set>
+                                      <p:cBhvr>
+                                        <p:cTn id="16" dur="1" fill="hold">
+                                          <p:stCondLst>
+                                            <p:cond delay="0"/>
+                                          </p:stCondLst>
+                                        </p:cTn>
+                                        <p:tgtEl>
+                                          <p:spTgt spid="3">
+                                            <p:txEl>
+                                              <p:pRg st="3" end="3"/>
+                                            </p:txEl>
+                                          </p:spTgt>
+                                        </p:tgtEl>
+                                        <p:attrNameLst>
+                                          <p:attrName>style.visibility</p:attrName>
+                                        </p:attrNameLst>
+                                      </p:cBhvr>
+                                      <p:to>
+                                        <p:strVal val="visible"/>
+                                      </p:to>
+                                    </p:set>
+                                    <p:animEffect transition="in" filter="fade">
+                                      <p:cBhvr>
+                                        <p:cTn id="17" dur="500"/>
+                                        <p:tgtEl>
+                                          <p:spTgt spid="3">
+                                            <p:txEl>
+                                              <p:pRg st="3" end="3"/>
+                                            </p:txEl>
+                                          </p:spTgt>
+                                        </p:tgtEl>
+                                      </p:cBhvr>
+                                    </p:animEffect>
+                                  </p:childTnLst>
+                                </p:cTn>
+                              </p:par>
+                            </p:childTnLst>
+                          </p:cTn>
+                        </p:par>
+                      </p:childTnLst>
+                    </p:cTn>
+                  </p:par>
+                  <p:par>
+                    <p:cTn id="18" fill="hold">
+                      <p:stCondLst>
+                        <p:cond delay="indefinite"/>
+                      </p:stCondLst>
+                      <p:childTnLst>
+                        <p:par>
+                          <p:cTn id="19" fill="hold">
+                            <p:stCondLst>
+                              <p:cond delay="0"/>
+                            </p:stCondLst>
+                            <p:childTnLst>
+                              <p:par>
+                                <p:cTn id="20" presetID="10" presetClass="entr" presetSubtype="0" fill="hold" nodeType="clickEffect">
+                                  <p:stCondLst>
+                                    <p:cond delay="0"/>
+                                  </p:stCondLst>
+                                  <p:childTnLst>
+                                    <p:set>
+                                      <p:cBhvr>
+                                        <p:cTn id="21" dur="1" fill="hold">
+                                          <p:stCondLst>
+                                            <p:cond delay="0"/>
+                                          </p:stCondLst>
+                                        </p:cTn>
+                                        <p:tgtEl>
+                                          <p:spTgt spid="3">
+                                            <p:txEl>
+                                              <p:pRg st="4" end="4"/>
+                                            </p:txEl>
+                                          </p:spTgt>
+                                        </p:tgtEl>
+                                        <p:attrNameLst>
+                                          <p:attrName>style.visibility</p:attrName>
+                                        </p:attrNameLst>
+                                      </p:cBhvr>
+                                      <p:to>
+                                        <p:strVal val="visible"/>
+                                      </p:to>
+                                    </p:set>
+                                    <p:animEffect transition="in" filter="fade">
+                                      <p:cBhvr>
+                                        <p:cTn id="22" dur="500"/>
+                                        <p:tgtEl>
+                                          <p:spTgt spid="3">
+                                            <p:txEl>
+                                              <p:pRg st="4" end="4"/>
+                                            </p:txEl>
+                                          </p:spTgt>
+                                        </p:tgtEl>
+                                      </p:cBhvr>
+                                    </p:animEffect>
+                                  </p:childTnLst>
+                                </p:cTn>
+                              </p:par>
+                            </p:childTnLst>
+                          </p:cTn>
+                        </p:par>
+                      </p:childTnLst>
+                    </p:cTn>
+                  </p:par>
+                </p:childTnLst>
+              </p:cTn>
+              <p:prevCondLst>
+                <p:cond evt="onPrev" delay="0">
+                  <p:tgtEl>
+                    <p:sldTgt/>
+                  </p:tgtEl>
+                </p:cond>
+              </p:prevCondLst>
+              <p:nextCondLst>
+                <p:cond evt="onNext" delay="0">
+                  <p:tgtEl>
+                    <p:sldTgt/>
+                  </p:tgtEl>
+                </p:cond>
+              </p:nextCondLst>
+            </p:seq>
+          </p:childTnLst>
+        </p:cTn>
       </p:par>
     </p:tnLst>
   </p:timing>
@@ -17878,7 +20406,7 @@
       </p:grpSpPr>
       <p:sp>
         <p:nvSpPr>
-          <p:cNvPr id="2" name="Titolo 1"/>
+          <p:cNvPr id="4" name="Titolo 3"/>
           <p:cNvSpPr>
             <a:spLocks noGrp="1"/>
           </p:cNvSpPr>
@@ -17892,8 +20420,12 @@
           <a:lstStyle/>
           <a:p>
             <a:r>
+              <a:rPr lang="it-IT" dirty="0" err="1"/>
+              <a:t>n</a:t>
+            </a:r>
+            <a:r>
               <a:rPr lang="it-IT" dirty="0" err="1" smtClean="0"/>
-              <a:t>ngrx</a:t>
+              <a:t>grx</a:t>
             </a:r>
             <a:r>
               <a:rPr lang="it-IT" dirty="0" smtClean="0"/>
@@ -17902,10 +20434,6 @@
             <a:r>
               <a:rPr lang="it-IT" dirty="0" err="1" smtClean="0"/>
               <a:t>store-devtools</a:t>
-            </a:r>
-            <a:r>
-              <a:rPr lang="it-IT" dirty="0" smtClean="0"/>
-              <a:t> Setup</a:t>
             </a:r>
             <a:endParaRPr lang="it-IT" dirty="0"/>
           </a:p>
@@ -17913,12 +20441,12 @@
       </p:sp>
       <p:sp>
         <p:nvSpPr>
-          <p:cNvPr id="3" name="Segnaposto contenuto 2"/>
+          <p:cNvPr id="5" name="Segnaposto testo 4"/>
           <p:cNvSpPr>
             <a:spLocks noGrp="1"/>
           </p:cNvSpPr>
           <p:nvPr>
-            <p:ph idx="1"/>
+            <p:ph type="body" idx="1"/>
           </p:nvPr>
         </p:nvSpPr>
         <p:spPr/>
@@ -17926,130 +20454,14 @@
           <a:bodyPr/>
           <a:lstStyle/>
           <a:p>
-            <a:endParaRPr lang="it-IT" dirty="0" smtClean="0"/>
-          </a:p>
-          <a:p>
-            <a:r>
-              <a:rPr lang="en-US" dirty="0" err="1">
-                <a:latin typeface="Consolas" panose="020B0609020204030204" pitchFamily="49" charset="0"/>
-              </a:rPr>
-              <a:t>npm</a:t>
-            </a:r>
-            <a:r>
-              <a:rPr lang="en-US" dirty="0">
-                <a:latin typeface="Consolas" panose="020B0609020204030204" pitchFamily="49" charset="0"/>
-              </a:rPr>
-              <a:t> install @</a:t>
-            </a:r>
-            <a:r>
-              <a:rPr lang="en-US" dirty="0" err="1">
-                <a:latin typeface="Consolas" panose="020B0609020204030204" pitchFamily="49" charset="0"/>
-              </a:rPr>
-              <a:t>ngrx</a:t>
-            </a:r>
-            <a:r>
-              <a:rPr lang="en-US" dirty="0">
-                <a:latin typeface="Consolas" panose="020B0609020204030204" pitchFamily="49" charset="0"/>
-              </a:rPr>
-              <a:t>/store-</a:t>
-            </a:r>
-            <a:r>
-              <a:rPr lang="en-US" dirty="0" err="1">
-                <a:latin typeface="Consolas" panose="020B0609020204030204" pitchFamily="49" charset="0"/>
-              </a:rPr>
-              <a:t>devtools</a:t>
-            </a:r>
-            <a:r>
-              <a:rPr lang="en-US" dirty="0">
-                <a:latin typeface="Consolas" panose="020B0609020204030204" pitchFamily="49" charset="0"/>
-              </a:rPr>
-              <a:t> </a:t>
-            </a:r>
-            <a:r>
-              <a:rPr lang="en-US" dirty="0" smtClean="0">
-                <a:latin typeface="Consolas" panose="020B0609020204030204" pitchFamily="49" charset="0"/>
-              </a:rPr>
-              <a:t>–save</a:t>
-            </a:r>
-          </a:p>
-          <a:p>
-            <a:endParaRPr lang="en-US" dirty="0">
-              <a:latin typeface="Consolas" panose="020B0609020204030204" pitchFamily="49" charset="0"/>
-            </a:endParaRPr>
-          </a:p>
-          <a:p>
-            <a:r>
-              <a:rPr lang="en-US" dirty="0"/>
-              <a:t/>
-            </a:r>
-            <a:br>
-              <a:rPr lang="en-US" dirty="0"/>
-            </a:br>
-            <a:r>
-              <a:rPr lang="en-US" dirty="0" smtClean="0"/>
-              <a:t>Install </a:t>
-            </a:r>
-            <a:r>
-              <a:rPr lang="en-US" dirty="0"/>
-              <a:t>the Chrome / Firefox Extension.</a:t>
-            </a:r>
-          </a:p>
-          <a:p>
-            <a:r>
-              <a:rPr lang="en-US" dirty="0"/>
-              <a:t/>
-            </a:r>
-            <a:br>
-              <a:rPr lang="en-US" dirty="0"/>
-            </a:br>
-            <a:r>
-              <a:rPr lang="en-US" dirty="0" smtClean="0"/>
-              <a:t>Redux </a:t>
-            </a:r>
-            <a:r>
-              <a:rPr lang="en-US" dirty="0" err="1"/>
-              <a:t>Devtools</a:t>
-            </a:r>
-            <a:r>
-              <a:rPr lang="en-US" dirty="0"/>
-              <a:t> </a:t>
-            </a:r>
-            <a:r>
-              <a:rPr lang="en-US" dirty="0" smtClean="0"/>
-              <a:t>Extension</a:t>
-            </a:r>
-            <a:br>
-              <a:rPr lang="en-US" dirty="0" smtClean="0"/>
-            </a:br>
-            <a:r>
-              <a:rPr lang="en-US" u="sng" dirty="0" smtClean="0">
-                <a:hlinkClick r:id="rId2"/>
-              </a:rPr>
-              <a:t>https</a:t>
-            </a:r>
-            <a:r>
-              <a:rPr lang="en-US" u="sng" dirty="0">
-                <a:hlinkClick r:id="rId2"/>
-              </a:rPr>
-              <a:t>://github.com/zalmoxisus/redux-devtools-extension</a:t>
-            </a:r>
-            <a:r>
-              <a:rPr lang="en-US" u="sng" dirty="0" smtClean="0">
-                <a:hlinkClick r:id="rId2"/>
-              </a:rPr>
-              <a:t>/</a:t>
-            </a:r>
-            <a:endParaRPr lang="en-US" dirty="0"/>
-          </a:p>
-          <a:p>
-            <a:endParaRPr lang="it-IT" dirty="0"/>
+            <a:endParaRPr lang="it-IT"/>
           </a:p>
         </p:txBody>
       </p:sp>
     </p:spTree>
     <p:extLst>
       <p:ext uri="{BB962C8B-B14F-4D97-AF65-F5344CB8AC3E}">
-        <p14:creationId xmlns:p14="http://schemas.microsoft.com/office/powerpoint/2010/main" val="1804167929"/>
+        <p14:creationId xmlns:p14="http://schemas.microsoft.com/office/powerpoint/2010/main" val="268254844"/>
       </p:ext>
     </p:extLst>
   </p:cSld>
@@ -18085,7 +20497,7 @@
       </p:grpSpPr>
       <p:sp>
         <p:nvSpPr>
-          <p:cNvPr id="2" name="Titolo 1"/>
+          <p:cNvPr id="4" name="Titolo 3"/>
           <p:cNvSpPr>
             <a:spLocks noGrp="1"/>
           </p:cNvSpPr>
@@ -18100,14 +20512,6 @@
           <a:p>
             <a:r>
               <a:rPr lang="it-IT" dirty="0" err="1" smtClean="0"/>
-              <a:t>Configure</a:t>
-            </a:r>
-            <a:r>
-              <a:rPr lang="it-IT" dirty="0" smtClean="0"/>
-              <a:t> </a:t>
-            </a:r>
-            <a:r>
-              <a:rPr lang="it-IT" dirty="0" err="1" smtClean="0"/>
               <a:t>ngrx</a:t>
             </a:r>
             <a:r>
@@ -18124,7 +20528,7 @@
       </p:sp>
       <p:sp>
         <p:nvSpPr>
-          <p:cNvPr id="3" name="Segnaposto contenuto 2"/>
+          <p:cNvPr id="5" name="Segnaposto contenuto 4"/>
           <p:cNvSpPr>
             <a:spLocks noGrp="1"/>
           </p:cNvSpPr>
@@ -18132,280 +20536,120 @@
             <p:ph idx="1"/>
           </p:nvPr>
         </p:nvSpPr>
-        <p:spPr/>
+        <p:spPr>
+          <a:xfrm>
+            <a:off x="7829550" y="1845734"/>
+            <a:ext cx="3326130" cy="4023360"/>
+          </a:xfrm>
+        </p:spPr>
         <p:txBody>
-          <a:bodyPr>
-            <a:normAutofit lnSpcReduction="10000"/>
-          </a:bodyPr>
+          <a:bodyPr/>
           <a:lstStyle/>
           <a:p>
-            <a:endParaRPr lang="it-IT" dirty="0" smtClean="0"/>
-          </a:p>
-          <a:p>
+            <a:r>
+              <a:rPr lang="en-US" dirty="0" smtClean="0"/>
+              <a:t>Store-</a:t>
+            </a:r>
+            <a:r>
+              <a:rPr lang="en-US" dirty="0" err="1" smtClean="0"/>
+              <a:t>DevTools</a:t>
+            </a:r>
+            <a:r>
+              <a:rPr lang="en-US" dirty="0" smtClean="0"/>
+              <a:t> </a:t>
+            </a:r>
             <a:r>
               <a:rPr lang="en-US" dirty="0"/>
-              <a:t>In your </a:t>
-            </a:r>
-            <a:r>
-              <a:rPr lang="en-US" dirty="0" err="1"/>
-              <a:t>AppModule</a:t>
+              <a:t>is an </a:t>
+            </a:r>
+            <a:r>
+              <a:rPr lang="en-US" dirty="0">
+                <a:solidFill>
+                  <a:srgbClr val="0070C0"/>
+                </a:solidFill>
+              </a:rPr>
+              <a:t>instrumentation library </a:t>
             </a:r>
             <a:r>
               <a:rPr lang="en-US" dirty="0"/>
-              <a:t> imports enable the instrumentation using </a:t>
-            </a:r>
-            <a:r>
-              <a:rPr lang="en-US" b="1" dirty="0" err="1" smtClean="0">
+              <a:t>that enables a powerful </a:t>
+            </a:r>
+            <a:r>
+              <a:rPr lang="en-US" dirty="0">
                 <a:solidFill>
                   <a:srgbClr val="0070C0"/>
                 </a:solidFill>
               </a:rPr>
-              <a:t>StoreDevtoolsModule.instrument</a:t>
-            </a:r>
-            <a:r>
-              <a:rPr lang="en-US" b="1" dirty="0" smtClean="0">
-                <a:solidFill>
-                  <a:srgbClr val="0070C0"/>
-                </a:solidFill>
-              </a:rPr>
-              <a:t>({…})</a:t>
-            </a:r>
-            <a:r>
-              <a:rPr lang="en-US" dirty="0" smtClean="0">
-                <a:solidFill>
-                  <a:srgbClr val="0070C0"/>
-                </a:solidFill>
-              </a:rPr>
-              <a:t>:</a:t>
-            </a:r>
-            <a:endParaRPr lang="en-US" dirty="0">
-              <a:solidFill>
-                <a:srgbClr val="0070C0"/>
-              </a:solidFill>
-            </a:endParaRPr>
-          </a:p>
-          <a:p>
-            <a:endParaRPr lang="it-IT" dirty="0" smtClean="0"/>
-          </a:p>
-          <a:p>
-            <a:r>
-              <a:rPr lang="it-IT" dirty="0" err="1">
-                <a:solidFill>
-                  <a:srgbClr val="001080"/>
-                </a:solidFill>
-                <a:latin typeface="Consolas"/>
-              </a:rPr>
-              <a:t>StoreDevtoolsModule</a:t>
-            </a:r>
-            <a:r>
-              <a:rPr lang="it-IT" dirty="0" err="1">
-                <a:solidFill>
-                  <a:srgbClr val="000000"/>
-                </a:solidFill>
-                <a:latin typeface="Consolas"/>
-              </a:rPr>
+              <a:t>time-travelling debugger</a:t>
+            </a:r>
+            <a:r>
+              <a:rPr lang="en-US" dirty="0"/>
               <a:t>.</a:t>
             </a:r>
-            <a:r>
-              <a:rPr lang="it-IT" dirty="0" err="1">
-                <a:solidFill>
-                  <a:srgbClr val="795E26"/>
-                </a:solidFill>
-                <a:latin typeface="Consolas"/>
-              </a:rPr>
-              <a:t>instrument</a:t>
-            </a:r>
-            <a:r>
-              <a:rPr lang="it-IT" dirty="0">
-                <a:solidFill>
-                  <a:srgbClr val="000000"/>
-                </a:solidFill>
-                <a:latin typeface="Consolas"/>
-              </a:rPr>
-              <a:t>({</a:t>
-            </a:r>
-          </a:p>
-          <a:p>
-            <a:r>
-              <a:rPr lang="it-IT" dirty="0" smtClean="0">
-                <a:solidFill>
-                  <a:srgbClr val="001080"/>
-                </a:solidFill>
-                <a:latin typeface="Consolas"/>
-              </a:rPr>
-              <a:t>  </a:t>
-            </a:r>
-            <a:r>
-              <a:rPr lang="it-IT" dirty="0" err="1" smtClean="0">
-                <a:solidFill>
-                  <a:srgbClr val="001080"/>
-                </a:solidFill>
-                <a:latin typeface="Consolas"/>
-              </a:rPr>
-              <a:t>maxAge</a:t>
-            </a:r>
-            <a:r>
-              <a:rPr lang="it-IT" dirty="0">
-                <a:solidFill>
-                  <a:srgbClr val="001080"/>
-                </a:solidFill>
-                <a:latin typeface="Consolas"/>
-              </a:rPr>
-              <a:t>:</a:t>
-            </a:r>
-            <a:r>
-              <a:rPr lang="it-IT" dirty="0">
-                <a:solidFill>
-                  <a:srgbClr val="000000"/>
-                </a:solidFill>
-                <a:latin typeface="Consolas"/>
-              </a:rPr>
-              <a:t> </a:t>
-            </a:r>
-            <a:r>
-              <a:rPr lang="it-IT" dirty="0">
-                <a:solidFill>
-                  <a:srgbClr val="09885A"/>
-                </a:solidFill>
-                <a:latin typeface="Consolas"/>
-              </a:rPr>
-              <a:t>25</a:t>
-            </a:r>
-            <a:r>
-              <a:rPr lang="it-IT" dirty="0">
-                <a:solidFill>
-                  <a:srgbClr val="000000"/>
-                </a:solidFill>
-                <a:latin typeface="Consolas"/>
-              </a:rPr>
-              <a:t>,</a:t>
-            </a:r>
-          </a:p>
-          <a:p>
-            <a:r>
-              <a:rPr lang="it-IT" dirty="0" smtClean="0">
-                <a:solidFill>
-                  <a:srgbClr val="001080"/>
-                </a:solidFill>
-                <a:latin typeface="Consolas"/>
-              </a:rPr>
-              <a:t>  </a:t>
-            </a:r>
-            <a:r>
-              <a:rPr lang="it-IT" dirty="0" err="1" smtClean="0">
-                <a:solidFill>
-                  <a:srgbClr val="001080"/>
-                </a:solidFill>
-                <a:latin typeface="Consolas"/>
-              </a:rPr>
-              <a:t>logOnly</a:t>
-            </a:r>
-            <a:r>
-              <a:rPr lang="it-IT" dirty="0">
-                <a:solidFill>
-                  <a:srgbClr val="001080"/>
-                </a:solidFill>
-                <a:latin typeface="Consolas"/>
-              </a:rPr>
-              <a:t>:</a:t>
-            </a:r>
-            <a:r>
-              <a:rPr lang="it-IT" dirty="0">
-                <a:solidFill>
-                  <a:srgbClr val="000000"/>
-                </a:solidFill>
-                <a:latin typeface="Consolas"/>
-              </a:rPr>
-              <a:t> </a:t>
-            </a:r>
-            <a:r>
-              <a:rPr lang="it-IT" dirty="0" err="1">
-                <a:solidFill>
-                  <a:srgbClr val="001080"/>
-                </a:solidFill>
-                <a:latin typeface="Consolas"/>
-              </a:rPr>
-              <a:t>environment</a:t>
-            </a:r>
-            <a:r>
-              <a:rPr lang="it-IT" dirty="0" err="1">
-                <a:solidFill>
-                  <a:srgbClr val="000000"/>
-                </a:solidFill>
-                <a:latin typeface="Consolas"/>
-              </a:rPr>
-              <a:t>.</a:t>
-            </a:r>
-            <a:r>
-              <a:rPr lang="it-IT" dirty="0" err="1">
-                <a:solidFill>
-                  <a:srgbClr val="001080"/>
-                </a:solidFill>
-                <a:latin typeface="Consolas"/>
-              </a:rPr>
-              <a:t>production</a:t>
-            </a:r>
-            <a:endParaRPr lang="it-IT" dirty="0">
-              <a:solidFill>
-                <a:srgbClr val="000000"/>
-              </a:solidFill>
-              <a:latin typeface="Consolas"/>
-            </a:endParaRPr>
-          </a:p>
-          <a:p>
-            <a:r>
-              <a:rPr lang="it-IT" dirty="0">
-                <a:solidFill>
-                  <a:srgbClr val="000000"/>
-                </a:solidFill>
-                <a:latin typeface="Consolas"/>
-              </a:rPr>
-              <a:t>})</a:t>
-            </a:r>
-          </a:p>
-          <a:p>
-            <a:endParaRPr lang="it-IT" dirty="0" smtClean="0"/>
-          </a:p>
-          <a:p>
-            <a:r>
-              <a:rPr lang="it-IT" dirty="0" err="1" smtClean="0"/>
-              <a:t>Supported</a:t>
-            </a:r>
-            <a:r>
-              <a:rPr lang="it-IT" dirty="0" smtClean="0"/>
-              <a:t> </a:t>
-            </a:r>
-            <a:r>
-              <a:rPr lang="it-IT" dirty="0" err="1" smtClean="0"/>
-              <a:t>instrumentation</a:t>
-            </a:r>
-            <a:r>
-              <a:rPr lang="it-IT" dirty="0" smtClean="0"/>
-              <a:t>: </a:t>
-            </a:r>
-            <a:r>
-              <a:rPr lang="it-IT" u="sng" dirty="0">
-                <a:hlinkClick r:id="rId2"/>
-              </a:rPr>
-              <a:t>https://</a:t>
-            </a:r>
-            <a:r>
-              <a:rPr lang="it-IT" u="sng" dirty="0" smtClean="0">
-                <a:hlinkClick r:id="rId2"/>
-              </a:rPr>
-              <a:t>ngrx.io/guide/store-devtools/config</a:t>
-            </a:r>
-            <a:endParaRPr lang="it-IT" dirty="0" smtClean="0"/>
           </a:p>
           <a:p>
             <a:endParaRPr lang="it-IT" dirty="0"/>
           </a:p>
         </p:txBody>
       </p:sp>
+      <p:pic>
+        <p:nvPicPr>
+          <p:cNvPr id="1026" name="Picture 2"/>
+          <p:cNvPicPr>
+            <a:picLocks noChangeAspect="1" noChangeArrowheads="1"/>
+          </p:cNvPicPr>
+          <p:nvPr/>
+        </p:nvPicPr>
+        <p:blipFill>
+          <a:blip r:embed="rId2">
+            <a:extLst>
+              <a:ext uri="{28A0092B-C50C-407E-A947-70E740481C1C}">
+                <a14:useLocalDpi xmlns:a14="http://schemas.microsoft.com/office/drawing/2010/main" val="0"/>
+              </a:ext>
+            </a:extLst>
+          </a:blip>
+          <a:srcRect/>
+          <a:stretch>
+            <a:fillRect/>
+          </a:stretch>
+        </p:blipFill>
+        <p:spPr bwMode="auto">
+          <a:xfrm>
+            <a:off x="1285875" y="1881188"/>
+            <a:ext cx="6457950" cy="4124325"/>
+          </a:xfrm>
+          <a:prstGeom prst="rect">
+            <a:avLst/>
+          </a:prstGeom>
+          <a:noFill/>
+          <a:ln>
+            <a:noFill/>
+          </a:ln>
+          <a:extLst>
+            <a:ext uri="{909E8E84-426E-40DD-AFC4-6F175D3DCCD1}">
+              <a14:hiddenFill xmlns:a14="http://schemas.microsoft.com/office/drawing/2010/main">
+                <a:solidFill>
+                  <a:schemeClr val="accent1"/>
+                </a:solidFill>
+              </a14:hiddenFill>
+            </a:ext>
+            <a:ext uri="{91240B29-F687-4F45-9708-019B960494DF}">
+              <a14:hiddenLine xmlns:a14="http://schemas.microsoft.com/office/drawing/2010/main" w="9525">
+                <a:solidFill>
+                  <a:schemeClr val="tx1"/>
+                </a:solidFill>
+                <a:miter lim="800000"/>
+                <a:headEnd/>
+                <a:tailEnd/>
+              </a14:hiddenLine>
+            </a:ext>
+          </a:extLst>
+        </p:spPr>
+      </p:pic>
     </p:spTree>
     <p:extLst>
       <p:ext uri="{BB962C8B-B14F-4D97-AF65-F5344CB8AC3E}">
-        <p14:creationId xmlns:p14="http://schemas.microsoft.com/office/powerpoint/2010/main" val="900495042"/>
+        <p14:creationId xmlns:p14="http://schemas.microsoft.com/office/powerpoint/2010/main" val="2208082617"/>
       </p:ext>
     </p:extLst>
   </p:cSld>
@@ -18441,7 +20685,7 @@
       </p:grpSpPr>
       <p:sp>
         <p:nvSpPr>
-          <p:cNvPr id="4" name="Titolo 3"/>
+          <p:cNvPr id="2" name="Titolo 1"/>
           <p:cNvSpPr>
             <a:spLocks noGrp="1"/>
           </p:cNvSpPr>
@@ -18455,24 +20699,20 @@
           <a:lstStyle/>
           <a:p>
             <a:r>
-              <a:rPr lang="it-IT" dirty="0" err="1"/>
-              <a:t>t</a:t>
-            </a:r>
-            <a:r>
               <a:rPr lang="it-IT" dirty="0" err="1" smtClean="0"/>
-              <a:t>here</a:t>
+              <a:t>ngrx</a:t>
             </a:r>
             <a:r>
               <a:rPr lang="it-IT" dirty="0" smtClean="0"/>
-              <a:t> </a:t>
+              <a:t>/</a:t>
             </a:r>
             <a:r>
               <a:rPr lang="it-IT" dirty="0" err="1" smtClean="0"/>
-              <a:t>is</a:t>
+              <a:t>store-devtools</a:t>
             </a:r>
             <a:r>
               <a:rPr lang="it-IT" dirty="0" smtClean="0"/>
-              <a:t> more…</a:t>
+              <a:t> Setup</a:t>
             </a:r>
             <a:endParaRPr lang="it-IT" dirty="0"/>
           </a:p>
@@ -18480,66 +20720,135 @@
       </p:sp>
       <p:sp>
         <p:nvSpPr>
-          <p:cNvPr id="5" name="Segnaposto testo 4"/>
+          <p:cNvPr id="3" name="Segnaposto contenuto 2"/>
           <p:cNvSpPr>
             <a:spLocks noGrp="1"/>
           </p:cNvSpPr>
           <p:nvPr>
-            <p:ph type="body" idx="1"/>
+            <p:ph idx="1"/>
           </p:nvPr>
         </p:nvSpPr>
         <p:spPr/>
         <p:txBody>
-          <a:bodyPr>
-            <a:normAutofit fontScale="85000" lnSpcReduction="20000"/>
-          </a:bodyPr>
+          <a:bodyPr/>
           <a:lstStyle/>
           <a:p>
-            <a:pPr algn="r"/>
-            <a:r>
-              <a:rPr lang="it-IT" dirty="0" err="1" smtClean="0"/>
+            <a:endParaRPr lang="it-IT" dirty="0" smtClean="0"/>
+          </a:p>
+          <a:p>
+            <a:r>
+              <a:rPr lang="en-US" dirty="0" err="1">
+                <a:latin typeface="Consolas" panose="020B0609020204030204" pitchFamily="49" charset="0"/>
+              </a:rPr>
+              <a:t>npm</a:t>
+            </a:r>
+            <a:r>
+              <a:rPr lang="en-US" dirty="0">
+                <a:latin typeface="Consolas" panose="020B0609020204030204" pitchFamily="49" charset="0"/>
+              </a:rPr>
+              <a:t> install @</a:t>
+            </a:r>
+            <a:r>
+              <a:rPr lang="en-US" dirty="0" err="1">
+                <a:latin typeface="Consolas" panose="020B0609020204030204" pitchFamily="49" charset="0"/>
+              </a:rPr>
               <a:t>ngrx</a:t>
             </a:r>
             <a:r>
-              <a:rPr lang="it-IT" dirty="0" smtClean="0"/>
-              <a:t>/router-</a:t>
-            </a:r>
-            <a:r>
-              <a:rPr lang="it-IT" dirty="0" err="1" smtClean="0"/>
-              <a:t>store</a:t>
-            </a:r>
-            <a:endParaRPr lang="it-IT" dirty="0" smtClean="0"/>
-          </a:p>
-          <a:p>
-            <a:pPr algn="r"/>
-            <a:r>
-              <a:rPr lang="it-IT" dirty="0" err="1" smtClean="0"/>
-              <a:t>ngrx</a:t>
-            </a:r>
-            <a:r>
-              <a:rPr lang="it-IT" dirty="0" smtClean="0"/>
+              <a:rPr lang="en-US" dirty="0">
+                <a:latin typeface="Consolas" panose="020B0609020204030204" pitchFamily="49" charset="0"/>
+              </a:rPr>
+              <a:t>/store-</a:t>
+            </a:r>
+            <a:r>
+              <a:rPr lang="en-US" dirty="0" err="1">
+                <a:latin typeface="Consolas" panose="020B0609020204030204" pitchFamily="49" charset="0"/>
+              </a:rPr>
+              <a:t>devtools</a:t>
+            </a:r>
+            <a:r>
+              <a:rPr lang="en-US" dirty="0">
+                <a:latin typeface="Consolas" panose="020B0609020204030204" pitchFamily="49" charset="0"/>
+              </a:rPr>
+              <a:t> </a:t>
+            </a:r>
+            <a:r>
+              <a:rPr lang="en-US" dirty="0" smtClean="0">
+                <a:latin typeface="Consolas" panose="020B0609020204030204" pitchFamily="49" charset="0"/>
+              </a:rPr>
+              <a:t>–save</a:t>
+            </a:r>
+          </a:p>
+          <a:p>
+            <a:endParaRPr lang="en-US" dirty="0">
+              <a:latin typeface="Consolas" panose="020B0609020204030204" pitchFamily="49" charset="0"/>
+            </a:endParaRPr>
+          </a:p>
+          <a:p>
+            <a:r>
+              <a:rPr lang="en-US" dirty="0"/>
+              <a:t/>
+            </a:r>
+            <a:br>
+              <a:rPr lang="en-US" dirty="0"/>
+            </a:br>
+            <a:r>
+              <a:rPr lang="en-US" dirty="0" smtClean="0"/>
+              <a:t>Install </a:t>
+            </a:r>
+            <a:r>
+              <a:rPr lang="en-US" dirty="0"/>
+              <a:t>the Chrome / Firefox Extension.</a:t>
+            </a:r>
+          </a:p>
+          <a:p>
+            <a:r>
+              <a:rPr lang="en-US" dirty="0"/>
+              <a:t/>
+            </a:r>
+            <a:br>
+              <a:rPr lang="en-US" dirty="0"/>
+            </a:br>
+            <a:r>
+              <a:rPr lang="en-US" dirty="0" smtClean="0"/>
+              <a:t>Redux </a:t>
+            </a:r>
+            <a:r>
+              <a:rPr lang="en-US" dirty="0" err="1"/>
+              <a:t>Devtools</a:t>
+            </a:r>
+            <a:r>
+              <a:rPr lang="en-US" dirty="0"/>
+              <a:t> </a:t>
+            </a:r>
+            <a:r>
+              <a:rPr lang="en-US" dirty="0" smtClean="0"/>
+              <a:t>Extension</a:t>
+            </a:r>
+            <a:br>
+              <a:rPr lang="en-US" dirty="0" smtClean="0"/>
+            </a:br>
+            <a:r>
+              <a:rPr lang="en-US" u="sng" dirty="0" smtClean="0">
+                <a:hlinkClick r:id="rId2"/>
+              </a:rPr>
+              <a:t>https</a:t>
+            </a:r>
+            <a:r>
+              <a:rPr lang="en-US" u="sng" dirty="0">
+                <a:hlinkClick r:id="rId2"/>
+              </a:rPr>
+              <a:t>://github.com/zalmoxisus/redux-devtools-extension</a:t>
+            </a:r>
+            <a:r>
+              <a:rPr lang="en-US" u="sng" dirty="0" smtClean="0">
+                <a:hlinkClick r:id="rId2"/>
+              </a:rPr>
               <a:t>/</a:t>
             </a:r>
-            <a:r>
-              <a:rPr lang="it-IT" dirty="0" err="1" smtClean="0"/>
-              <a:t>entity</a:t>
-            </a:r>
-            <a:endParaRPr lang="it-IT" dirty="0" smtClean="0"/>
-          </a:p>
-          <a:p>
-            <a:pPr algn="r"/>
-            <a:r>
-              <a:rPr lang="it-IT" dirty="0" err="1"/>
-              <a:t>ngrx</a:t>
-            </a:r>
-            <a:r>
-              <a:rPr lang="it-IT" dirty="0"/>
-              <a:t>/</a:t>
-            </a:r>
-            <a:r>
-              <a:rPr lang="it-IT" dirty="0" err="1"/>
-              <a:t>schematics</a:t>
-            </a:r>
+            <a:endParaRPr lang="en-US" dirty="0"/>
+          </a:p>
+          <a:p>
             <a:endParaRPr lang="it-IT" dirty="0"/>
           </a:p>
         </p:txBody>
@@ -18547,7 +20856,7 @@
     </p:spTree>
     <p:extLst>
       <p:ext uri="{BB962C8B-B14F-4D97-AF65-F5344CB8AC3E}">
-        <p14:creationId xmlns:p14="http://schemas.microsoft.com/office/powerpoint/2010/main" val="2657137447"/>
+        <p14:creationId xmlns:p14="http://schemas.microsoft.com/office/powerpoint/2010/main" val="1804167929"/>
       </p:ext>
     </p:extLst>
   </p:cSld>
@@ -18593,18 +20902,28 @@
         </p:nvSpPr>
         <p:spPr/>
         <p:txBody>
-          <a:bodyPr>
-            <a:normAutofit/>
-          </a:bodyPr>
+          <a:bodyPr/>
           <a:lstStyle/>
           <a:p>
             <a:r>
+              <a:rPr lang="it-IT" dirty="0" err="1" smtClean="0"/>
+              <a:t>Configure</a:t>
+            </a:r>
+            <a:r>
               <a:rPr lang="it-IT" dirty="0" smtClean="0"/>
-              <a:t>Benefits of </a:t>
+              <a:t> </a:t>
             </a:r>
             <a:r>
               <a:rPr lang="it-IT" dirty="0" err="1" smtClean="0"/>
-              <a:t>NgRx</a:t>
+              <a:t>ngrx</a:t>
+            </a:r>
+            <a:r>
+              <a:rPr lang="it-IT" dirty="0" smtClean="0"/>
+              <a:t>/</a:t>
+            </a:r>
+            <a:r>
+              <a:rPr lang="it-IT" dirty="0" err="1" smtClean="0"/>
+              <a:t>store-devtools</a:t>
             </a:r>
             <a:endParaRPr lang="it-IT" dirty="0"/>
           </a:p>
@@ -18622,121 +20941,278 @@
         </p:nvSpPr>
         <p:spPr/>
         <p:txBody>
-          <a:bodyPr/>
+          <a:bodyPr>
+            <a:normAutofit lnSpcReduction="10000"/>
+          </a:bodyPr>
           <a:lstStyle/>
           <a:p>
             <a:endParaRPr lang="it-IT" dirty="0" smtClean="0"/>
           </a:p>
           <a:p>
-            <a:pPr>
-              <a:buFont typeface="Arial" panose="020B0604020202020204" pitchFamily="34" charset="0"/>
-              <a:buChar char="•"/>
-            </a:pPr>
-            <a:r>
-              <a:rPr lang="it-IT" sz="2800" dirty="0" err="1" smtClean="0"/>
-              <a:t>Centralized</a:t>
-            </a:r>
-            <a:r>
-              <a:rPr lang="it-IT" sz="2800" dirty="0" smtClean="0"/>
+            <a:r>
+              <a:rPr lang="en-US" dirty="0"/>
+              <a:t>In your </a:t>
+            </a:r>
+            <a:r>
+              <a:rPr lang="en-US" dirty="0" err="1"/>
+              <a:t>AppModule</a:t>
+            </a:r>
+            <a:r>
+              <a:rPr lang="en-US" dirty="0"/>
+              <a:t> imports enable the instrumentation using </a:t>
+            </a:r>
+            <a:r>
+              <a:rPr lang="en-US" b="1" dirty="0" err="1" smtClean="0">
+                <a:solidFill>
+                  <a:srgbClr val="0070C0"/>
+                </a:solidFill>
+              </a:rPr>
+              <a:t>StoreDevtoolsModule.instrument</a:t>
+            </a:r>
+            <a:r>
+              <a:rPr lang="en-US" b="1" dirty="0" smtClean="0">
+                <a:solidFill>
+                  <a:srgbClr val="0070C0"/>
+                </a:solidFill>
+              </a:rPr>
+              <a:t>({…})</a:t>
+            </a:r>
+            <a:r>
+              <a:rPr lang="en-US" dirty="0" smtClean="0">
+                <a:solidFill>
+                  <a:srgbClr val="0070C0"/>
+                </a:solidFill>
+              </a:rPr>
+              <a:t>:</a:t>
+            </a:r>
+            <a:endParaRPr lang="en-US" dirty="0">
+              <a:solidFill>
+                <a:srgbClr val="0070C0"/>
+              </a:solidFill>
+            </a:endParaRPr>
+          </a:p>
+          <a:p>
+            <a:endParaRPr lang="it-IT" dirty="0" smtClean="0"/>
+          </a:p>
+          <a:p>
+            <a:r>
+              <a:rPr lang="it-IT" dirty="0" err="1">
+                <a:solidFill>
+                  <a:srgbClr val="001080"/>
+                </a:solidFill>
+                <a:latin typeface="Consolas"/>
+              </a:rPr>
+              <a:t>StoreDevtoolsModule</a:t>
+            </a:r>
+            <a:r>
+              <a:rPr lang="it-IT" dirty="0" err="1">
+                <a:solidFill>
+                  <a:srgbClr val="000000"/>
+                </a:solidFill>
+                <a:latin typeface="Consolas"/>
+              </a:rPr>
+              <a:t>.</a:t>
+            </a:r>
+            <a:r>
+              <a:rPr lang="it-IT" dirty="0" err="1">
+                <a:solidFill>
+                  <a:srgbClr val="795E26"/>
+                </a:solidFill>
+                <a:latin typeface="Consolas"/>
+              </a:rPr>
+              <a:t>instrument</a:t>
+            </a:r>
+            <a:r>
+              <a:rPr lang="it-IT" dirty="0">
+                <a:solidFill>
+                  <a:srgbClr val="000000"/>
+                </a:solidFill>
+                <a:latin typeface="Consolas"/>
+              </a:rPr>
+              <a:t>({</a:t>
+            </a:r>
+          </a:p>
+          <a:p>
+            <a:r>
+              <a:rPr lang="it-IT" dirty="0" smtClean="0">
+                <a:solidFill>
+                  <a:srgbClr val="001080"/>
+                </a:solidFill>
+                <a:latin typeface="Consolas"/>
+              </a:rPr>
+              <a:t>  </a:t>
+            </a:r>
+            <a:r>
+              <a:rPr lang="it-IT" dirty="0" err="1" smtClean="0">
+                <a:solidFill>
+                  <a:srgbClr val="001080"/>
+                </a:solidFill>
+                <a:latin typeface="Consolas"/>
+              </a:rPr>
+              <a:t>maxAge</a:t>
+            </a:r>
+            <a:r>
+              <a:rPr lang="it-IT" dirty="0">
+                <a:solidFill>
+                  <a:srgbClr val="001080"/>
+                </a:solidFill>
+                <a:latin typeface="Consolas"/>
+              </a:rPr>
+              <a:t>:</a:t>
+            </a:r>
+            <a:r>
+              <a:rPr lang="it-IT" dirty="0">
+                <a:solidFill>
+                  <a:srgbClr val="000000"/>
+                </a:solidFill>
+                <a:latin typeface="Consolas"/>
+              </a:rPr>
               <a:t> </a:t>
             </a:r>
             <a:r>
-              <a:rPr lang="it-IT" sz="2800" dirty="0" err="1" smtClean="0"/>
-              <a:t>Immutable</a:t>
-            </a:r>
-            <a:r>
-              <a:rPr lang="it-IT" sz="2800" dirty="0" smtClean="0"/>
-              <a:t> State</a:t>
-            </a:r>
-          </a:p>
-          <a:p>
-            <a:pPr>
-              <a:buFont typeface="Arial" panose="020B0604020202020204" pitchFamily="34" charset="0"/>
-              <a:buChar char="•"/>
-            </a:pPr>
-            <a:r>
-              <a:rPr lang="it-IT" sz="2800" dirty="0" err="1" smtClean="0"/>
-              <a:t>Predictability</a:t>
-            </a:r>
-            <a:endParaRPr lang="it-IT" sz="2800" dirty="0" smtClean="0"/>
-          </a:p>
-          <a:p>
-            <a:pPr>
-              <a:buFont typeface="Arial" panose="020B0604020202020204" pitchFamily="34" charset="0"/>
-              <a:buChar char="•"/>
-            </a:pPr>
-            <a:r>
-              <a:rPr lang="it-IT" sz="2800" dirty="0" err="1" smtClean="0"/>
-              <a:t>Testablity</a:t>
-            </a:r>
-            <a:endParaRPr lang="it-IT" sz="2800" dirty="0" smtClean="0"/>
-          </a:p>
-          <a:p>
-            <a:pPr>
-              <a:buFont typeface="Arial" panose="020B0604020202020204" pitchFamily="34" charset="0"/>
-              <a:buChar char="•"/>
-            </a:pPr>
-            <a:r>
-              <a:rPr lang="it-IT" sz="2800" dirty="0" smtClean="0"/>
-              <a:t>«Pure» Components: </a:t>
-            </a:r>
-            <a:r>
-              <a:rPr lang="it-IT" sz="2800" dirty="0" err="1" smtClean="0"/>
-              <a:t>select</a:t>
-            </a:r>
-            <a:r>
-              <a:rPr lang="it-IT" sz="2800" dirty="0" smtClean="0"/>
-              <a:t> state, </a:t>
-            </a:r>
-            <a:r>
-              <a:rPr lang="it-IT" sz="2800" dirty="0" err="1" smtClean="0"/>
-              <a:t>dispatch</a:t>
-            </a:r>
-            <a:r>
-              <a:rPr lang="it-IT" sz="2800" dirty="0" smtClean="0"/>
+              <a:rPr lang="it-IT" dirty="0">
+                <a:solidFill>
+                  <a:srgbClr val="09885A"/>
+                </a:solidFill>
+                <a:latin typeface="Consolas"/>
+              </a:rPr>
+              <a:t>25</a:t>
+            </a:r>
+            <a:r>
+              <a:rPr lang="it-IT" dirty="0">
+                <a:solidFill>
+                  <a:srgbClr val="000000"/>
+                </a:solidFill>
+                <a:latin typeface="Consolas"/>
+              </a:rPr>
+              <a:t>,</a:t>
+            </a:r>
+          </a:p>
+          <a:p>
+            <a:r>
+              <a:rPr lang="it-IT" dirty="0" smtClean="0">
+                <a:solidFill>
+                  <a:srgbClr val="001080"/>
+                </a:solidFill>
+                <a:latin typeface="Consolas"/>
+              </a:rPr>
+              <a:t>  </a:t>
+            </a:r>
+            <a:r>
+              <a:rPr lang="it-IT" dirty="0" err="1" smtClean="0">
+                <a:solidFill>
+                  <a:srgbClr val="001080"/>
+                </a:solidFill>
+                <a:latin typeface="Consolas"/>
+              </a:rPr>
+              <a:t>logOnly</a:t>
+            </a:r>
+            <a:r>
+              <a:rPr lang="it-IT" dirty="0">
+                <a:solidFill>
+                  <a:srgbClr val="001080"/>
+                </a:solidFill>
+                <a:latin typeface="Consolas"/>
+              </a:rPr>
+              <a:t>:</a:t>
+            </a:r>
+            <a:r>
+              <a:rPr lang="it-IT" dirty="0">
+                <a:solidFill>
+                  <a:srgbClr val="000000"/>
+                </a:solidFill>
+                <a:latin typeface="Consolas"/>
+              </a:rPr>
               <a:t> </a:t>
             </a:r>
             <a:r>
-              <a:rPr lang="it-IT" sz="2800" dirty="0" err="1" smtClean="0"/>
-              <a:t>actions</a:t>
-            </a:r>
-            <a:endParaRPr lang="it-IT" sz="2800" dirty="0"/>
-          </a:p>
-          <a:p>
-            <a:pPr>
-              <a:buFont typeface="Arial" panose="020B0604020202020204" pitchFamily="34" charset="0"/>
-              <a:buChar char="•"/>
-            </a:pPr>
-            <a:r>
-              <a:rPr lang="it-IT" sz="2800" dirty="0" smtClean="0"/>
-              <a:t>Performance</a:t>
-            </a:r>
-          </a:p>
-          <a:p>
-            <a:pPr>
-              <a:buFont typeface="Arial" panose="020B0604020202020204" pitchFamily="34" charset="0"/>
-              <a:buChar char="•"/>
-            </a:pPr>
-            <a:r>
-              <a:rPr lang="it-IT" sz="2800" dirty="0" err="1" smtClean="0"/>
-              <a:t>Nice</a:t>
-            </a:r>
-            <a:r>
-              <a:rPr lang="it-IT" sz="2800" dirty="0" smtClean="0"/>
-              <a:t> Debugging </a:t>
-            </a:r>
-            <a:r>
-              <a:rPr lang="it-IT" sz="2800" dirty="0" err="1" smtClean="0"/>
-              <a:t>Toolset</a:t>
-            </a:r>
-            <a:endParaRPr lang="it-IT" sz="2800" dirty="0" smtClean="0"/>
+              <a:rPr lang="it-IT" dirty="0" err="1">
+                <a:solidFill>
+                  <a:srgbClr val="001080"/>
+                </a:solidFill>
+                <a:latin typeface="Consolas"/>
+              </a:rPr>
+              <a:t>environment</a:t>
+            </a:r>
+            <a:r>
+              <a:rPr lang="it-IT" dirty="0" err="1">
+                <a:solidFill>
+                  <a:srgbClr val="000000"/>
+                </a:solidFill>
+                <a:latin typeface="Consolas"/>
+              </a:rPr>
+              <a:t>.</a:t>
+            </a:r>
+            <a:r>
+              <a:rPr lang="it-IT" dirty="0" err="1">
+                <a:solidFill>
+                  <a:srgbClr val="001080"/>
+                </a:solidFill>
+                <a:latin typeface="Consolas"/>
+              </a:rPr>
+              <a:t>production</a:t>
+            </a:r>
+            <a:endParaRPr lang="it-IT" dirty="0">
+              <a:solidFill>
+                <a:srgbClr val="000000"/>
+              </a:solidFill>
+              <a:latin typeface="Consolas"/>
+            </a:endParaRPr>
+          </a:p>
+          <a:p>
+            <a:r>
+              <a:rPr lang="it-IT" dirty="0">
+                <a:solidFill>
+                  <a:srgbClr val="000000"/>
+                </a:solidFill>
+                <a:latin typeface="Consolas"/>
+              </a:rPr>
+              <a:t>})</a:t>
+            </a:r>
+          </a:p>
+          <a:p>
+            <a:endParaRPr lang="it-IT" dirty="0" smtClean="0"/>
+          </a:p>
+          <a:p>
+            <a:r>
+              <a:rPr lang="it-IT" dirty="0" err="1" smtClean="0"/>
+              <a:t>Supported</a:t>
+            </a:r>
+            <a:r>
+              <a:rPr lang="it-IT" dirty="0" smtClean="0"/>
+              <a:t> </a:t>
+            </a:r>
+            <a:r>
+              <a:rPr lang="it-IT" dirty="0" err="1" smtClean="0"/>
+              <a:t>instrumentation</a:t>
+            </a:r>
+            <a:r>
+              <a:rPr lang="it-IT" dirty="0" smtClean="0"/>
+              <a:t>: </a:t>
+            </a:r>
+            <a:r>
+              <a:rPr lang="it-IT" u="sng" dirty="0">
+                <a:hlinkClick r:id="rId2"/>
+              </a:rPr>
+              <a:t>https://</a:t>
+            </a:r>
+            <a:r>
+              <a:rPr lang="it-IT" u="sng" dirty="0" smtClean="0">
+                <a:hlinkClick r:id="rId2"/>
+              </a:rPr>
+              <a:t>ngrx.io/guide/store-devtools/config</a:t>
+            </a:r>
+            <a:endParaRPr lang="it-IT" dirty="0" smtClean="0"/>
+          </a:p>
+          <a:p>
+            <a:endParaRPr lang="it-IT" dirty="0"/>
           </a:p>
         </p:txBody>
       </p:sp>
     </p:spTree>
     <p:extLst>
       <p:ext uri="{BB962C8B-B14F-4D97-AF65-F5344CB8AC3E}">
-        <p14:creationId xmlns:p14="http://schemas.microsoft.com/office/powerpoint/2010/main" val="2186655875"/>
+        <p14:creationId xmlns:p14="http://schemas.microsoft.com/office/powerpoint/2010/main" val="900495042"/>
       </p:ext>
     </p:extLst>
   </p:cSld>
@@ -18786,6 +21262,337 @@
           <a:lstStyle/>
           <a:p>
             <a:r>
+              <a:rPr lang="it-IT" dirty="0" err="1"/>
+              <a:t>t</a:t>
+            </a:r>
+            <a:r>
+              <a:rPr lang="it-IT" dirty="0" err="1" smtClean="0"/>
+              <a:t>here</a:t>
+            </a:r>
+            <a:r>
+              <a:rPr lang="it-IT" dirty="0" smtClean="0"/>
+              <a:t> </a:t>
+            </a:r>
+            <a:r>
+              <a:rPr lang="it-IT" dirty="0" err="1" smtClean="0"/>
+              <a:t>is</a:t>
+            </a:r>
+            <a:r>
+              <a:rPr lang="it-IT" dirty="0" smtClean="0"/>
+              <a:t> more…</a:t>
+            </a:r>
+            <a:endParaRPr lang="it-IT" dirty="0"/>
+          </a:p>
+        </p:txBody>
+      </p:sp>
+      <p:sp>
+        <p:nvSpPr>
+          <p:cNvPr id="5" name="Segnaposto testo 4"/>
+          <p:cNvSpPr>
+            <a:spLocks noGrp="1"/>
+          </p:cNvSpPr>
+          <p:nvPr>
+            <p:ph type="body" idx="1"/>
+          </p:nvPr>
+        </p:nvSpPr>
+        <p:spPr/>
+        <p:txBody>
+          <a:bodyPr>
+            <a:normAutofit fontScale="85000" lnSpcReduction="20000"/>
+          </a:bodyPr>
+          <a:lstStyle/>
+          <a:p>
+            <a:pPr algn="r"/>
+            <a:r>
+              <a:rPr lang="it-IT" dirty="0" err="1" smtClean="0"/>
+              <a:t>ngrx</a:t>
+            </a:r>
+            <a:r>
+              <a:rPr lang="it-IT" dirty="0" smtClean="0"/>
+              <a:t>/router-</a:t>
+            </a:r>
+            <a:r>
+              <a:rPr lang="it-IT" dirty="0" err="1" smtClean="0"/>
+              <a:t>store</a:t>
+            </a:r>
+            <a:endParaRPr lang="it-IT" dirty="0" smtClean="0"/>
+          </a:p>
+          <a:p>
+            <a:pPr algn="r"/>
+            <a:r>
+              <a:rPr lang="it-IT" dirty="0" err="1" smtClean="0"/>
+              <a:t>ngrx</a:t>
+            </a:r>
+            <a:r>
+              <a:rPr lang="it-IT" dirty="0" smtClean="0"/>
+              <a:t>/</a:t>
+            </a:r>
+            <a:r>
+              <a:rPr lang="it-IT" dirty="0" err="1" smtClean="0"/>
+              <a:t>entity</a:t>
+            </a:r>
+            <a:endParaRPr lang="it-IT" dirty="0" smtClean="0"/>
+          </a:p>
+          <a:p>
+            <a:pPr algn="r"/>
+            <a:r>
+              <a:rPr lang="it-IT" dirty="0" err="1"/>
+              <a:t>ngrx</a:t>
+            </a:r>
+            <a:r>
+              <a:rPr lang="it-IT" dirty="0"/>
+              <a:t>/</a:t>
+            </a:r>
+            <a:r>
+              <a:rPr lang="it-IT" dirty="0" err="1"/>
+              <a:t>schematics</a:t>
+            </a:r>
+            <a:endParaRPr lang="it-IT" dirty="0"/>
+          </a:p>
+        </p:txBody>
+      </p:sp>
+    </p:spTree>
+    <p:extLst>
+      <p:ext uri="{BB962C8B-B14F-4D97-AF65-F5344CB8AC3E}">
+        <p14:creationId xmlns:p14="http://schemas.microsoft.com/office/powerpoint/2010/main" val="2657137447"/>
+      </p:ext>
+    </p:extLst>
+  </p:cSld>
+  <p:clrMapOvr>
+    <a:masterClrMapping/>
+  </p:clrMapOvr>
+  <p:timing>
+    <p:tnLst>
+      <p:par>
+        <p:cTn id="1" dur="indefinite" restart="never" nodeType="tmRoot"/>
+      </p:par>
+    </p:tnLst>
+  </p:timing>
+</p:sld>
+</file>
+
+<file path=ppt/slides/slide35.xml><?xml version="1.0" encoding="utf-8"?>
+<p:sld xmlns:a="http://schemas.openxmlformats.org/drawingml/2006/main" xmlns:r="http://schemas.openxmlformats.org/officeDocument/2006/relationships" xmlns:p="http://schemas.openxmlformats.org/presentationml/2006/main">
+  <p:cSld>
+    <p:spTree>
+      <p:nvGrpSpPr>
+        <p:cNvPr id="1" name=""/>
+        <p:cNvGrpSpPr/>
+        <p:nvPr/>
+      </p:nvGrpSpPr>
+      <p:grpSpPr>
+        <a:xfrm>
+          <a:off x="0" y="0"/>
+          <a:ext cx="0" cy="0"/>
+          <a:chOff x="0" y="0"/>
+          <a:chExt cx="0" cy="0"/>
+        </a:xfrm>
+      </p:grpSpPr>
+      <p:sp>
+        <p:nvSpPr>
+          <p:cNvPr id="2" name="Titolo 1"/>
+          <p:cNvSpPr>
+            <a:spLocks noGrp="1"/>
+          </p:cNvSpPr>
+          <p:nvPr>
+            <p:ph type="title"/>
+          </p:nvPr>
+        </p:nvSpPr>
+        <p:spPr/>
+        <p:txBody>
+          <a:bodyPr>
+            <a:normAutofit/>
+          </a:bodyPr>
+          <a:lstStyle/>
+          <a:p>
+            <a:r>
+              <a:rPr lang="it-IT" dirty="0" smtClean="0"/>
+              <a:t>Benefits of </a:t>
+            </a:r>
+            <a:r>
+              <a:rPr lang="it-IT" dirty="0" err="1" smtClean="0"/>
+              <a:t>NgRx</a:t>
+            </a:r>
+            <a:endParaRPr lang="it-IT" dirty="0"/>
+          </a:p>
+        </p:txBody>
+      </p:sp>
+      <p:sp>
+        <p:nvSpPr>
+          <p:cNvPr id="3" name="Segnaposto contenuto 2"/>
+          <p:cNvSpPr>
+            <a:spLocks noGrp="1"/>
+          </p:cNvSpPr>
+          <p:nvPr>
+            <p:ph idx="1"/>
+          </p:nvPr>
+        </p:nvSpPr>
+        <p:spPr/>
+        <p:txBody>
+          <a:bodyPr/>
+          <a:lstStyle/>
+          <a:p>
+            <a:endParaRPr lang="it-IT" dirty="0" smtClean="0"/>
+          </a:p>
+          <a:p>
+            <a:pPr>
+              <a:buFont typeface="Arial" panose="020B0604020202020204" pitchFamily="34" charset="0"/>
+              <a:buChar char="•"/>
+            </a:pPr>
+            <a:r>
+              <a:rPr lang="it-IT" sz="2800" dirty="0" err="1" smtClean="0"/>
+              <a:t>Centralized</a:t>
+            </a:r>
+            <a:r>
+              <a:rPr lang="it-IT" sz="2800" dirty="0" smtClean="0"/>
+              <a:t> </a:t>
+            </a:r>
+            <a:r>
+              <a:rPr lang="it-IT" sz="2800" dirty="0" err="1" smtClean="0"/>
+              <a:t>Immutable</a:t>
+            </a:r>
+            <a:r>
+              <a:rPr lang="it-IT" sz="2800" dirty="0" smtClean="0"/>
+              <a:t> State</a:t>
+            </a:r>
+          </a:p>
+          <a:p>
+            <a:pPr>
+              <a:buFont typeface="Arial" panose="020B0604020202020204" pitchFamily="34" charset="0"/>
+              <a:buChar char="•"/>
+            </a:pPr>
+            <a:r>
+              <a:rPr lang="it-IT" sz="2800" dirty="0" err="1" smtClean="0"/>
+              <a:t>Predictability</a:t>
+            </a:r>
+            <a:endParaRPr lang="it-IT" sz="2800" dirty="0" smtClean="0"/>
+          </a:p>
+          <a:p>
+            <a:pPr>
+              <a:buFont typeface="Arial" panose="020B0604020202020204" pitchFamily="34" charset="0"/>
+              <a:buChar char="•"/>
+            </a:pPr>
+            <a:r>
+              <a:rPr lang="it-IT" sz="2800" dirty="0" err="1" smtClean="0"/>
+              <a:t>Testablity</a:t>
+            </a:r>
+            <a:endParaRPr lang="it-IT" sz="2800" dirty="0" smtClean="0"/>
+          </a:p>
+          <a:p>
+            <a:pPr>
+              <a:buFont typeface="Arial" panose="020B0604020202020204" pitchFamily="34" charset="0"/>
+              <a:buChar char="•"/>
+            </a:pPr>
+            <a:r>
+              <a:rPr lang="it-IT" sz="2800" dirty="0" smtClean="0"/>
+              <a:t>«Pure» Components: </a:t>
+            </a:r>
+            <a:r>
+              <a:rPr lang="it-IT" sz="2800" dirty="0" err="1" smtClean="0"/>
+              <a:t>select</a:t>
+            </a:r>
+            <a:r>
+              <a:rPr lang="it-IT" sz="2800" dirty="0" smtClean="0"/>
+              <a:t> state, </a:t>
+            </a:r>
+            <a:r>
+              <a:rPr lang="it-IT" sz="2800" dirty="0" err="1" smtClean="0"/>
+              <a:t>dispatch</a:t>
+            </a:r>
+            <a:r>
+              <a:rPr lang="it-IT" sz="2800" dirty="0" smtClean="0"/>
+              <a:t> </a:t>
+            </a:r>
+            <a:r>
+              <a:rPr lang="it-IT" sz="2800" dirty="0" err="1" smtClean="0"/>
+              <a:t>actions</a:t>
+            </a:r>
+            <a:endParaRPr lang="it-IT" sz="2800" dirty="0"/>
+          </a:p>
+          <a:p>
+            <a:pPr>
+              <a:buFont typeface="Arial" panose="020B0604020202020204" pitchFamily="34" charset="0"/>
+              <a:buChar char="•"/>
+            </a:pPr>
+            <a:r>
+              <a:rPr lang="it-IT" sz="2800" dirty="0" smtClean="0"/>
+              <a:t>Performance</a:t>
+            </a:r>
+          </a:p>
+          <a:p>
+            <a:pPr>
+              <a:buFont typeface="Arial" panose="020B0604020202020204" pitchFamily="34" charset="0"/>
+              <a:buChar char="•"/>
+            </a:pPr>
+            <a:r>
+              <a:rPr lang="it-IT" sz="2800" dirty="0" err="1" smtClean="0"/>
+              <a:t>Nice</a:t>
+            </a:r>
+            <a:r>
+              <a:rPr lang="it-IT" sz="2800" dirty="0" smtClean="0"/>
+              <a:t> Debugging </a:t>
+            </a:r>
+            <a:r>
+              <a:rPr lang="it-IT" sz="2800" dirty="0" err="1" smtClean="0"/>
+              <a:t>Toolset</a:t>
+            </a:r>
+            <a:endParaRPr lang="it-IT" sz="2800" dirty="0" smtClean="0"/>
+          </a:p>
+        </p:txBody>
+      </p:sp>
+    </p:spTree>
+    <p:extLst>
+      <p:ext uri="{BB962C8B-B14F-4D97-AF65-F5344CB8AC3E}">
+        <p14:creationId xmlns:p14="http://schemas.microsoft.com/office/powerpoint/2010/main" val="2186655875"/>
+      </p:ext>
+    </p:extLst>
+  </p:cSld>
+  <p:clrMapOvr>
+    <a:masterClrMapping/>
+  </p:clrMapOvr>
+  <p:timing>
+    <p:tnLst>
+      <p:par>
+        <p:cTn id="1" dur="indefinite" restart="never" nodeType="tmRoot"/>
+      </p:par>
+    </p:tnLst>
+  </p:timing>
+</p:sld>
+</file>
+
+<file path=ppt/slides/slide36.xml><?xml version="1.0" encoding="utf-8"?>
+<p:sld xmlns:a="http://schemas.openxmlformats.org/drawingml/2006/main" xmlns:r="http://schemas.openxmlformats.org/officeDocument/2006/relationships" xmlns:p="http://schemas.openxmlformats.org/presentationml/2006/main">
+  <p:cSld>
+    <p:spTree>
+      <p:nvGrpSpPr>
+        <p:cNvPr id="1" name=""/>
+        <p:cNvGrpSpPr/>
+        <p:nvPr/>
+      </p:nvGrpSpPr>
+      <p:grpSpPr>
+        <a:xfrm>
+          <a:off x="0" y="0"/>
+          <a:ext cx="0" cy="0"/>
+          <a:chOff x="0" y="0"/>
+          <a:chExt cx="0" cy="0"/>
+        </a:xfrm>
+      </p:grpSpPr>
+      <p:sp>
+        <p:nvSpPr>
+          <p:cNvPr id="4" name="Titolo 3"/>
+          <p:cNvSpPr>
+            <a:spLocks noGrp="1"/>
+          </p:cNvSpPr>
+          <p:nvPr>
+            <p:ph type="title"/>
+          </p:nvPr>
+        </p:nvSpPr>
+        <p:spPr/>
+        <p:txBody>
+          <a:bodyPr/>
+          <a:lstStyle/>
+          <a:p>
+            <a:r>
               <a:rPr lang="it-IT" dirty="0" smtClean="0"/>
               <a:t>Reference</a:t>
             </a:r>
@@ -18958,7 +21765,7 @@
 </p:sld>
 </file>
 
-<file path=ppt/slides/slide35.xml><?xml version="1.0" encoding="utf-8"?>
+<file path=ppt/slides/slide37.xml><?xml version="1.0" encoding="utf-8"?>
 <p:sld xmlns:a="http://schemas.openxmlformats.org/drawingml/2006/main" xmlns:r="http://schemas.openxmlformats.org/officeDocument/2006/relationships" xmlns:p="http://schemas.openxmlformats.org/presentationml/2006/main">
   <p:cSld>
     <p:spTree>
@@ -19089,7 +21896,7 @@
 </p:sld>
 </file>
 
-<file path=ppt/slides/slide36.xml><?xml version="1.0" encoding="utf-8"?>
+<file path=ppt/slides/slide38.xml><?xml version="1.0" encoding="utf-8"?>
 <p:sld xmlns:a="http://schemas.openxmlformats.org/drawingml/2006/main" xmlns:r="http://schemas.openxmlformats.org/officeDocument/2006/relationships" xmlns:p="http://schemas.openxmlformats.org/presentationml/2006/main">
   <p:cSld>
     <p:spTree>
@@ -24162,7 +26969,7 @@
   <a:extraClrSchemeLst/>
   <a:extLst>
     <a:ext uri="{05A4C25C-085E-4340-85A3-A5531E510DB2}">
-      <thm15:themeFamily xmlns:thm15="http://schemas.microsoft.com/office/thememl/2012/main" xmlns="" name="Retrospect" id="{5F128B03-DCCA-4EEB-AB3B-CF2899314A46}" vid="{9CC26709-368C-4D72-9060-94E5B3FF3CD6}"/>
+      <thm15:themeFamily xmlns="" xmlns:thm15="http://schemas.microsoft.com/office/thememl/2012/main" name="Retrospect" id="{5F128B03-DCCA-4EEB-AB3B-CF2899314A46}" vid="{9CC26709-368C-4D72-9060-94E5B3FF3CD6}"/>
     </a:ext>
   </a:extLst>
 </a:theme>
@@ -24457,7 +27264,7 @@
   <a:extraClrSchemeLst/>
   <a:extLst>
     <a:ext uri="{05A4C25C-085E-4340-85A3-A5531E510DB2}">
-      <thm15:themeFamily xmlns:thm15="http://schemas.microsoft.com/office/thememl/2012/main" xmlns="" name="Office Theme" id="{62F939B6-93AF-4DB8-9C6B-D6C7DFDC589F}" vid="{4A3C46E8-61CC-4603-A589-7422A47A8E4A}"/>
+      <thm15:themeFamily xmlns="" xmlns:thm15="http://schemas.microsoft.com/office/thememl/2012/main" name="Office Theme" id="{62F939B6-93AF-4DB8-9C6B-D6C7DFDC589F}" vid="{4A3C46E8-61CC-4603-A589-7422A47A8E4A}"/>
     </a:ext>
   </a:extLst>
 </a:theme>

</xml_diff>

<commit_message>
Updated samples and slides
</commit_message>
<xml_diff>
--- a/ReactiveProgramming_ngrx.pptx
+++ b/ReactiveProgramming_ngrx.pptx
@@ -149,7 +149,7 @@
   </p:defaultTextStyle>
   <p:extLst>
     <p:ext uri="{EFAFB233-063F-42B5-8137-9DF3F51BA10A}">
-      <p15:sldGuideLst xmlns="" xmlns:p15="http://schemas.microsoft.com/office/powerpoint/2012/main"/>
+      <p15:sldGuideLst xmlns:p15="http://schemas.microsoft.com/office/powerpoint/2012/main" xmlns=""/>
     </p:ext>
   </p:extLst>
 </p:presentation>
@@ -237,7 +237,7 @@
           <a:p>
             <a:fld id="{327B5F9E-84DB-4811-8F56-9C65E911095D}" type="datetimeFigureOut">
               <a:rPr lang="it-IT" smtClean="0"/>
-              <a:t>01/12/2018</a:t>
+              <a:t>05/12/2018</a:t>
             </a:fld>
             <a:endParaRPr lang="it-IT"/>
           </a:p>
@@ -402,7 +402,7 @@
           <a:p>
             <a:fld id="{60073984-6E99-4D80-ADB1-BFDA0D866557}" type="datetimeFigureOut">
               <a:rPr lang="en-US"/>
-              <a:t>12/1/2018</a:t>
+              <a:t>12/5/2018</a:t>
             </a:fld>
             <a:endParaRPr lang="en-US"/>
           </a:p>
@@ -1622,6 +1622,9 @@
               <a:rPr lang="it-IT" dirty="0" smtClean="0"/>
               <a:t> output. </a:t>
             </a:r>
+            <a:endParaRPr lang="it-IT" dirty="0" smtClean="0"/>
+          </a:p>
+          <a:p>
             <a:r>
               <a:rPr lang="it-IT" dirty="0" err="1" smtClean="0"/>
               <a:t>NgRx</a:t>
@@ -1718,7 +1721,11 @@
             </a:r>
             <a:r>
               <a:rPr lang="it-IT" baseline="0" dirty="0" smtClean="0"/>
-              <a:t> the last input </a:t>
+              <a:t> the last </a:t>
+            </a:r>
+            <a:r>
+              <a:rPr lang="it-IT" baseline="0" dirty="0" smtClean="0"/>
+              <a:t>input </a:t>
             </a:r>
             <a:r>
               <a:rPr lang="it-IT" baseline="0" dirty="0" err="1" smtClean="0"/>
@@ -2586,7 +2593,7 @@
           <a:p>
             <a:fld id="{F1FA7AC5-6045-4418-8E60-F48788734473}" type="datetimeFigureOut">
               <a:rPr lang="en-US" smtClean="0"/>
-              <a:t>12/1/2018</a:t>
+              <a:t>12/5/2018</a:t>
             </a:fld>
             <a:endParaRPr lang="en-US"/>
           </a:p>
@@ -2799,7 +2806,7 @@
           <a:p>
             <a:fld id="{F1FA7AC5-6045-4418-8E60-F48788734473}" type="datetimeFigureOut">
               <a:rPr lang="en-US" smtClean="0"/>
-              <a:t>12/1/2018</a:t>
+              <a:t>12/5/2018</a:t>
             </a:fld>
             <a:endParaRPr lang="en-US"/>
           </a:p>
@@ -3053,7 +3060,7 @@
           <a:p>
             <a:fld id="{F1FA7AC5-6045-4418-8E60-F48788734473}" type="datetimeFigureOut">
               <a:rPr lang="en-US" smtClean="0"/>
-              <a:t>12/1/2018</a:t>
+              <a:t>12/5/2018</a:t>
             </a:fld>
             <a:endParaRPr lang="en-US"/>
           </a:p>
@@ -3221,7 +3228,7 @@
           <a:p>
             <a:fld id="{F1FA7AC5-6045-4418-8E60-F48788734473}" type="datetimeFigureOut">
               <a:rPr lang="en-US" smtClean="0"/>
-              <a:t>12/1/2018</a:t>
+              <a:t>12/5/2018</a:t>
             </a:fld>
             <a:endParaRPr lang="en-US"/>
           </a:p>
@@ -3563,7 +3570,7 @@
           <a:p>
             <a:fld id="{F1FA7AC5-6045-4418-8E60-F48788734473}" type="datetimeFigureOut">
               <a:rPr lang="en-US" smtClean="0"/>
-              <a:t>12/1/2018</a:t>
+              <a:t>12/5/2018</a:t>
             </a:fld>
             <a:endParaRPr lang="en-US"/>
           </a:p>
@@ -3835,7 +3842,7 @@
           <a:p>
             <a:fld id="{F1FA7AC5-6045-4418-8E60-F48788734473}" type="datetimeFigureOut">
               <a:rPr lang="en-US" smtClean="0"/>
-              <a:t>12/1/2018</a:t>
+              <a:t>12/5/2018</a:t>
             </a:fld>
             <a:endParaRPr lang="en-US"/>
           </a:p>
@@ -4211,7 +4218,7 @@
           <a:p>
             <a:fld id="{F1FA7AC5-6045-4418-8E60-F48788734473}" type="datetimeFigureOut">
               <a:rPr lang="en-US" smtClean="0"/>
-              <a:t>12/1/2018</a:t>
+              <a:t>12/5/2018</a:t>
             </a:fld>
             <a:endParaRPr lang="en-US"/>
           </a:p>
@@ -4328,7 +4335,7 @@
           <a:p>
             <a:fld id="{F1FA7AC5-6045-4418-8E60-F48788734473}" type="datetimeFigureOut">
               <a:rPr lang="en-US" smtClean="0"/>
-              <a:t>12/1/2018</a:t>
+              <a:t>12/5/2018</a:t>
             </a:fld>
             <a:endParaRPr lang="en-US"/>
           </a:p>
@@ -4499,7 +4506,7 @@
           <a:p>
             <a:fld id="{F1FA7AC5-6045-4418-8E60-F48788734473}" type="datetimeFigureOut">
               <a:rPr lang="en-US" smtClean="0"/>
-              <a:t>12/1/2018</a:t>
+              <a:t>12/5/2018</a:t>
             </a:fld>
             <a:endParaRPr lang="en-US"/>
           </a:p>
@@ -4851,7 +4858,7 @@
           <a:p>
             <a:fld id="{F1FA7AC5-6045-4418-8E60-F48788734473}" type="datetimeFigureOut">
               <a:rPr lang="en-US" smtClean="0"/>
-              <a:t>12/1/2018</a:t>
+              <a:t>12/5/2018</a:t>
             </a:fld>
             <a:endParaRPr lang="en-US"/>
           </a:p>
@@ -5226,7 +5233,7 @@
           <a:p>
             <a:fld id="{F1FA7AC5-6045-4418-8E60-F48788734473}" type="datetimeFigureOut">
               <a:rPr lang="en-US" smtClean="0"/>
-              <a:t>12/1/2018</a:t>
+              <a:t>12/5/2018</a:t>
             </a:fld>
             <a:endParaRPr lang="en-US"/>
           </a:p>
@@ -5511,7 +5518,7 @@
           <a:p>
             <a:fld id="{F1FA7AC5-6045-4418-8E60-F48788734473}" type="datetimeFigureOut">
               <a:rPr lang="en-US" smtClean="0"/>
-              <a:t>12/1/2018</a:t>
+              <a:t>12/5/2018</a:t>
             </a:fld>
             <a:endParaRPr lang="en-US"/>
           </a:p>
@@ -6259,7 +6266,21 @@
             </a:r>
             <a:r>
               <a:rPr lang="it-IT" dirty="0" smtClean="0"/>
-              <a:t> -&gt; CQRS </a:t>
+              <a:t> </a:t>
+            </a:r>
+            <a:r>
+              <a:rPr lang="it-IT" dirty="0" smtClean="0">
+                <a:sym typeface="Wingdings" panose="05000000000000000000" pitchFamily="2" charset="2"/>
+              </a:rPr>
+              <a:t></a:t>
+            </a:r>
+            <a:r>
+              <a:rPr lang="it-IT" dirty="0" smtClean="0"/>
+              <a:t> </a:t>
+            </a:r>
+            <a:r>
+              <a:rPr lang="it-IT" dirty="0" smtClean="0"/>
+              <a:t>CQRS </a:t>
             </a:r>
             <a:r>
               <a:rPr lang="it-IT" dirty="0" err="1" smtClean="0"/>
@@ -7036,7 +7057,15 @@
             </a:r>
             <a:r>
               <a:rPr lang="en-US" dirty="0"/>
-              <a:t>: the State should be treated as an IMMUTABLE object, you are not allowed to mutate </a:t>
+              <a:t>: the State should be </a:t>
+            </a:r>
+            <a:r>
+              <a:rPr lang="en-US" dirty="0" smtClean="0"/>
+              <a:t>considered an </a:t>
+            </a:r>
+            <a:r>
+              <a:rPr lang="en-US" dirty="0"/>
+              <a:t>IMMUTABLE object, you are not allowed to mutate </a:t>
             </a:r>
             <a:r>
               <a:rPr lang="en-US" dirty="0" smtClean="0"/>
@@ -9881,7 +9910,15 @@
             </a:r>
             <a:r>
               <a:rPr lang="en-US" sz="3200" dirty="0"/>
-              <a:t>expose a slice of the state as observables</a:t>
+              <a:t>expose </a:t>
+            </a:r>
+            <a:r>
+              <a:rPr lang="en-US" sz="3200" dirty="0" smtClean="0"/>
+              <a:t>slices </a:t>
+            </a:r>
+            <a:r>
+              <a:rPr lang="en-US" sz="3200" dirty="0"/>
+              <a:t>of the state as observables</a:t>
             </a:r>
             <a:endParaRPr lang="it-IT" sz="3200" dirty="0"/>
           </a:p>
@@ -10773,16 +10810,16 @@
           <a:lstStyle/>
           <a:p>
             <a:r>
+              <a:rPr lang="it-IT" dirty="0" smtClean="0"/>
+              <a:t>Benefits of «</a:t>
+            </a:r>
+            <a:r>
               <a:rPr lang="it-IT" dirty="0" err="1" smtClean="0"/>
-              <a:t>Advantages</a:t>
+              <a:t>createSelector</a:t>
             </a:r>
             <a:r>
               <a:rPr lang="it-IT" dirty="0" smtClean="0"/>
-              <a:t> of </a:t>
-            </a:r>
-            <a:r>
-              <a:rPr lang="it-IT" dirty="0" err="1" smtClean="0"/>
-              <a:t>selectors</a:t>
+              <a:t>»</a:t>
             </a:r>
             <a:endParaRPr lang="it-IT" dirty="0"/>
           </a:p>
@@ -10864,7 +10901,16 @@
                 </a:solidFill>
                 <a:latin typeface="Consolas"/>
               </a:rPr>
-              <a:t>// functions, the most noticeable: </a:t>
+              <a:t>// functions, the most </a:t>
+            </a:r>
+            <a:r>
+              <a:rPr lang="en-US" dirty="0" smtClean="0">
+                <a:solidFill>
+                  <a:srgbClr val="008000"/>
+                </a:solidFill>
+                <a:latin typeface="Consolas"/>
+              </a:rPr>
+              <a:t>important: </a:t>
             </a:r>
             <a:r>
               <a:rPr lang="en-US" b="1" dirty="0">
@@ -11413,12 +11459,16 @@
               <a:t> service and call the </a:t>
             </a:r>
             <a:r>
+              <a:rPr lang="it-IT" dirty="0" err="1"/>
+              <a:t>d</a:t>
+            </a:r>
+            <a:r>
               <a:rPr lang="it-IT" dirty="0" err="1" smtClean="0"/>
-              <a:t>Dispatch</a:t>
+              <a:t>ispatch</a:t>
             </a:r>
             <a:r>
               <a:rPr lang="it-IT" dirty="0" smtClean="0"/>
-              <a:t> </a:t>
+              <a:t>() </a:t>
             </a:r>
             <a:r>
               <a:rPr lang="it-IT" dirty="0" err="1" smtClean="0"/>
@@ -11679,15 +11729,31 @@
             </a:r>
             <a:r>
               <a:rPr lang="it-IT" sz="3200" dirty="0" smtClean="0"/>
-              <a:t> Core </a:t>
+              <a:t> </a:t>
+            </a:r>
+            <a:r>
+              <a:rPr lang="it-IT" sz="3200" dirty="0" smtClean="0"/>
+              <a:t>core </a:t>
             </a:r>
             <a:r>
               <a:rPr lang="it-IT" sz="3200" dirty="0" err="1" smtClean="0"/>
-              <a:t>it’s</a:t>
+              <a:t>NgRx</a:t>
             </a:r>
             <a:r>
               <a:rPr lang="it-IT" sz="3200" dirty="0" smtClean="0"/>
-              <a:t> the </a:t>
+              <a:t> </a:t>
+            </a:r>
+            <a:r>
+              <a:rPr lang="it-IT" sz="3200" dirty="0" err="1" smtClean="0"/>
+              <a:t>is</a:t>
+            </a:r>
+            <a:r>
+              <a:rPr lang="it-IT" sz="3200" dirty="0" smtClean="0"/>
+              <a:t> </a:t>
+            </a:r>
+            <a:r>
+              <a:rPr lang="it-IT" sz="3200" dirty="0" smtClean="0"/>
+              <a:t>the </a:t>
             </a:r>
             <a:r>
               <a:rPr lang="it-IT" sz="3200" dirty="0" err="1" smtClean="0"/>
@@ -12089,15 +12155,23 @@
             </a:r>
             <a:r>
               <a:rPr lang="en-US" sz="2400" dirty="0"/>
-              <a:t>dispatched from @</a:t>
-            </a:r>
-            <a:r>
-              <a:rPr lang="en-US" sz="2400" dirty="0" err="1"/>
+              <a:t>dispatched </a:t>
+            </a:r>
+            <a:r>
+              <a:rPr lang="en-US" sz="2400" dirty="0" smtClean="0"/>
+              <a:t>to @</a:t>
+            </a:r>
+            <a:r>
+              <a:rPr lang="en-US" sz="2400" dirty="0" err="1" smtClean="0"/>
               <a:t>ngrx</a:t>
             </a:r>
             <a:r>
+              <a:rPr lang="en-US" sz="2400" dirty="0" smtClean="0"/>
+              <a:t>/store</a:t>
+            </a:r>
+            <a:r>
               <a:rPr lang="en-US" sz="2400" dirty="0"/>
-              <a:t>/store.</a:t>
+              <a:t>.</a:t>
             </a:r>
           </a:p>
           <a:p>
@@ -12208,7 +12282,274 @@
   <p:timing>
     <p:tnLst>
       <p:par>
-        <p:cTn id="1" dur="indefinite" restart="never" nodeType="tmRoot"/>
+        <p:cTn id="1" dur="indefinite" restart="never" nodeType="tmRoot">
+          <p:childTnLst>
+            <p:seq concurrent="1" nextAc="seek">
+              <p:cTn id="2" dur="indefinite" nodeType="mainSeq">
+                <p:childTnLst>
+                  <p:par>
+                    <p:cTn id="3" fill="hold">
+                      <p:stCondLst>
+                        <p:cond delay="indefinite"/>
+                      </p:stCondLst>
+                      <p:childTnLst>
+                        <p:par>
+                          <p:cTn id="4" fill="hold">
+                            <p:stCondLst>
+                              <p:cond delay="0"/>
+                            </p:stCondLst>
+                            <p:childTnLst>
+                              <p:par>
+                                <p:cTn id="5" presetID="10" presetClass="entr" presetSubtype="0" fill="hold" nodeType="clickEffect">
+                                  <p:stCondLst>
+                                    <p:cond delay="0"/>
+                                  </p:stCondLst>
+                                  <p:childTnLst>
+                                    <p:set>
+                                      <p:cBhvr>
+                                        <p:cTn id="6" dur="1" fill="hold">
+                                          <p:stCondLst>
+                                            <p:cond delay="0"/>
+                                          </p:stCondLst>
+                                        </p:cTn>
+                                        <p:tgtEl>
+                                          <p:spTgt spid="3">
+                                            <p:txEl>
+                                              <p:pRg st="1" end="1"/>
+                                            </p:txEl>
+                                          </p:spTgt>
+                                        </p:tgtEl>
+                                        <p:attrNameLst>
+                                          <p:attrName>style.visibility</p:attrName>
+                                        </p:attrNameLst>
+                                      </p:cBhvr>
+                                      <p:to>
+                                        <p:strVal val="visible"/>
+                                      </p:to>
+                                    </p:set>
+                                    <p:animEffect transition="in" filter="fade">
+                                      <p:cBhvr>
+                                        <p:cTn id="7" dur="500"/>
+                                        <p:tgtEl>
+                                          <p:spTgt spid="3">
+                                            <p:txEl>
+                                              <p:pRg st="1" end="1"/>
+                                            </p:txEl>
+                                          </p:spTgt>
+                                        </p:tgtEl>
+                                      </p:cBhvr>
+                                    </p:animEffect>
+                                  </p:childTnLst>
+                                </p:cTn>
+                              </p:par>
+                            </p:childTnLst>
+                          </p:cTn>
+                        </p:par>
+                      </p:childTnLst>
+                    </p:cTn>
+                  </p:par>
+                  <p:par>
+                    <p:cTn id="8" fill="hold">
+                      <p:stCondLst>
+                        <p:cond delay="indefinite"/>
+                      </p:stCondLst>
+                      <p:childTnLst>
+                        <p:par>
+                          <p:cTn id="9" fill="hold">
+                            <p:stCondLst>
+                              <p:cond delay="0"/>
+                            </p:stCondLst>
+                            <p:childTnLst>
+                              <p:par>
+                                <p:cTn id="10" presetID="10" presetClass="entr" presetSubtype="0" fill="hold" nodeType="clickEffect">
+                                  <p:stCondLst>
+                                    <p:cond delay="0"/>
+                                  </p:stCondLst>
+                                  <p:childTnLst>
+                                    <p:set>
+                                      <p:cBhvr>
+                                        <p:cTn id="11" dur="1" fill="hold">
+                                          <p:stCondLst>
+                                            <p:cond delay="0"/>
+                                          </p:stCondLst>
+                                        </p:cTn>
+                                        <p:tgtEl>
+                                          <p:spTgt spid="3">
+                                            <p:txEl>
+                                              <p:pRg st="2" end="2"/>
+                                            </p:txEl>
+                                          </p:spTgt>
+                                        </p:tgtEl>
+                                        <p:attrNameLst>
+                                          <p:attrName>style.visibility</p:attrName>
+                                        </p:attrNameLst>
+                                      </p:cBhvr>
+                                      <p:to>
+                                        <p:strVal val="visible"/>
+                                      </p:to>
+                                    </p:set>
+                                    <p:animEffect transition="in" filter="fade">
+                                      <p:cBhvr>
+                                        <p:cTn id="12" dur="500"/>
+                                        <p:tgtEl>
+                                          <p:spTgt spid="3">
+                                            <p:txEl>
+                                              <p:pRg st="2" end="2"/>
+                                            </p:txEl>
+                                          </p:spTgt>
+                                        </p:tgtEl>
+                                      </p:cBhvr>
+                                    </p:animEffect>
+                                  </p:childTnLst>
+                                </p:cTn>
+                              </p:par>
+                            </p:childTnLst>
+                          </p:cTn>
+                        </p:par>
+                      </p:childTnLst>
+                    </p:cTn>
+                  </p:par>
+                  <p:par>
+                    <p:cTn id="13" fill="hold">
+                      <p:stCondLst>
+                        <p:cond delay="indefinite"/>
+                      </p:stCondLst>
+                      <p:childTnLst>
+                        <p:par>
+                          <p:cTn id="14" fill="hold">
+                            <p:stCondLst>
+                              <p:cond delay="0"/>
+                            </p:stCondLst>
+                            <p:childTnLst>
+                              <p:par>
+                                <p:cTn id="15" presetID="10" presetClass="entr" presetSubtype="0" fill="hold" nodeType="clickEffect">
+                                  <p:stCondLst>
+                                    <p:cond delay="0"/>
+                                  </p:stCondLst>
+                                  <p:childTnLst>
+                                    <p:set>
+                                      <p:cBhvr>
+                                        <p:cTn id="16" dur="1" fill="hold">
+                                          <p:stCondLst>
+                                            <p:cond delay="0"/>
+                                          </p:stCondLst>
+                                        </p:cTn>
+                                        <p:tgtEl>
+                                          <p:spTgt spid="3">
+                                            <p:txEl>
+                                              <p:pRg st="3" end="3"/>
+                                            </p:txEl>
+                                          </p:spTgt>
+                                        </p:tgtEl>
+                                        <p:attrNameLst>
+                                          <p:attrName>style.visibility</p:attrName>
+                                        </p:attrNameLst>
+                                      </p:cBhvr>
+                                      <p:to>
+                                        <p:strVal val="visible"/>
+                                      </p:to>
+                                    </p:set>
+                                    <p:animEffect transition="in" filter="fade">
+                                      <p:cBhvr>
+                                        <p:cTn id="17" dur="500"/>
+                                        <p:tgtEl>
+                                          <p:spTgt spid="3">
+                                            <p:txEl>
+                                              <p:pRg st="3" end="3"/>
+                                            </p:txEl>
+                                          </p:spTgt>
+                                        </p:tgtEl>
+                                      </p:cBhvr>
+                                    </p:animEffect>
+                                  </p:childTnLst>
+                                </p:cTn>
+                              </p:par>
+                            </p:childTnLst>
+                          </p:cTn>
+                        </p:par>
+                      </p:childTnLst>
+                    </p:cTn>
+                  </p:par>
+                  <p:par>
+                    <p:cTn id="18" fill="hold">
+                      <p:stCondLst>
+                        <p:cond delay="indefinite"/>
+                      </p:stCondLst>
+                      <p:childTnLst>
+                        <p:par>
+                          <p:cTn id="19" fill="hold">
+                            <p:stCondLst>
+                              <p:cond delay="0"/>
+                            </p:stCondLst>
+                            <p:childTnLst>
+                              <p:par>
+                                <p:cTn id="20" presetID="10" presetClass="entr" presetSubtype="0" fill="hold" nodeType="clickEffect">
+                                  <p:stCondLst>
+                                    <p:cond delay="0"/>
+                                  </p:stCondLst>
+                                  <p:childTnLst>
+                                    <p:set>
+                                      <p:cBhvr>
+                                        <p:cTn id="21" dur="1" fill="hold">
+                                          <p:stCondLst>
+                                            <p:cond delay="0"/>
+                                          </p:stCondLst>
+                                        </p:cTn>
+                                        <p:tgtEl>
+                                          <p:spTgt spid="3">
+                                            <p:txEl>
+                                              <p:pRg st="4" end="4"/>
+                                            </p:txEl>
+                                          </p:spTgt>
+                                        </p:tgtEl>
+                                        <p:attrNameLst>
+                                          <p:attrName>style.visibility</p:attrName>
+                                        </p:attrNameLst>
+                                      </p:cBhvr>
+                                      <p:to>
+                                        <p:strVal val="visible"/>
+                                      </p:to>
+                                    </p:set>
+                                    <p:animEffect transition="in" filter="fade">
+                                      <p:cBhvr>
+                                        <p:cTn id="22" dur="500"/>
+                                        <p:tgtEl>
+                                          <p:spTgt spid="3">
+                                            <p:txEl>
+                                              <p:pRg st="4" end="4"/>
+                                            </p:txEl>
+                                          </p:spTgt>
+                                        </p:tgtEl>
+                                      </p:cBhvr>
+                                    </p:animEffect>
+                                  </p:childTnLst>
+                                </p:cTn>
+                              </p:par>
+                            </p:childTnLst>
+                          </p:cTn>
+                        </p:par>
+                      </p:childTnLst>
+                    </p:cTn>
+                  </p:par>
+                </p:childTnLst>
+              </p:cTn>
+              <p:prevCondLst>
+                <p:cond evt="onPrev" delay="0">
+                  <p:tgtEl>
+                    <p:sldTgt/>
+                  </p:tgtEl>
+                </p:cond>
+              </p:prevCondLst>
+              <p:nextCondLst>
+                <p:cond evt="onNext" delay="0">
+                  <p:tgtEl>
+                    <p:sldTgt/>
+                  </p:tgtEl>
+                </p:cond>
+              </p:nextCondLst>
+            </p:seq>
+          </p:childTnLst>
+        </p:cTn>
       </p:par>
     </p:tnLst>
   </p:timing>
@@ -15092,6 +15433,13 @@
   <p:clrMapOvr>
     <a:masterClrMapping/>
   </p:clrMapOvr>
+  <p:timing>
+    <p:tnLst>
+      <p:par>
+        <p:cTn id="1" dur="indefinite" restart="never" nodeType="tmRoot"/>
+      </p:par>
+    </p:tnLst>
+  </p:timing>
 </p:sld>
 </file>
 
@@ -15519,6 +15867,92 @@
           <a:p>
             <a:pPr algn="ctr"/>
             <a:endParaRPr lang="it-IT"/>
+          </a:p>
+        </p:txBody>
+      </p:sp>
+      <p:sp>
+        <p:nvSpPr>
+          <p:cNvPr id="6" name="CasellaDiTesto 5"/>
+          <p:cNvSpPr txBox="1"/>
+          <p:nvPr/>
+        </p:nvSpPr>
+        <p:spPr>
+          <a:xfrm>
+            <a:off x="3308350" y="4375150"/>
+            <a:ext cx="5662256" cy="461665"/>
+          </a:xfrm>
+          <a:prstGeom prst="rect">
+            <a:avLst/>
+          </a:prstGeom>
+          <a:noFill/>
+        </p:spPr>
+        <p:txBody>
+          <a:bodyPr wrap="none" rtlCol="0">
+            <a:spAutoFit/>
+          </a:bodyPr>
+          <a:lstStyle/>
+          <a:p>
+            <a:r>
+              <a:rPr lang="it-IT" sz="2400" dirty="0" err="1" smtClean="0">
+                <a:solidFill>
+                  <a:srgbClr val="FF0000"/>
+                </a:solidFill>
+              </a:rPr>
+              <a:t>Actions</a:t>
+            </a:r>
+            <a:r>
+              <a:rPr lang="it-IT" sz="2400" dirty="0" smtClean="0">
+                <a:solidFill>
+                  <a:srgbClr val="FF0000"/>
+                </a:solidFill>
+              </a:rPr>
+              <a:t>&lt;</a:t>
+            </a:r>
+            <a:r>
+              <a:rPr lang="it-IT" sz="2400" dirty="0" err="1" smtClean="0">
+                <a:solidFill>
+                  <a:srgbClr val="FF0000"/>
+                </a:solidFill>
+              </a:rPr>
+              <a:t>TActions</a:t>
+            </a:r>
+            <a:r>
+              <a:rPr lang="it-IT" sz="2400" dirty="0" smtClean="0">
+                <a:solidFill>
+                  <a:srgbClr val="FF0000"/>
+                </a:solidFill>
+              </a:rPr>
+              <a:t>&gt;: an </a:t>
+            </a:r>
+            <a:r>
+              <a:rPr lang="it-IT" sz="2400" dirty="0" err="1" smtClean="0">
+                <a:solidFill>
+                  <a:srgbClr val="FF0000"/>
+                </a:solidFill>
+              </a:rPr>
+              <a:t>observable</a:t>
+            </a:r>
+            <a:r>
+              <a:rPr lang="it-IT" sz="2400" dirty="0" smtClean="0">
+                <a:solidFill>
+                  <a:srgbClr val="FF0000"/>
+                </a:solidFill>
+              </a:rPr>
+              <a:t> of </a:t>
+            </a:r>
+            <a:r>
+              <a:rPr lang="it-IT" sz="2400" dirty="0" err="1" smtClean="0">
+                <a:solidFill>
+                  <a:srgbClr val="FF0000"/>
+                </a:solidFill>
+              </a:rPr>
+              <a:t>actions</a:t>
+            </a:r>
+            <a:endParaRPr lang="it-IT" sz="2400" dirty="0">
+              <a:solidFill>
+                <a:srgbClr val="FF0000"/>
+              </a:solidFill>
+            </a:endParaRPr>
           </a:p>
         </p:txBody>
       </p:sp>
@@ -15643,6 +16077,50 @@
                             </p:childTnLst>
                           </p:cTn>
                         </p:par>
+                        <p:par>
+                          <p:cTn id="13" fill="hold">
+                            <p:stCondLst>
+                              <p:cond delay="500"/>
+                            </p:stCondLst>
+                            <p:childTnLst>
+                              <p:par>
+                                <p:cTn id="14" presetID="10" presetClass="entr" presetSubtype="0" fill="hold" grpId="0" nodeType="afterEffect">
+                                  <p:stCondLst>
+                                    <p:cond delay="0"/>
+                                  </p:stCondLst>
+                                  <p:childTnLst>
+                                    <p:set>
+                                      <p:cBhvr>
+                                        <p:cTn id="15" dur="1" fill="hold">
+                                          <p:stCondLst>
+                                            <p:cond delay="0"/>
+                                          </p:stCondLst>
+                                        </p:cTn>
+                                        <p:tgtEl>
+                                          <p:spTgt spid="6"/>
+                                        </p:tgtEl>
+                                        <p:attrNameLst>
+                                          <p:attrName>style.visibility</p:attrName>
+                                        </p:attrNameLst>
+                                      </p:cBhvr>
+                                      <p:to>
+                                        <p:strVal val="visible"/>
+                                      </p:to>
+                                    </p:set>
+                                    <p:animEffect transition="in" filter="fade">
+                                      <p:cBhvr>
+                                        <p:cTn id="16" dur="500"/>
+                                        <p:tgtEl>
+                                          <p:spTgt spid="6"/>
+                                        </p:tgtEl>
+                                      </p:cBhvr>
+                                    </p:animEffect>
+                                  </p:childTnLst>
+                                </p:cTn>
+                              </p:par>
+                            </p:childTnLst>
+                          </p:cTn>
+                        </p:par>
                       </p:childTnLst>
                     </p:cTn>
                   </p:par>
@@ -15670,6 +16148,7 @@
     <p:bldLst>
       <p:bldP spid="4" grpId="0" animBg="1"/>
       <p:bldP spid="5" grpId="0" animBg="1"/>
+      <p:bldP spid="6" grpId="0"/>
     </p:bldLst>
   </p:timing>
 </p:sld>
@@ -17088,8 +17567,52 @@
         </p:nvSpPr>
         <p:spPr>
           <a:xfrm>
-            <a:off x="1606550" y="2438400"/>
-            <a:ext cx="5943600" cy="400050"/>
+            <a:off x="1606550" y="2508250"/>
+            <a:ext cx="5943600" cy="330200"/>
+          </a:xfrm>
+          <a:prstGeom prst="rect">
+            <a:avLst/>
+          </a:prstGeom>
+          <a:noFill/>
+          <a:ln>
+            <a:solidFill>
+              <a:srgbClr val="FF0000"/>
+            </a:solidFill>
+          </a:ln>
+        </p:spPr>
+        <p:style>
+          <a:lnRef idx="2">
+            <a:schemeClr val="dk1"/>
+          </a:lnRef>
+          <a:fillRef idx="1">
+            <a:schemeClr val="lt1"/>
+          </a:fillRef>
+          <a:effectRef idx="0">
+            <a:schemeClr val="dk1"/>
+          </a:effectRef>
+          <a:fontRef idx="minor">
+            <a:schemeClr val="dk1"/>
+          </a:fontRef>
+        </p:style>
+        <p:txBody>
+          <a:bodyPr rtlCol="0" anchor="ctr"/>
+          <a:lstStyle/>
+          <a:p>
+            <a:pPr algn="ctr"/>
+            <a:endParaRPr lang="it-IT"/>
+          </a:p>
+        </p:txBody>
+      </p:sp>
+      <p:sp>
+        <p:nvSpPr>
+          <p:cNvPr id="5" name="Rettangolo 4"/>
+          <p:cNvSpPr/>
+          <p:nvPr/>
+        </p:nvSpPr>
+        <p:spPr>
+          <a:xfrm>
+            <a:off x="1168400" y="1905000"/>
+            <a:ext cx="1295400" cy="330200"/>
           </a:xfrm>
           <a:prstGeom prst="rect">
             <a:avLst/>
@@ -17168,6 +17691,59 @@
                                           </p:stCondLst>
                                         </p:cTn>
                                         <p:tgtEl>
+                                          <p:spTgt spid="5"/>
+                                        </p:tgtEl>
+                                        <p:attrNameLst>
+                                          <p:attrName>style.visibility</p:attrName>
+                                        </p:attrNameLst>
+                                      </p:cBhvr>
+                                      <p:to>
+                                        <p:strVal val="visible"/>
+                                      </p:to>
+                                    </p:set>
+                                    <p:animEffect transition="in" filter="fade">
+                                      <p:cBhvr>
+                                        <p:cTn id="7" dur="500"/>
+                                        <p:tgtEl>
+                                          <p:spTgt spid="5"/>
+                                        </p:tgtEl>
+                                      </p:cBhvr>
+                                    </p:animEffect>
+                                  </p:childTnLst>
+                                </p:cTn>
+                              </p:par>
+                            </p:childTnLst>
+                          </p:cTn>
+                        </p:par>
+                      </p:childTnLst>
+                    </p:cTn>
+                  </p:par>
+                  <p:par>
+                    <p:cTn id="8" fill="hold">
+                      <p:stCondLst>
+                        <p:cond delay="indefinite"/>
+                      </p:stCondLst>
+                      <p:childTnLst>
+                        <p:par>
+                          <p:cTn id="9" fill="hold">
+                            <p:stCondLst>
+                              <p:cond delay="0"/>
+                            </p:stCondLst>
+                            <p:childTnLst>
+                              <p:par>
+                                <p:cTn id="10" presetID="10" presetClass="entr" presetSubtype="0" fill="hold" grpId="0" nodeType="clickEffect">
+                                  <p:stCondLst>
+                                    <p:cond delay="0"/>
+                                  </p:stCondLst>
+                                  <p:childTnLst>
+                                    <p:set>
+                                      <p:cBhvr>
+                                        <p:cTn id="11" dur="1" fill="hold">
+                                          <p:stCondLst>
+                                            <p:cond delay="0"/>
+                                          </p:stCondLst>
+                                        </p:cTn>
+                                        <p:tgtEl>
                                           <p:spTgt spid="4"/>
                                         </p:tgtEl>
                                         <p:attrNameLst>
@@ -17180,7 +17756,7 @@
                                     </p:set>
                                     <p:animEffect transition="in" filter="fade">
                                       <p:cBhvr>
-                                        <p:cTn id="7" dur="500"/>
+                                        <p:cTn id="12" dur="500"/>
                                         <p:tgtEl>
                                           <p:spTgt spid="4"/>
                                         </p:tgtEl>
@@ -17218,6 +17794,7 @@
     </p:tnLst>
     <p:bldLst>
       <p:bldP spid="4" grpId="0" animBg="1"/>
+      <p:bldP spid="5" grpId="0" animBg="1"/>
     </p:bldLst>
   </p:timing>
 </p:sld>
@@ -17508,7 +18085,281 @@
   <p:timing>
     <p:tnLst>
       <p:par>
-        <p:cTn id="1" dur="indefinite" restart="never" nodeType="tmRoot"/>
+        <p:cTn id="1" dur="indefinite" restart="never" nodeType="tmRoot">
+          <p:childTnLst>
+            <p:seq concurrent="1" nextAc="seek">
+              <p:cTn id="2" dur="indefinite" nodeType="mainSeq">
+                <p:childTnLst>
+                  <p:par>
+                    <p:cTn id="3" fill="hold">
+                      <p:stCondLst>
+                        <p:cond delay="indefinite"/>
+                      </p:stCondLst>
+                      <p:childTnLst>
+                        <p:par>
+                          <p:cTn id="4" fill="hold">
+                            <p:stCondLst>
+                              <p:cond delay="0"/>
+                            </p:stCondLst>
+                            <p:childTnLst>
+                              <p:par>
+                                <p:cTn id="5" presetID="10" presetClass="entr" presetSubtype="0" fill="hold" nodeType="clickEffect">
+                                  <p:stCondLst>
+                                    <p:cond delay="0"/>
+                                  </p:stCondLst>
+                                  <p:childTnLst>
+                                    <p:set>
+                                      <p:cBhvr>
+                                        <p:cTn id="6" dur="1" fill="hold">
+                                          <p:stCondLst>
+                                            <p:cond delay="0"/>
+                                          </p:stCondLst>
+                                        </p:cTn>
+                                        <p:tgtEl>
+                                          <p:spTgt spid="3">
+                                            <p:txEl>
+                                              <p:pRg st="0" end="0"/>
+                                            </p:txEl>
+                                          </p:spTgt>
+                                        </p:tgtEl>
+                                        <p:attrNameLst>
+                                          <p:attrName>style.visibility</p:attrName>
+                                        </p:attrNameLst>
+                                      </p:cBhvr>
+                                      <p:to>
+                                        <p:strVal val="visible"/>
+                                      </p:to>
+                                    </p:set>
+                                    <p:animEffect transition="in" filter="fade">
+                                      <p:cBhvr>
+                                        <p:cTn id="7" dur="500"/>
+                                        <p:tgtEl>
+                                          <p:spTgt spid="3">
+                                            <p:txEl>
+                                              <p:pRg st="0" end="0"/>
+                                            </p:txEl>
+                                          </p:spTgt>
+                                        </p:tgtEl>
+                                      </p:cBhvr>
+                                    </p:animEffect>
+                                  </p:childTnLst>
+                                </p:cTn>
+                              </p:par>
+                              <p:par>
+                                <p:cTn id="8" presetID="10" presetClass="entr" presetSubtype="0" fill="hold" nodeType="withEffect">
+                                  <p:stCondLst>
+                                    <p:cond delay="0"/>
+                                  </p:stCondLst>
+                                  <p:childTnLst>
+                                    <p:set>
+                                      <p:cBhvr>
+                                        <p:cTn id="9" dur="1" fill="hold">
+                                          <p:stCondLst>
+                                            <p:cond delay="0"/>
+                                          </p:stCondLst>
+                                        </p:cTn>
+                                        <p:tgtEl>
+                                          <p:spTgt spid="3">
+                                            <p:txEl>
+                                              <p:pRg st="2" end="2"/>
+                                            </p:txEl>
+                                          </p:spTgt>
+                                        </p:tgtEl>
+                                        <p:attrNameLst>
+                                          <p:attrName>style.visibility</p:attrName>
+                                        </p:attrNameLst>
+                                      </p:cBhvr>
+                                      <p:to>
+                                        <p:strVal val="visible"/>
+                                      </p:to>
+                                    </p:set>
+                                    <p:animEffect transition="in" filter="fade">
+                                      <p:cBhvr>
+                                        <p:cTn id="10" dur="500"/>
+                                        <p:tgtEl>
+                                          <p:spTgt spid="3">
+                                            <p:txEl>
+                                              <p:pRg st="2" end="2"/>
+                                            </p:txEl>
+                                          </p:spTgt>
+                                        </p:tgtEl>
+                                      </p:cBhvr>
+                                    </p:animEffect>
+                                  </p:childTnLst>
+                                </p:cTn>
+                              </p:par>
+                            </p:childTnLst>
+                          </p:cTn>
+                        </p:par>
+                      </p:childTnLst>
+                    </p:cTn>
+                  </p:par>
+                  <p:par>
+                    <p:cTn id="11" fill="hold">
+                      <p:stCondLst>
+                        <p:cond delay="indefinite"/>
+                      </p:stCondLst>
+                      <p:childTnLst>
+                        <p:par>
+                          <p:cTn id="12" fill="hold">
+                            <p:stCondLst>
+                              <p:cond delay="0"/>
+                            </p:stCondLst>
+                            <p:childTnLst>
+                              <p:par>
+                                <p:cTn id="13" presetID="10" presetClass="entr" presetSubtype="0" fill="hold" nodeType="clickEffect">
+                                  <p:stCondLst>
+                                    <p:cond delay="0"/>
+                                  </p:stCondLst>
+                                  <p:childTnLst>
+                                    <p:set>
+                                      <p:cBhvr>
+                                        <p:cTn id="14" dur="1" fill="hold">
+                                          <p:stCondLst>
+                                            <p:cond delay="0"/>
+                                          </p:stCondLst>
+                                        </p:cTn>
+                                        <p:tgtEl>
+                                          <p:spTgt spid="3">
+                                            <p:txEl>
+                                              <p:pRg st="4" end="4"/>
+                                            </p:txEl>
+                                          </p:spTgt>
+                                        </p:tgtEl>
+                                        <p:attrNameLst>
+                                          <p:attrName>style.visibility</p:attrName>
+                                        </p:attrNameLst>
+                                      </p:cBhvr>
+                                      <p:to>
+                                        <p:strVal val="visible"/>
+                                      </p:to>
+                                    </p:set>
+                                    <p:animEffect transition="in" filter="fade">
+                                      <p:cBhvr>
+                                        <p:cTn id="15" dur="500"/>
+                                        <p:tgtEl>
+                                          <p:spTgt spid="3">
+                                            <p:txEl>
+                                              <p:pRg st="4" end="4"/>
+                                            </p:txEl>
+                                          </p:spTgt>
+                                        </p:tgtEl>
+                                      </p:cBhvr>
+                                    </p:animEffect>
+                                  </p:childTnLst>
+                                </p:cTn>
+                              </p:par>
+                              <p:par>
+                                <p:cTn id="16" presetID="10" presetClass="entr" presetSubtype="0" fill="hold" nodeType="withEffect">
+                                  <p:stCondLst>
+                                    <p:cond delay="0"/>
+                                  </p:stCondLst>
+                                  <p:childTnLst>
+                                    <p:set>
+                                      <p:cBhvr>
+                                        <p:cTn id="17" dur="1" fill="hold">
+                                          <p:stCondLst>
+                                            <p:cond delay="0"/>
+                                          </p:stCondLst>
+                                        </p:cTn>
+                                        <p:tgtEl>
+                                          <p:spTgt spid="3">
+                                            <p:txEl>
+                                              <p:pRg st="6" end="6"/>
+                                            </p:txEl>
+                                          </p:spTgt>
+                                        </p:tgtEl>
+                                        <p:attrNameLst>
+                                          <p:attrName>style.visibility</p:attrName>
+                                        </p:attrNameLst>
+                                      </p:cBhvr>
+                                      <p:to>
+                                        <p:strVal val="visible"/>
+                                      </p:to>
+                                    </p:set>
+                                    <p:animEffect transition="in" filter="fade">
+                                      <p:cBhvr>
+                                        <p:cTn id="18" dur="500"/>
+                                        <p:tgtEl>
+                                          <p:spTgt spid="3">
+                                            <p:txEl>
+                                              <p:pRg st="6" end="6"/>
+                                            </p:txEl>
+                                          </p:spTgt>
+                                        </p:tgtEl>
+                                      </p:cBhvr>
+                                    </p:animEffect>
+                                  </p:childTnLst>
+                                </p:cTn>
+                              </p:par>
+                              <p:par>
+                                <p:cTn id="19" presetID="10" presetClass="entr" presetSubtype="0" fill="hold" nodeType="withEffect">
+                                  <p:stCondLst>
+                                    <p:cond delay="0"/>
+                                  </p:stCondLst>
+                                  <p:childTnLst>
+                                    <p:set>
+                                      <p:cBhvr>
+                                        <p:cTn id="20" dur="1" fill="hold">
+                                          <p:stCondLst>
+                                            <p:cond delay="0"/>
+                                          </p:stCondLst>
+                                        </p:cTn>
+                                        <p:tgtEl>
+                                          <p:spTgt spid="3">
+                                            <p:txEl>
+                                              <p:pRg st="7" end="7"/>
+                                            </p:txEl>
+                                          </p:spTgt>
+                                        </p:tgtEl>
+                                        <p:attrNameLst>
+                                          <p:attrName>style.visibility</p:attrName>
+                                        </p:attrNameLst>
+                                      </p:cBhvr>
+                                      <p:to>
+                                        <p:strVal val="visible"/>
+                                      </p:to>
+                                    </p:set>
+                                    <p:animEffect transition="in" filter="fade">
+                                      <p:cBhvr>
+                                        <p:cTn id="21" dur="500"/>
+                                        <p:tgtEl>
+                                          <p:spTgt spid="3">
+                                            <p:txEl>
+                                              <p:pRg st="7" end="7"/>
+                                            </p:txEl>
+                                          </p:spTgt>
+                                        </p:tgtEl>
+                                      </p:cBhvr>
+                                    </p:animEffect>
+                                  </p:childTnLst>
+                                </p:cTn>
+                              </p:par>
+                            </p:childTnLst>
+                          </p:cTn>
+                        </p:par>
+                      </p:childTnLst>
+                    </p:cTn>
+                  </p:par>
+                </p:childTnLst>
+              </p:cTn>
+              <p:prevCondLst>
+                <p:cond evt="onPrev" delay="0">
+                  <p:tgtEl>
+                    <p:sldTgt/>
+                  </p:tgtEl>
+                </p:cond>
+              </p:prevCondLst>
+              <p:nextCondLst>
+                <p:cond evt="onNext" delay="0">
+                  <p:tgtEl>
+                    <p:sldTgt/>
+                  </p:tgtEl>
+                </p:cond>
+              </p:nextCondLst>
+            </p:seq>
+          </p:childTnLst>
+        </p:cTn>
       </p:par>
     </p:tnLst>
   </p:timing>
@@ -19137,7 +19988,11 @@
             </a:r>
             <a:r>
               <a:rPr lang="it-IT" b="1" dirty="0"/>
-              <a:t> (li </a:t>
+              <a:t> </a:t>
+            </a:r>
+            <a:r>
+              <a:rPr lang="it-IT" b="1" dirty="0" smtClean="0"/>
+              <a:t>(e.g.: </a:t>
             </a:r>
             <a:r>
               <a:rPr lang="it-IT" b="1" dirty="0" err="1"/>
@@ -19498,7 +20353,11 @@
             </a:r>
             <a:r>
               <a:rPr lang="it-IT" b="1" dirty="0" smtClean="0"/>
-              <a:t> complete</a:t>
+              <a:t> </a:t>
+            </a:r>
+            <a:r>
+              <a:rPr lang="it-IT" b="1" dirty="0" err="1" smtClean="0"/>
+              <a:t>completes</a:t>
             </a:r>
             <a:r>
               <a:rPr lang="it-IT" dirty="0" smtClean="0"/>
@@ -19879,7 +20738,7 @@
         <p:spPr/>
         <p:txBody>
           <a:bodyPr>
-            <a:normAutofit lnSpcReduction="10000"/>
+            <a:normAutofit fontScale="92500"/>
           </a:bodyPr>
           <a:lstStyle/>
           <a:p>
@@ -19899,32 +20758,64 @@
               <a:t> </a:t>
             </a:r>
             <a:r>
+              <a:rPr lang="it-IT" sz="2400" dirty="0" err="1" smtClean="0">
+                <a:solidFill>
+                  <a:srgbClr val="0070C0"/>
+                </a:solidFill>
+              </a:rPr>
+              <a:t>one</a:t>
+            </a:r>
+            <a:r>
+              <a:rPr lang="it-IT" sz="2400" dirty="0" smtClean="0">
+                <a:solidFill>
+                  <a:srgbClr val="0070C0"/>
+                </a:solidFill>
+              </a:rPr>
+              <a:t> </a:t>
+            </a:r>
+            <a:r>
+              <a:rPr lang="it-IT" sz="2400" dirty="0">
+                <a:solidFill>
+                  <a:srgbClr val="0070C0"/>
+                </a:solidFill>
+              </a:rPr>
+              <a:t>way </a:t>
+            </a:r>
+            <a:r>
+              <a:rPr lang="it-IT" sz="2400" dirty="0" err="1" smtClean="0">
+                <a:solidFill>
+                  <a:srgbClr val="0070C0"/>
+                </a:solidFill>
+              </a:rPr>
+              <a:t>dataflow</a:t>
+            </a:r>
+            <a:r>
+              <a:rPr lang="it-IT" sz="2400" dirty="0">
+                <a:solidFill>
+                  <a:srgbClr val="0070C0"/>
+                </a:solidFill>
+              </a:rPr>
+              <a:t> </a:t>
+            </a:r>
+            <a:r>
               <a:rPr lang="it-IT" sz="2400" dirty="0" smtClean="0"/>
-              <a:t> </a:t>
+              <a:t>(for the state </a:t>
+            </a:r>
+            <a:r>
+              <a:rPr lang="it-IT" sz="2400" dirty="0"/>
+              <a:t>management) </a:t>
             </a:r>
             <a:r>
               <a:rPr lang="it-IT" sz="2400" dirty="0" err="1"/>
-              <a:t>one</a:t>
-            </a:r>
-            <a:r>
-              <a:rPr lang="it-IT" sz="2400" dirty="0"/>
-              <a:t> way (state management) </a:t>
-            </a:r>
-            <a:r>
-              <a:rPr lang="it-IT" sz="2400" dirty="0" err="1"/>
-              <a:t>dataflow</a:t>
+              <a:t>throught</a:t>
             </a:r>
             <a:r>
               <a:rPr lang="it-IT" sz="2400" dirty="0"/>
               <a:t> </a:t>
             </a:r>
             <a:r>
-              <a:rPr lang="it-IT" sz="2400" dirty="0" err="1"/>
-              <a:t>throught</a:t>
-            </a:r>
-            <a:r>
               <a:rPr lang="it-IT" sz="2400" dirty="0"/>
-              <a:t> the </a:t>
+              <a:t>the </a:t>
             </a:r>
             <a:r>
               <a:rPr lang="it-IT" sz="2400" dirty="0" err="1"/>
@@ -19961,11 +20852,23 @@
             </a:r>
             <a:r>
               <a:rPr lang="it-IT" sz="2400" dirty="0"/>
-              <a:t> the use of a «Single source of </a:t>
+              <a:t> the use of a «Single </a:t>
+            </a:r>
+            <a:r>
+              <a:rPr lang="it-IT" sz="2400" dirty="0" smtClean="0"/>
+              <a:t>Source </a:t>
+            </a:r>
+            <a:r>
+              <a:rPr lang="it-IT" sz="2400" dirty="0"/>
+              <a:t>of </a:t>
             </a:r>
             <a:r>
               <a:rPr lang="it-IT" sz="2400" dirty="0" err="1"/>
-              <a:t>truth</a:t>
+              <a:t>T</a:t>
+            </a:r>
+            <a:r>
+              <a:rPr lang="it-IT" sz="2400" dirty="0" err="1" smtClean="0"/>
+              <a:t>ruth</a:t>
             </a:r>
             <a:r>
               <a:rPr lang="it-IT" sz="2400" dirty="0"/>
@@ -19973,15 +20876,35 @@
             </a:r>
             <a:r>
               <a:rPr lang="it-IT" sz="2400" dirty="0" smtClean="0"/>
-              <a:t>State: The </a:t>
-            </a:r>
-            <a:r>
-              <a:rPr lang="it-IT" sz="2400" dirty="0" err="1" smtClean="0"/>
+              <a:t>State: </a:t>
+            </a:r>
+            <a:r>
+              <a:rPr lang="it-IT" sz="2400" b="1" dirty="0" smtClean="0">
+                <a:solidFill>
+                  <a:srgbClr val="0070C0"/>
+                </a:solidFill>
+              </a:rPr>
+              <a:t>The </a:t>
+            </a:r>
+            <a:r>
+              <a:rPr lang="it-IT" sz="2400" b="1" dirty="0" err="1" smtClean="0">
+                <a:solidFill>
+                  <a:srgbClr val="0070C0"/>
+                </a:solidFill>
+              </a:rPr>
               <a:t>Store</a:t>
             </a:r>
             <a:r>
+              <a:rPr lang="it-IT" sz="2400" b="1" dirty="0" smtClean="0">
+                <a:solidFill>
+                  <a:srgbClr val="0070C0"/>
+                </a:solidFill>
+              </a:rPr>
+              <a:t>™</a:t>
+            </a:r>
+            <a:r>
               <a:rPr lang="it-IT" sz="2400" dirty="0" smtClean="0"/>
-              <a:t>™.</a:t>
+              <a:t>.</a:t>
             </a:r>
           </a:p>
           <a:p>
@@ -20049,12 +20972,24 @@
               <a:t> </a:t>
             </a:r>
             <a:r>
-              <a:rPr lang="it-IT" sz="2400" dirty="0" err="1" smtClean="0"/>
+              <a:rPr lang="it-IT" sz="2400" b="1" dirty="0" err="1" smtClean="0">
+                <a:solidFill>
+                  <a:srgbClr val="0070C0"/>
+                </a:solidFill>
+              </a:rPr>
               <a:t>Actions</a:t>
             </a:r>
             <a:r>
+              <a:rPr lang="it-IT" sz="2400" b="1" dirty="0" smtClean="0">
+                <a:solidFill>
+                  <a:srgbClr val="0070C0"/>
+                </a:solidFill>
+              </a:rPr>
+              <a:t>™</a:t>
+            </a:r>
+            <a:r>
               <a:rPr lang="it-IT" sz="2400" dirty="0" smtClean="0"/>
-              <a:t>™.</a:t>
+              <a:t>.</a:t>
             </a:r>
           </a:p>
           <a:p>
@@ -20086,12 +21021,24 @@
               <a:t>: The </a:t>
             </a:r>
             <a:r>
-              <a:rPr lang="it-IT" sz="2400" dirty="0" err="1" smtClean="0"/>
+              <a:rPr lang="it-IT" sz="2400" b="1" dirty="0" err="1" smtClean="0">
+                <a:solidFill>
+                  <a:srgbClr val="0070C0"/>
+                </a:solidFill>
+              </a:rPr>
               <a:t>Reducers</a:t>
             </a:r>
             <a:r>
+              <a:rPr lang="it-IT" sz="2400" b="1" dirty="0" smtClean="0">
+                <a:solidFill>
+                  <a:srgbClr val="0070C0"/>
+                </a:solidFill>
+              </a:rPr>
+              <a:t>™</a:t>
+            </a:r>
+            <a:r>
               <a:rPr lang="it-IT" sz="2400" dirty="0" smtClean="0"/>
-              <a:t>™.</a:t>
+              <a:t>.</a:t>
             </a:r>
             <a:endParaRPr lang="it-IT" sz="2400" dirty="0"/>
           </a:p>
@@ -20736,6 +21683,9 @@
             <a:endParaRPr lang="it-IT" dirty="0" smtClean="0"/>
           </a:p>
           <a:p>
+            <a:endParaRPr lang="it-IT" dirty="0" smtClean="0"/>
+          </a:p>
+          <a:p>
             <a:r>
               <a:rPr lang="en-US" dirty="0" err="1">
                 <a:latin typeface="Consolas" panose="020B0609020204030204" pitchFamily="49" charset="0"/>
@@ -20798,20 +21748,11 @@
             </a:r>
             <a:r>
               <a:rPr lang="en-US" dirty="0"/>
-              <a:t>the Chrome / Firefox Extension.</a:t>
-            </a:r>
-          </a:p>
-          <a:p>
-            <a:r>
-              <a:rPr lang="en-US" dirty="0"/>
-              <a:t/>
-            </a:r>
-            <a:br>
-              <a:rPr lang="en-US" dirty="0"/>
-            </a:br>
+              <a:t>the Chrome / </a:t>
+            </a:r>
             <a:r>
               <a:rPr lang="en-US" dirty="0" smtClean="0"/>
-              <a:t>Redux </a:t>
+              <a:t>Firefox “Redux </a:t>
             </a:r>
             <a:r>
               <a:rPr lang="en-US" dirty="0" err="1"/>
@@ -20823,7 +21764,11 @@
             </a:r>
             <a:r>
               <a:rPr lang="en-US" dirty="0" smtClean="0"/>
-              <a:t>Extension</a:t>
+              <a:t>Extension”</a:t>
+            </a:r>
+            <a:r>
+              <a:rPr lang="en-US" dirty="0" smtClean="0"/>
+              <a:t/>
             </a:r>
             <a:br>
               <a:rPr lang="en-US" dirty="0" smtClean="0"/>
@@ -24942,8 +25887,13 @@
             </a:r>
             <a:r>
               <a:rPr lang="it-IT" sz="2400" dirty="0" smtClean="0"/>
-              <a:t> Application. </a:t>
-            </a:r>
+              <a:t> </a:t>
+            </a:r>
+            <a:r>
+              <a:rPr lang="it-IT" sz="2400" dirty="0" smtClean="0"/>
+              <a:t>Applications. </a:t>
+            </a:r>
+            <a:endParaRPr lang="it-IT" sz="2400" dirty="0" smtClean="0"/>
           </a:p>
           <a:p>
             <a:r>
@@ -26331,7 +27281,15 @@
             </a:r>
             <a:r>
               <a:rPr lang="en-US" sz="2400" dirty="0"/>
-              <a:t>. The reducers are the only way to change the state inside the Store.</a:t>
+              <a:t>. The reducers are the only way to </a:t>
+            </a:r>
+            <a:r>
+              <a:rPr lang="en-US" sz="2400" dirty="0" smtClean="0"/>
+              <a:t>“mutate” the </a:t>
+            </a:r>
+            <a:r>
+              <a:rPr lang="en-US" sz="2400" dirty="0"/>
+              <a:t>state inside the Store.</a:t>
             </a:r>
           </a:p>
           <a:p>
@@ -26969,7 +27927,7 @@
   <a:extraClrSchemeLst/>
   <a:extLst>
     <a:ext uri="{05A4C25C-085E-4340-85A3-A5531E510DB2}">
-      <thm15:themeFamily xmlns="" xmlns:thm15="http://schemas.microsoft.com/office/thememl/2012/main" name="Retrospect" id="{5F128B03-DCCA-4EEB-AB3B-CF2899314A46}" vid="{9CC26709-368C-4D72-9060-94E5B3FF3CD6}"/>
+      <thm15:themeFamily xmlns:thm15="http://schemas.microsoft.com/office/thememl/2012/main" xmlns="" name="Retrospect" id="{5F128B03-DCCA-4EEB-AB3B-CF2899314A46}" vid="{9CC26709-368C-4D72-9060-94E5B3FF3CD6}"/>
     </a:ext>
   </a:extLst>
 </a:theme>
@@ -27264,7 +28222,7 @@
   <a:extraClrSchemeLst/>
   <a:extLst>
     <a:ext uri="{05A4C25C-085E-4340-85A3-A5531E510DB2}">
-      <thm15:themeFamily xmlns="" xmlns:thm15="http://schemas.microsoft.com/office/thememl/2012/main" name="Office Theme" id="{62F939B6-93AF-4DB8-9C6B-D6C7DFDC589F}" vid="{4A3C46E8-61CC-4603-A589-7422A47A8E4A}"/>
+      <thm15:themeFamily xmlns:thm15="http://schemas.microsoft.com/office/thememl/2012/main" xmlns="" name="Office Theme" id="{62F939B6-93AF-4DB8-9C6B-D6C7DFDC589F}" vid="{4A3C46E8-61CC-4603-A589-7422A47A8E4A}"/>
     </a:ext>
   </a:extLst>
 </a:theme>

</xml_diff>

<commit_message>
Small fixes to pptx
</commit_message>
<xml_diff>
--- a/ReactiveProgramming_ngrx.pptx
+++ b/ReactiveProgramming_ngrx.pptx
@@ -149,7 +149,7 @@
   </p:defaultTextStyle>
   <p:extLst>
     <p:ext uri="{EFAFB233-063F-42B5-8137-9DF3F51BA10A}">
-      <p15:sldGuideLst xmlns="" xmlns:p15="http://schemas.microsoft.com/office/powerpoint/2012/main"/>
+      <p15:sldGuideLst xmlns:p15="http://schemas.microsoft.com/office/powerpoint/2012/main" xmlns=""/>
     </p:ext>
   </p:extLst>
 </p:presentation>
@@ -237,7 +237,7 @@
           <a:p>
             <a:fld id="{327B5F9E-84DB-4811-8F56-9C65E911095D}" type="datetimeFigureOut">
               <a:rPr lang="it-IT" smtClean="0"/>
-              <a:t>06/12/2018</a:t>
+              <a:t>19/01/2019</a:t>
             </a:fld>
             <a:endParaRPr lang="it-IT"/>
           </a:p>
@@ -402,7 +402,7 @@
           <a:p>
             <a:fld id="{60073984-6E99-4D80-ADB1-BFDA0D866557}" type="datetimeFigureOut">
               <a:rPr lang="en-US"/>
-              <a:t>12/6/2018</a:t>
+              <a:t>1/19/2019</a:t>
             </a:fld>
             <a:endParaRPr lang="en-US"/>
           </a:p>
@@ -2588,7 +2588,7 @@
           <a:p>
             <a:fld id="{F1FA7AC5-6045-4418-8E60-F48788734473}" type="datetimeFigureOut">
               <a:rPr lang="en-US" smtClean="0"/>
-              <a:t>12/6/2018</a:t>
+              <a:t>1/19/2019</a:t>
             </a:fld>
             <a:endParaRPr lang="en-US"/>
           </a:p>
@@ -2801,7 +2801,7 @@
           <a:p>
             <a:fld id="{F1FA7AC5-6045-4418-8E60-F48788734473}" type="datetimeFigureOut">
               <a:rPr lang="en-US" smtClean="0"/>
-              <a:t>12/6/2018</a:t>
+              <a:t>1/19/2019</a:t>
             </a:fld>
             <a:endParaRPr lang="en-US"/>
           </a:p>
@@ -3055,7 +3055,7 @@
           <a:p>
             <a:fld id="{F1FA7AC5-6045-4418-8E60-F48788734473}" type="datetimeFigureOut">
               <a:rPr lang="en-US" smtClean="0"/>
-              <a:t>12/6/2018</a:t>
+              <a:t>1/19/2019</a:t>
             </a:fld>
             <a:endParaRPr lang="en-US"/>
           </a:p>
@@ -3223,7 +3223,7 @@
           <a:p>
             <a:fld id="{F1FA7AC5-6045-4418-8E60-F48788734473}" type="datetimeFigureOut">
               <a:rPr lang="en-US" smtClean="0"/>
-              <a:t>12/6/2018</a:t>
+              <a:t>1/19/2019</a:t>
             </a:fld>
             <a:endParaRPr lang="en-US"/>
           </a:p>
@@ -3565,7 +3565,7 @@
           <a:p>
             <a:fld id="{F1FA7AC5-6045-4418-8E60-F48788734473}" type="datetimeFigureOut">
               <a:rPr lang="en-US" smtClean="0"/>
-              <a:t>12/6/2018</a:t>
+              <a:t>1/19/2019</a:t>
             </a:fld>
             <a:endParaRPr lang="en-US"/>
           </a:p>
@@ -3837,7 +3837,7 @@
           <a:p>
             <a:fld id="{F1FA7AC5-6045-4418-8E60-F48788734473}" type="datetimeFigureOut">
               <a:rPr lang="en-US" smtClean="0"/>
-              <a:t>12/6/2018</a:t>
+              <a:t>1/19/2019</a:t>
             </a:fld>
             <a:endParaRPr lang="en-US"/>
           </a:p>
@@ -4213,7 +4213,7 @@
           <a:p>
             <a:fld id="{F1FA7AC5-6045-4418-8E60-F48788734473}" type="datetimeFigureOut">
               <a:rPr lang="en-US" smtClean="0"/>
-              <a:t>12/6/2018</a:t>
+              <a:t>1/19/2019</a:t>
             </a:fld>
             <a:endParaRPr lang="en-US"/>
           </a:p>
@@ -4330,7 +4330,7 @@
           <a:p>
             <a:fld id="{F1FA7AC5-6045-4418-8E60-F48788734473}" type="datetimeFigureOut">
               <a:rPr lang="en-US" smtClean="0"/>
-              <a:t>12/6/2018</a:t>
+              <a:t>1/19/2019</a:t>
             </a:fld>
             <a:endParaRPr lang="en-US"/>
           </a:p>
@@ -4501,7 +4501,7 @@
           <a:p>
             <a:fld id="{F1FA7AC5-6045-4418-8E60-F48788734473}" type="datetimeFigureOut">
               <a:rPr lang="en-US" smtClean="0"/>
-              <a:t>12/6/2018</a:t>
+              <a:t>1/19/2019</a:t>
             </a:fld>
             <a:endParaRPr lang="en-US"/>
           </a:p>
@@ -4853,7 +4853,7 @@
           <a:p>
             <a:fld id="{F1FA7AC5-6045-4418-8E60-F48788734473}" type="datetimeFigureOut">
               <a:rPr lang="en-US" smtClean="0"/>
-              <a:t>12/6/2018</a:t>
+              <a:t>1/19/2019</a:t>
             </a:fld>
             <a:endParaRPr lang="en-US"/>
           </a:p>
@@ -5228,7 +5228,7 @@
           <a:p>
             <a:fld id="{F1FA7AC5-6045-4418-8E60-F48788734473}" type="datetimeFigureOut">
               <a:rPr lang="en-US" smtClean="0"/>
-              <a:t>12/6/2018</a:t>
+              <a:t>1/19/2019</a:t>
             </a:fld>
             <a:endParaRPr lang="en-US"/>
           </a:p>
@@ -5513,7 +5513,7 @@
           <a:p>
             <a:fld id="{F1FA7AC5-6045-4418-8E60-F48788734473}" type="datetimeFigureOut">
               <a:rPr lang="en-US" smtClean="0"/>
-              <a:t>12/6/2018</a:t>
+              <a:t>1/19/2019</a:t>
             </a:fld>
             <a:endParaRPr lang="en-US"/>
           </a:p>
@@ -12110,7 +12110,9 @@
         </p:nvSpPr>
         <p:spPr/>
         <p:txBody>
-          <a:bodyPr/>
+          <a:bodyPr>
+            <a:normAutofit/>
+          </a:bodyPr>
           <a:lstStyle/>
           <a:p>
             <a:endParaRPr lang="it-IT" dirty="0" smtClean="0"/>
@@ -12188,11 +12190,15 @@
             </a:r>
             <a:r>
               <a:rPr lang="en-US" sz="2400" dirty="0" smtClean="0"/>
-              <a:t>etc.) </a:t>
+              <a:t>etc</a:t>
+            </a:r>
+            <a:r>
+              <a:rPr lang="en-US" sz="2400" dirty="0" smtClean="0"/>
+              <a:t>.), </a:t>
             </a:r>
             <a:r>
               <a:rPr lang="en-US" sz="2400" dirty="0"/>
-              <a:t>from components, promoting the creation of more 'pure' components that select state and dispatch actions.</a:t>
+              <a:t>promoting the creation of more 'pure' components that select state and dispatch actions.</a:t>
             </a:r>
           </a:p>
           <a:p>
@@ -12244,7 +12250,31 @@
             </a:r>
             <a:r>
               <a:rPr lang="en-US" sz="2400" dirty="0"/>
-              <a:t>that should emit non empty arrays of Actions that will (optionally) be dispatched to the Store by the library itself.</a:t>
+              <a:t>that should </a:t>
+            </a:r>
+            <a:r>
+              <a:rPr lang="en-US" sz="2400" dirty="0" smtClean="0"/>
+              <a:t>(optionally) emit </a:t>
+            </a:r>
+            <a:r>
+              <a:rPr lang="en-US" sz="2400" dirty="0"/>
+              <a:t>non empty arrays of Actions that will </a:t>
+            </a:r>
+            <a:r>
+              <a:rPr lang="en-US" sz="2400" dirty="0" smtClean="0"/>
+              <a:t>be </a:t>
+            </a:r>
+            <a:r>
+              <a:rPr lang="en-US" sz="2400" dirty="0"/>
+              <a:t>dispatched to the Store </a:t>
+            </a:r>
+            <a:r>
+              <a:rPr lang="en-US" sz="2400" dirty="0" smtClean="0"/>
+              <a:t>itself</a:t>
+            </a:r>
+            <a:r>
+              <a:rPr lang="en-US" sz="2400" dirty="0"/>
+              <a:t>.</a:t>
             </a:r>
           </a:p>
           <a:p>
@@ -16018,23 +16048,7 @@
                   <a:srgbClr val="FF0000"/>
                 </a:solidFill>
               </a:rPr>
-              <a:t> of </a:t>
-            </a:r>
-            <a:r>
-              <a:rPr lang="it-IT" sz="2400" dirty="0" smtClean="0">
-                <a:solidFill>
-                  <a:srgbClr val="FF0000"/>
-                </a:solidFill>
-              </a:rPr>
-              <a:t>A</a:t>
-            </a:r>
-            <a:r>
-              <a:rPr lang="it-IT" sz="2400" dirty="0" smtClean="0">
-                <a:solidFill>
-                  <a:srgbClr val="FF0000"/>
-                </a:solidFill>
-              </a:rPr>
-              <a:t>ction(s)</a:t>
+              <a:t> of Action(s)</a:t>
             </a:r>
             <a:endParaRPr lang="it-IT" sz="2400" dirty="0">
               <a:solidFill>
@@ -18140,7 +18154,11 @@
             </a:r>
             <a:r>
               <a:rPr lang="en-US" dirty="0"/>
-              <a:t>/ Dispatch a </a:t>
+              <a:t>/ Dispatch </a:t>
+            </a:r>
+            <a:r>
+              <a:rPr lang="en-US" dirty="0" smtClean="0"/>
+              <a:t>an action with no handlers: a </a:t>
             </a:r>
             <a:r>
               <a:rPr lang="en-US" dirty="0">
@@ -18182,15 +18200,7 @@
                   <a:srgbClr val="0070C0"/>
                 </a:solidFill>
               </a:rPr>
-              <a:t>filter</a:t>
-            </a:r>
-            <a:r>
-              <a:rPr lang="en-US" dirty="0" smtClean="0">
-                <a:solidFill>
-                  <a:srgbClr val="0070C0"/>
-                </a:solidFill>
-              </a:rPr>
-              <a:t>() </a:t>
+              <a:t>filter() </a:t>
             </a:r>
             <a:r>
               <a:rPr lang="en-US" dirty="0"/>
@@ -20073,7 +20083,19 @@
             </a:r>
             <a:r>
               <a:rPr lang="it-IT" dirty="0" smtClean="0"/>
+              <a:t> </a:t>
+            </a:r>
+            <a:r>
+              <a:rPr lang="it-IT" dirty="0" err="1" smtClean="0"/>
+              <a:t>one</a:t>
+            </a:r>
+            <a:r>
+              <a:rPr lang="it-IT" dirty="0" smtClean="0"/>
               <a:t>. </a:t>
+            </a:r>
+            <a:r>
+              <a:rPr lang="it-IT" dirty="0" smtClean="0"/>
+              <a:t/>
             </a:r>
             <a:br>
               <a:rPr lang="it-IT" dirty="0" smtClean="0"/>
@@ -20241,7 +20263,7 @@
             </a:r>
             <a:r>
               <a:rPr lang="it-IT" b="1" dirty="0" err="1" smtClean="0"/>
-              <a:t>guarantees</a:t>
+              <a:t>guarantee</a:t>
             </a:r>
             <a:r>
               <a:rPr lang="it-IT" b="1" dirty="0" smtClean="0"/>
@@ -22023,7 +22045,7 @@
         <p:spPr/>
         <p:txBody>
           <a:bodyPr>
-            <a:normAutofit lnSpcReduction="10000"/>
+            <a:normAutofit/>
           </a:bodyPr>
           <a:lstStyle/>
           <a:p>
@@ -22040,31 +22062,11 @@
             </a:r>
             <a:r>
               <a:rPr lang="en-US" dirty="0"/>
-              <a:t> imports enable the instrumentation using </a:t>
-            </a:r>
-            <a:r>
-              <a:rPr lang="en-US" b="1" dirty="0" err="1" smtClean="0">
-                <a:solidFill>
-                  <a:srgbClr val="0070C0"/>
-                </a:solidFill>
-              </a:rPr>
-              <a:t>StoreDevtoolsModule.instrument</a:t>
-            </a:r>
-            <a:r>
-              <a:rPr lang="en-US" b="1" dirty="0" smtClean="0">
-                <a:solidFill>
-                  <a:srgbClr val="0070C0"/>
-                </a:solidFill>
-              </a:rPr>
-              <a:t>({…})</a:t>
-            </a:r>
-            <a:r>
-              <a:rPr lang="en-US" dirty="0" smtClean="0">
-                <a:solidFill>
-                  <a:srgbClr val="0070C0"/>
-                </a:solidFill>
-              </a:rPr>
-              <a:t>:</a:t>
+              <a:t> imports enable the instrumentation </a:t>
+            </a:r>
+            <a:r>
+              <a:rPr lang="en-US" dirty="0" smtClean="0"/>
+              <a:t>using:</a:t>
             </a:r>
             <a:endParaRPr lang="en-US" dirty="0">
               <a:solidFill>
@@ -22266,6 +22268,14 @@
             <a:r>
               <a:rPr lang="it-IT" dirty="0" err="1" smtClean="0"/>
               <a:t>instrumentation</a:t>
+            </a:r>
+            <a:r>
+              <a:rPr lang="it-IT" dirty="0" smtClean="0"/>
+              <a:t> </a:t>
+            </a:r>
+            <a:r>
+              <a:rPr lang="it-IT" dirty="0" err="1" smtClean="0"/>
+              <a:t>options</a:t>
             </a:r>
             <a:r>
               <a:rPr lang="it-IT" dirty="0" smtClean="0"/>
@@ -25640,7 +25650,7 @@
 </file>
 
 <file path=ppt/slides/slide5.xml><?xml version="1.0" encoding="utf-8"?>
-<p:sld xmlns:a="http://schemas.openxmlformats.org/drawingml/2006/main" xmlns:r="http://schemas.openxmlformats.org/officeDocument/2006/relationships" xmlns:p="http://schemas.openxmlformats.org/presentationml/2006/main">
+<p:sld xmlns:a="http://schemas.openxmlformats.org/drawingml/2006/main" xmlns:r="http://schemas.openxmlformats.org/officeDocument/2006/relationships" xmlns:p="http://schemas.openxmlformats.org/presentationml/2006/main" show="0">
   <p:cSld>
     <p:spTree>
       <p:nvGrpSpPr>
@@ -25807,6 +25817,14 @@
   <p:clrMapOvr>
     <a:masterClrMapping/>
   </p:clrMapOvr>
+  <mc:AlternateContent xmlns:mc="http://schemas.openxmlformats.org/markup-compatibility/2006">
+    <mc:Choice xmlns:p14="http://schemas.microsoft.com/office/powerpoint/2010/main" Requires="p14">
+      <p:transition spd="slow" p14:dur="2000"/>
+    </mc:Choice>
+    <mc:Fallback>
+      <p:transition spd="slow"/>
+    </mc:Fallback>
+  </mc:AlternateContent>
   <p:timing>
     <p:tnLst>
       <p:par>
@@ -26040,19 +26058,11 @@
             </a:r>
             <a:r>
               <a:rPr lang="it-IT" sz="2400" dirty="0" err="1" smtClean="0"/>
-              <a:t>i</a:t>
-            </a:r>
-            <a:r>
-              <a:rPr lang="it-IT" sz="2400" dirty="0" err="1" smtClean="0"/>
-              <a:t>s</a:t>
+              <a:t>is</a:t>
             </a:r>
             <a:r>
               <a:rPr lang="it-IT" sz="2400" dirty="0" smtClean="0"/>
-              <a:t> </a:t>
-            </a:r>
-            <a:r>
-              <a:rPr lang="it-IT" sz="2400" dirty="0" smtClean="0"/>
-              <a:t>«</a:t>
+              <a:t> «</a:t>
             </a:r>
             <a:r>
               <a:rPr lang="it-IT" sz="2400" dirty="0" err="1" smtClean="0">
@@ -26729,27 +26739,23 @@
           <a:p>
             <a:r>
               <a:rPr lang="it-IT" sz="2400" dirty="0" err="1" smtClean="0"/>
-              <a:t>Allows</a:t>
+              <a:t>Enables</a:t>
             </a:r>
             <a:r>
               <a:rPr lang="it-IT" sz="2400" dirty="0" smtClean="0"/>
-              <a:t> </a:t>
+              <a:t> the </a:t>
             </a:r>
             <a:r>
               <a:rPr lang="it-IT" sz="2400" dirty="0" err="1" smtClean="0"/>
-              <a:t>us</a:t>
+              <a:t>construction</a:t>
             </a:r>
             <a:r>
               <a:rPr lang="it-IT" sz="2400" dirty="0" smtClean="0"/>
-              <a:t> to </a:t>
-            </a:r>
-            <a:r>
-              <a:rPr lang="it-IT" sz="2400" dirty="0" err="1" smtClean="0"/>
-              <a:t>write</a:t>
+              <a:t> of </a:t>
             </a:r>
             <a:r>
               <a:rPr lang="it-IT" sz="2400" dirty="0" smtClean="0"/>
-              <a:t> a </a:t>
+              <a:t>a </a:t>
             </a:r>
             <a:r>
               <a:rPr lang="it-IT" sz="2400" dirty="0" err="1" smtClean="0"/>
@@ -26759,7 +26765,6 @@
               <a:rPr lang="it-IT" sz="2400" dirty="0" smtClean="0"/>
               <a:t> Application:</a:t>
             </a:r>
-            <a:endParaRPr lang="it-IT" sz="2400" dirty="0" smtClean="0"/>
           </a:p>
           <a:p>
             <a:endParaRPr lang="it-IT" sz="2400" dirty="0" smtClean="0"/>
@@ -26791,15 +26796,7 @@
                   <a:srgbClr val="0070C0"/>
                 </a:solidFill>
               </a:rPr>
-              <a:t> </a:t>
-            </a:r>
-            <a:r>
-              <a:rPr lang="it-IT" sz="2400" dirty="0" smtClean="0">
-                <a:solidFill>
-                  <a:srgbClr val="0070C0"/>
-                </a:solidFill>
-              </a:rPr>
-              <a:t>(</a:t>
+              <a:t> (</a:t>
             </a:r>
             <a:r>
               <a:rPr lang="it-IT" sz="2400" dirty="0" err="1" smtClean="0">
@@ -28094,7 +28091,7 @@
   <a:extraClrSchemeLst/>
   <a:extLst>
     <a:ext uri="{05A4C25C-085E-4340-85A3-A5531E510DB2}">
-      <thm15:themeFamily xmlns="" xmlns:thm15="http://schemas.microsoft.com/office/thememl/2012/main" name="Retrospect" id="{5F128B03-DCCA-4EEB-AB3B-CF2899314A46}" vid="{9CC26709-368C-4D72-9060-94E5B3FF3CD6}"/>
+      <thm15:themeFamily xmlns:thm15="http://schemas.microsoft.com/office/thememl/2012/main" xmlns="" name="Retrospect" id="{5F128B03-DCCA-4EEB-AB3B-CF2899314A46}" vid="{9CC26709-368C-4D72-9060-94E5B3FF3CD6}"/>
     </a:ext>
   </a:extLst>
 </a:theme>
@@ -28389,7 +28386,7 @@
   <a:extraClrSchemeLst/>
   <a:extLst>
     <a:ext uri="{05A4C25C-085E-4340-85A3-A5531E510DB2}">
-      <thm15:themeFamily xmlns="" xmlns:thm15="http://schemas.microsoft.com/office/thememl/2012/main" name="Office Theme" id="{62F939B6-93AF-4DB8-9C6B-D6C7DFDC589F}" vid="{4A3C46E8-61CC-4603-A589-7422A47A8E4A}"/>
+      <thm15:themeFamily xmlns:thm15="http://schemas.microsoft.com/office/thememl/2012/main" xmlns="" name="Office Theme" id="{62F939B6-93AF-4DB8-9C6B-D6C7DFDC589F}" vid="{4A3C46E8-61CC-4603-A589-7422A47A8E4A}"/>
     </a:ext>
   </a:extLst>
 </a:theme>

</xml_diff>